<commit_message>
made another graphs+trees ppt change
</commit_message>
<xml_diff>
--- a/Fifth Meeting - Graphs and Trees - 09-27-2017/graphs-and-trees.pptx
+++ b/Fifth Meeting - Graphs and Trees - 09-27-2017/graphs-and-trees.pptx
@@ -5,7 +5,7 @@
     <p:sldMasterId id="2147483696" r:id="rId1"/>
   </p:sldMasterIdLst>
   <p:notesMasterIdLst>
-    <p:notesMasterId r:id="rId45"/>
+    <p:notesMasterId r:id="rId46"/>
   </p:notesMasterIdLst>
   <p:sldIdLst>
     <p:sldId id="256" r:id="rId2"/>
@@ -40,17 +40,18 @@
     <p:sldId id="301" r:id="rId31"/>
     <p:sldId id="303" r:id="rId32"/>
     <p:sldId id="302" r:id="rId33"/>
-    <p:sldId id="280" r:id="rId34"/>
-    <p:sldId id="282" r:id="rId35"/>
-    <p:sldId id="285" r:id="rId36"/>
-    <p:sldId id="284" r:id="rId37"/>
-    <p:sldId id="286" r:id="rId38"/>
-    <p:sldId id="287" r:id="rId39"/>
-    <p:sldId id="288" r:id="rId40"/>
-    <p:sldId id="289" r:id="rId41"/>
-    <p:sldId id="290" r:id="rId42"/>
-    <p:sldId id="295" r:id="rId43"/>
-    <p:sldId id="296" r:id="rId44"/>
+    <p:sldId id="305" r:id="rId34"/>
+    <p:sldId id="280" r:id="rId35"/>
+    <p:sldId id="282" r:id="rId36"/>
+    <p:sldId id="285" r:id="rId37"/>
+    <p:sldId id="284" r:id="rId38"/>
+    <p:sldId id="286" r:id="rId39"/>
+    <p:sldId id="287" r:id="rId40"/>
+    <p:sldId id="288" r:id="rId41"/>
+    <p:sldId id="289" r:id="rId42"/>
+    <p:sldId id="290" r:id="rId43"/>
+    <p:sldId id="295" r:id="rId44"/>
+    <p:sldId id="296" r:id="rId45"/>
   </p:sldIdLst>
   <p:sldSz cx="12192000" cy="6858000"/>
   <p:notesSz cx="6858000" cy="9144000"/>
@@ -24920,59 +24921,6 @@
       </p:sp>
       <p:sp>
         <p:nvSpPr>
-          <p:cNvPr id="4" name="TextBox 3">
-            <a:extLst>
-              <a:ext uri="{FF2B5EF4-FFF2-40B4-BE49-F238E27FC236}">
-                <a16:creationId xmlns:a16="http://schemas.microsoft.com/office/drawing/2014/main" xmlns="" id="{FC83256C-DAFE-4855-A791-481784FAD0A6}"/>
-              </a:ext>
-            </a:extLst>
-          </p:cNvPr>
-          <p:cNvSpPr txBox="1"/>
-          <p:nvPr/>
-        </p:nvSpPr>
-        <p:spPr>
-          <a:xfrm>
-            <a:off x="976320" y="2519614"/>
-            <a:ext cx="4576597" cy="1754326"/>
-          </a:xfrm>
-          <a:prstGeom prst="rect">
-            <a:avLst/>
-          </a:prstGeom>
-          <a:noFill/>
-        </p:spPr>
-        <p:txBody>
-          <a:bodyPr wrap="square" rtlCol="0">
-            <a:spAutoFit/>
-          </a:bodyPr>
-          <a:lstStyle/>
-          <a:p>
-            <a:r>
-              <a:rPr lang="en-US" b="1" dirty="0"/>
-              <a:t>Intuition</a:t>
-            </a:r>
-          </a:p>
-          <a:p>
-            <a:endParaRPr lang="en-US" b="1" dirty="0"/>
-          </a:p>
-          <a:p>
-            <a:r>
-              <a:rPr lang="en-US" dirty="0"/>
-              <a:t>Start at the source (root) node</a:t>
-            </a:r>
-          </a:p>
-          <a:p>
-            <a:endParaRPr lang="en-US" dirty="0"/>
-          </a:p>
-          <a:p>
-            <a:r>
-              <a:rPr lang="en-US" dirty="0"/>
-              <a:t>Go through each of its neighbors (children) before going onto their children. </a:t>
-            </a:r>
-          </a:p>
-        </p:txBody>
-      </p:sp>
-      <p:sp>
-        <p:nvSpPr>
           <p:cNvPr id="5" name="Oval 4">
             <a:extLst>
               <a:ext uri="{FF2B5EF4-FFF2-40B4-BE49-F238E27FC236}">
@@ -25555,7 +25503,7 @@
     </p:spTree>
     <p:extLst>
       <p:ext uri="{BB962C8B-B14F-4D97-AF65-F5344CB8AC3E}">
-        <p14:creationId xmlns:p14="http://schemas.microsoft.com/office/powerpoint/2010/main" val="1255124921"/>
+        <p14:creationId xmlns:p14="http://schemas.microsoft.com/office/powerpoint/2010/main" val="738153781"/>
       </p:ext>
     </p:extLst>
   </p:cSld>
@@ -25675,10 +25623,10 @@
       </p:sp>
       <p:sp>
         <p:nvSpPr>
-          <p:cNvPr id="18" name="Oval 17">
-            <a:extLst>
-              <a:ext uri="{FF2B5EF4-FFF2-40B4-BE49-F238E27FC236}">
-                <a16:creationId xmlns:a16="http://schemas.microsoft.com/office/drawing/2014/main" xmlns="" id="{E3A70C93-FBFE-4C6B-9718-B3E23D7AF78C}"/>
+          <p:cNvPr id="5" name="Oval 4">
+            <a:extLst>
+              <a:ext uri="{FF2B5EF4-FFF2-40B4-BE49-F238E27FC236}">
+                <a16:creationId xmlns:a16="http://schemas.microsoft.com/office/drawing/2014/main" xmlns="" id="{7C698373-BED4-4C3B-AB0D-AFDB68234831}"/>
               </a:ext>
             </a:extLst>
           </p:cNvPr>
@@ -25687,8 +25635,8 @@
         </p:nvSpPr>
         <p:spPr>
           <a:xfrm>
-            <a:off x="6195467" y="2519614"/>
-            <a:ext cx="1091860" cy="906011"/>
+            <a:off x="5736244" y="3660021"/>
+            <a:ext cx="1071619" cy="906011"/>
           </a:xfrm>
           <a:prstGeom prst="ellipse">
             <a:avLst/>
@@ -25696,15 +25644,64 @@
         </p:spPr>
         <p:style>
           <a:lnRef idx="2">
-            <a:schemeClr val="accent1">
+            <a:schemeClr val="accent2">
               <a:shade val="50000"/>
             </a:schemeClr>
           </a:lnRef>
           <a:fillRef idx="1">
-            <a:schemeClr val="accent1"/>
-          </a:fillRef>
-          <a:effectRef idx="0">
-            <a:schemeClr val="accent1"/>
+            <a:schemeClr val="accent2"/>
+          </a:fillRef>
+          <a:effectRef idx="0">
+            <a:schemeClr val="accent2"/>
+          </a:effectRef>
+          <a:fontRef idx="minor">
+            <a:schemeClr val="lt1"/>
+          </a:fontRef>
+        </p:style>
+        <p:txBody>
+          <a:bodyPr rtlCol="0" anchor="ctr"/>
+          <a:lstStyle/>
+          <a:p>
+            <a:pPr algn="ctr"/>
+            <a:r>
+              <a:rPr lang="en-US" sz="1400" dirty="0"/>
+              <a:t>1</a:t>
+            </a:r>
+          </a:p>
+        </p:txBody>
+      </p:sp>
+      <p:sp>
+        <p:nvSpPr>
+          <p:cNvPr id="6" name="Oval 5">
+            <a:extLst>
+              <a:ext uri="{FF2B5EF4-FFF2-40B4-BE49-F238E27FC236}">
+                <a16:creationId xmlns:a16="http://schemas.microsoft.com/office/drawing/2014/main" xmlns="" id="{2AFC8556-D16F-45ED-80A0-4487D84E403E}"/>
+              </a:ext>
+            </a:extLst>
+          </p:cNvPr>
+          <p:cNvSpPr/>
+          <p:nvPr/>
+        </p:nvSpPr>
+        <p:spPr>
+          <a:xfrm>
+            <a:off x="7269257" y="2519614"/>
+            <a:ext cx="1091860" cy="906011"/>
+          </a:xfrm>
+          <a:prstGeom prst="ellipse">
+            <a:avLst/>
+          </a:prstGeom>
+        </p:spPr>
+        <p:style>
+          <a:lnRef idx="2">
+            <a:schemeClr val="accent3">
+              <a:shade val="50000"/>
+            </a:schemeClr>
+          </a:lnRef>
+          <a:fillRef idx="1">
+            <a:schemeClr val="accent3"/>
+          </a:fillRef>
+          <a:effectRef idx="0">
+            <a:schemeClr val="accent3"/>
           </a:effectRef>
           <a:fontRef idx="minor">
             <a:schemeClr val="lt1"/>
@@ -25724,10 +25721,10 @@
       </p:sp>
       <p:sp>
         <p:nvSpPr>
-          <p:cNvPr id="19" name="Oval 18">
-            <a:extLst>
-              <a:ext uri="{FF2B5EF4-FFF2-40B4-BE49-F238E27FC236}">
-                <a16:creationId xmlns:a16="http://schemas.microsoft.com/office/drawing/2014/main" xmlns="" id="{A9D8A195-C61E-45AF-8911-D48B6D5EFA63}"/>
+          <p:cNvPr id="7" name="Oval 6">
+            <a:extLst>
+              <a:ext uri="{FF2B5EF4-FFF2-40B4-BE49-F238E27FC236}">
+                <a16:creationId xmlns:a16="http://schemas.microsoft.com/office/drawing/2014/main" xmlns="" id="{69C61115-D5E7-4A80-9223-3E7C14FCB909}"/>
               </a:ext>
             </a:extLst>
           </p:cNvPr>
@@ -25736,7 +25733,7 @@
         </p:nvSpPr>
         <p:spPr>
           <a:xfrm>
-            <a:off x="7766536" y="3759537"/>
+            <a:off x="4375936" y="5000248"/>
             <a:ext cx="1091860" cy="906011"/>
           </a:xfrm>
           <a:prstGeom prst="ellipse">
@@ -25745,15 +25742,113 @@
         </p:spPr>
         <p:style>
           <a:lnRef idx="2">
-            <a:schemeClr val="accent1">
+            <a:schemeClr val="accent4">
               <a:shade val="50000"/>
             </a:schemeClr>
           </a:lnRef>
           <a:fillRef idx="1">
-            <a:schemeClr val="accent1"/>
-          </a:fillRef>
-          <a:effectRef idx="0">
-            <a:schemeClr val="accent1"/>
+            <a:schemeClr val="accent4"/>
+          </a:fillRef>
+          <a:effectRef idx="0">
+            <a:schemeClr val="accent4"/>
+          </a:effectRef>
+          <a:fontRef idx="minor">
+            <a:schemeClr val="lt1"/>
+          </a:fontRef>
+        </p:style>
+        <p:txBody>
+          <a:bodyPr rtlCol="0" anchor="ctr"/>
+          <a:lstStyle/>
+          <a:p>
+            <a:pPr algn="ctr"/>
+            <a:r>
+              <a:rPr lang="en-US" sz="1400" dirty="0"/>
+              <a:t>3</a:t>
+            </a:r>
+          </a:p>
+        </p:txBody>
+      </p:sp>
+      <p:sp>
+        <p:nvSpPr>
+          <p:cNvPr id="8" name="Oval 7">
+            <a:extLst>
+              <a:ext uri="{FF2B5EF4-FFF2-40B4-BE49-F238E27FC236}">
+                <a16:creationId xmlns:a16="http://schemas.microsoft.com/office/drawing/2014/main" xmlns="" id="{0F635F50-21A8-4D7E-92C1-3DA7E416DF2C}"/>
+              </a:ext>
+            </a:extLst>
+          </p:cNvPr>
+          <p:cNvSpPr/>
+          <p:nvPr/>
+        </p:nvSpPr>
+        <p:spPr>
+          <a:xfrm>
+            <a:off x="9164790" y="3660021"/>
+            <a:ext cx="1091860" cy="906011"/>
+          </a:xfrm>
+          <a:prstGeom prst="ellipse">
+            <a:avLst/>
+          </a:prstGeom>
+        </p:spPr>
+        <p:style>
+          <a:lnRef idx="2">
+            <a:schemeClr val="accent2">
+              <a:shade val="50000"/>
+            </a:schemeClr>
+          </a:lnRef>
+          <a:fillRef idx="1">
+            <a:schemeClr val="accent2"/>
+          </a:fillRef>
+          <a:effectRef idx="0">
+            <a:schemeClr val="accent2"/>
+          </a:effectRef>
+          <a:fontRef idx="minor">
+            <a:schemeClr val="lt1"/>
+          </a:fontRef>
+        </p:style>
+        <p:txBody>
+          <a:bodyPr rtlCol="0" anchor="ctr"/>
+          <a:lstStyle/>
+          <a:p>
+            <a:pPr algn="ctr"/>
+            <a:r>
+              <a:rPr lang="en-US" sz="1400" dirty="0"/>
+              <a:t>2</a:t>
+            </a:r>
+          </a:p>
+        </p:txBody>
+      </p:sp>
+      <p:sp>
+        <p:nvSpPr>
+          <p:cNvPr id="9" name="Oval 8">
+            <a:extLst>
+              <a:ext uri="{FF2B5EF4-FFF2-40B4-BE49-F238E27FC236}">
+                <a16:creationId xmlns:a16="http://schemas.microsoft.com/office/drawing/2014/main" xmlns="" id="{567EC305-E243-46D7-A1A4-57898B2A6BFF}"/>
+              </a:ext>
+            </a:extLst>
+          </p:cNvPr>
+          <p:cNvSpPr/>
+          <p:nvPr/>
+        </p:nvSpPr>
+        <p:spPr>
+          <a:xfrm>
+            <a:off x="6807863" y="5000248"/>
+            <a:ext cx="1091860" cy="906011"/>
+          </a:xfrm>
+          <a:prstGeom prst="ellipse">
+            <a:avLst/>
+          </a:prstGeom>
+        </p:spPr>
+        <p:style>
+          <a:lnRef idx="2">
+            <a:schemeClr val="accent4">
+              <a:shade val="50000"/>
+            </a:schemeClr>
+          </a:lnRef>
+          <a:fillRef idx="1">
+            <a:schemeClr val="accent4"/>
+          </a:fillRef>
+          <a:effectRef idx="0">
+            <a:schemeClr val="accent4"/>
           </a:effectRef>
           <a:fontRef idx="minor">
             <a:schemeClr val="lt1"/>
@@ -25773,10 +25868,10 @@
       </p:sp>
       <p:sp>
         <p:nvSpPr>
-          <p:cNvPr id="20" name="Oval 19">
-            <a:extLst>
-              <a:ext uri="{FF2B5EF4-FFF2-40B4-BE49-F238E27FC236}">
-                <a16:creationId xmlns:a16="http://schemas.microsoft.com/office/drawing/2014/main" xmlns="" id="{2530DC6F-0310-49DD-B461-F5E79C06D842}"/>
+          <p:cNvPr id="10" name="Oval 9">
+            <a:extLst>
+              <a:ext uri="{FF2B5EF4-FFF2-40B4-BE49-F238E27FC236}">
+                <a16:creationId xmlns:a16="http://schemas.microsoft.com/office/drawing/2014/main" xmlns="" id="{26325D76-0E9C-45BC-BF85-1ADC837D5B3E}"/>
               </a:ext>
             </a:extLst>
           </p:cNvPr>
@@ -25785,7 +25880,7 @@
         </p:nvSpPr>
         <p:spPr>
           <a:xfrm>
-            <a:off x="7747682" y="2519614"/>
+            <a:off x="10256650" y="5000246"/>
             <a:ext cx="1091860" cy="906011"/>
           </a:xfrm>
           <a:prstGeom prst="ellipse">
@@ -25794,15 +25889,15 @@
         </p:spPr>
         <p:style>
           <a:lnRef idx="2">
-            <a:schemeClr val="accent1">
+            <a:schemeClr val="accent4">
               <a:shade val="50000"/>
             </a:schemeClr>
           </a:lnRef>
           <a:fillRef idx="1">
-            <a:schemeClr val="accent1"/>
-          </a:fillRef>
-          <a:effectRef idx="0">
-            <a:schemeClr val="accent1"/>
+            <a:schemeClr val="accent4"/>
+          </a:fillRef>
+          <a:effectRef idx="0">
+            <a:schemeClr val="accent4"/>
           </a:effectRef>
           <a:fontRef idx="minor">
             <a:schemeClr val="lt1"/>
@@ -25815,17 +25910,17 @@
             <a:pPr algn="ctr"/>
             <a:r>
               <a:rPr lang="en-US" sz="1400" dirty="0"/>
-              <a:t>1</a:t>
-            </a:r>
-          </a:p>
-        </p:txBody>
-      </p:sp>
-      <p:sp>
-        <p:nvSpPr>
-          <p:cNvPr id="21" name="Oval 20">
-            <a:extLst>
-              <a:ext uri="{FF2B5EF4-FFF2-40B4-BE49-F238E27FC236}">
-                <a16:creationId xmlns:a16="http://schemas.microsoft.com/office/drawing/2014/main" xmlns="" id="{2D30383C-AFC4-4EF5-A144-B7D7383317B0}"/>
+              <a:t>6</a:t>
+            </a:r>
+          </a:p>
+        </p:txBody>
+      </p:sp>
+      <p:sp>
+        <p:nvSpPr>
+          <p:cNvPr id="11" name="Oval 10">
+            <a:extLst>
+              <a:ext uri="{FF2B5EF4-FFF2-40B4-BE49-F238E27FC236}">
+                <a16:creationId xmlns:a16="http://schemas.microsoft.com/office/drawing/2014/main" xmlns="" id="{E4EFB6A6-70AB-4785-AF17-EA5815B444D9}"/>
               </a:ext>
             </a:extLst>
           </p:cNvPr>
@@ -25834,7 +25929,7 @@
         </p:nvSpPr>
         <p:spPr>
           <a:xfrm>
-            <a:off x="9318751" y="3759537"/>
+            <a:off x="8072930" y="5000246"/>
             <a:ext cx="1091860" cy="906011"/>
           </a:xfrm>
           <a:prstGeom prst="ellipse">
@@ -25843,64 +25938,15 @@
         </p:spPr>
         <p:style>
           <a:lnRef idx="2">
-            <a:schemeClr val="accent1">
+            <a:schemeClr val="accent4">
               <a:shade val="50000"/>
             </a:schemeClr>
           </a:lnRef>
           <a:fillRef idx="1">
-            <a:schemeClr val="accent1"/>
-          </a:fillRef>
-          <a:effectRef idx="0">
-            <a:schemeClr val="accent1"/>
-          </a:effectRef>
-          <a:fontRef idx="minor">
-            <a:schemeClr val="lt1"/>
-          </a:fontRef>
-        </p:style>
-        <p:txBody>
-          <a:bodyPr rtlCol="0" anchor="ctr"/>
-          <a:lstStyle/>
-          <a:p>
-            <a:pPr algn="ctr"/>
-            <a:r>
-              <a:rPr lang="en-US" sz="1400" dirty="0"/>
-              <a:t>3</a:t>
-            </a:r>
-          </a:p>
-        </p:txBody>
-      </p:sp>
-      <p:sp>
-        <p:nvSpPr>
-          <p:cNvPr id="22" name="Oval 21">
-            <a:extLst>
-              <a:ext uri="{FF2B5EF4-FFF2-40B4-BE49-F238E27FC236}">
-                <a16:creationId xmlns:a16="http://schemas.microsoft.com/office/drawing/2014/main" xmlns="" id="{B7933EEF-65C0-4D7E-8EDC-F9EC80CC53A9}"/>
-              </a:ext>
-            </a:extLst>
-          </p:cNvPr>
-          <p:cNvSpPr/>
-          <p:nvPr/>
-        </p:nvSpPr>
-        <p:spPr>
-          <a:xfrm>
-            <a:off x="6214321" y="3759537"/>
-            <a:ext cx="1091860" cy="906011"/>
-          </a:xfrm>
-          <a:prstGeom prst="ellipse">
-            <a:avLst/>
-          </a:prstGeom>
-        </p:spPr>
-        <p:style>
-          <a:lnRef idx="2">
-            <a:schemeClr val="accent1">
-              <a:shade val="50000"/>
-            </a:schemeClr>
-          </a:lnRef>
-          <a:fillRef idx="1">
-            <a:schemeClr val="accent1"/>
-          </a:fillRef>
-          <a:effectRef idx="0">
-            <a:schemeClr val="accent1"/>
+            <a:schemeClr val="accent4"/>
+          </a:fillRef>
+          <a:effectRef idx="0">
+            <a:schemeClr val="accent4"/>
           </a:effectRef>
           <a:fontRef idx="minor">
             <a:schemeClr val="lt1"/>
@@ -25918,81 +25964,29 @@
           </a:p>
         </p:txBody>
       </p:sp>
-      <p:sp>
-        <p:nvSpPr>
-          <p:cNvPr id="23" name="Oval 22">
-            <a:extLst>
-              <a:ext uri="{FF2B5EF4-FFF2-40B4-BE49-F238E27FC236}">
-                <a16:creationId xmlns:a16="http://schemas.microsoft.com/office/drawing/2014/main" xmlns="" id="{ACBC3861-7CD0-492B-A8F2-5D5897647B0E}"/>
-              </a:ext>
-            </a:extLst>
-          </p:cNvPr>
-          <p:cNvSpPr/>
-          <p:nvPr/>
-        </p:nvSpPr>
-        <p:spPr>
-          <a:xfrm>
-            <a:off x="9303029" y="2519614"/>
-            <a:ext cx="1091860" cy="906011"/>
-          </a:xfrm>
-          <a:prstGeom prst="ellipse">
-            <a:avLst/>
-          </a:prstGeom>
-        </p:spPr>
-        <p:style>
-          <a:lnRef idx="2">
-            <a:schemeClr val="accent1">
-              <a:shade val="50000"/>
-            </a:schemeClr>
-          </a:lnRef>
-          <a:fillRef idx="1">
-            <a:schemeClr val="accent1"/>
-          </a:fillRef>
-          <a:effectRef idx="0">
-            <a:schemeClr val="accent1"/>
-          </a:effectRef>
-          <a:fontRef idx="minor">
-            <a:schemeClr val="lt1"/>
-          </a:fontRef>
-        </p:style>
-        <p:txBody>
-          <a:bodyPr rtlCol="0" anchor="ctr"/>
-          <a:lstStyle/>
-          <a:p>
-            <a:pPr algn="ctr"/>
-            <a:r>
-              <a:rPr lang="en-US" sz="1400" dirty="0"/>
-              <a:t>2</a:t>
-            </a:r>
-          </a:p>
-        </p:txBody>
-      </p:sp>
       <p:cxnSp>
         <p:nvCxnSpPr>
-          <p:cNvPr id="24" name="Straight Arrow Connector 23">
-            <a:extLst>
-              <a:ext uri="{FF2B5EF4-FFF2-40B4-BE49-F238E27FC236}">
-                <a16:creationId xmlns:a16="http://schemas.microsoft.com/office/drawing/2014/main" xmlns="" id="{BD2AC117-99A4-4902-86EA-A6FFA7DC4319}"/>
+          <p:cNvPr id="12" name="Straight Connector 11">
+            <a:extLst>
+              <a:ext uri="{FF2B5EF4-FFF2-40B4-BE49-F238E27FC236}">
+                <a16:creationId xmlns:a16="http://schemas.microsoft.com/office/drawing/2014/main" xmlns="" id="{B77A1722-4980-41A4-ADB9-BBEA0E21C4C0}"/>
               </a:ext>
             </a:extLst>
           </p:cNvPr>
           <p:cNvCxnSpPr>
-            <a:stCxn id="18" idx="4"/>
-            <a:endCxn id="22" idx="0"/>
+            <a:stCxn id="6" idx="2"/>
+            <a:endCxn id="5" idx="0"/>
           </p:cNvCxnSpPr>
           <p:nvPr/>
         </p:nvCxnSpPr>
         <p:spPr>
-          <a:xfrm>
-            <a:off x="6741397" y="3425625"/>
-            <a:ext cx="18854" cy="333912"/>
-          </a:xfrm>
-          <a:prstGeom prst="straightConnector1">
-            <a:avLst/>
-          </a:prstGeom>
-          <a:ln>
-            <a:tailEnd type="triangle"/>
-          </a:ln>
+          <a:xfrm flipH="1">
+            <a:off x="6272054" y="2972620"/>
+            <a:ext cx="997203" cy="687401"/>
+          </a:xfrm>
+          <a:prstGeom prst="line">
+            <a:avLst/>
+          </a:prstGeom>
         </p:spPr>
         <p:style>
           <a:lnRef idx="1">
@@ -26011,31 +26005,28 @@
       </p:cxnSp>
       <p:cxnSp>
         <p:nvCxnSpPr>
-          <p:cNvPr id="25" name="Straight Arrow Connector 24">
-            <a:extLst>
-              <a:ext uri="{FF2B5EF4-FFF2-40B4-BE49-F238E27FC236}">
-                <a16:creationId xmlns:a16="http://schemas.microsoft.com/office/drawing/2014/main" xmlns="" id="{DA3EDF12-09A3-47E6-94BF-4D56401E8BC1}"/>
+          <p:cNvPr id="13" name="Straight Connector 12">
+            <a:extLst>
+              <a:ext uri="{FF2B5EF4-FFF2-40B4-BE49-F238E27FC236}">
+                <a16:creationId xmlns:a16="http://schemas.microsoft.com/office/drawing/2014/main" xmlns="" id="{6D6950D6-A9DA-4BA3-8831-BB5887FC4C35}"/>
               </a:ext>
             </a:extLst>
           </p:cNvPr>
           <p:cNvCxnSpPr>
             <a:cxnSpLocks/>
-            <a:stCxn id="18" idx="5"/>
-            <a:endCxn id="19" idx="1"/>
+            <a:stCxn id="6" idx="6"/>
+            <a:endCxn id="8" idx="0"/>
           </p:cNvCxnSpPr>
           <p:nvPr/>
         </p:nvCxnSpPr>
         <p:spPr>
           <a:xfrm>
-            <a:off x="7127428" y="3292943"/>
-            <a:ext cx="799007" cy="599276"/>
-          </a:xfrm>
-          <a:prstGeom prst="straightConnector1">
-            <a:avLst/>
-          </a:prstGeom>
-          <a:ln>
-            <a:tailEnd type="triangle"/>
-          </a:ln>
+            <a:off x="8361117" y="2972620"/>
+            <a:ext cx="1349603" cy="687401"/>
+          </a:xfrm>
+          <a:prstGeom prst="line">
+            <a:avLst/>
+          </a:prstGeom>
         </p:spPr>
         <p:style>
           <a:lnRef idx="1">
@@ -26054,31 +26045,27 @@
       </p:cxnSp>
       <p:cxnSp>
         <p:nvCxnSpPr>
-          <p:cNvPr id="28" name="Straight Arrow Connector 27">
-            <a:extLst>
-              <a:ext uri="{FF2B5EF4-FFF2-40B4-BE49-F238E27FC236}">
-                <a16:creationId xmlns:a16="http://schemas.microsoft.com/office/drawing/2014/main" xmlns="" id="{3EF20996-34DB-42A5-BA07-F3C4B821C43B}"/>
+          <p:cNvPr id="14" name="Straight Connector 13">
+            <a:extLst>
+              <a:ext uri="{FF2B5EF4-FFF2-40B4-BE49-F238E27FC236}">
+                <a16:creationId xmlns:a16="http://schemas.microsoft.com/office/drawing/2014/main" xmlns="" id="{C2C36523-D305-416A-90A8-FBD2D026E0DF}"/>
               </a:ext>
             </a:extLst>
           </p:cNvPr>
           <p:cNvCxnSpPr>
             <a:cxnSpLocks/>
-            <a:stCxn id="18" idx="6"/>
-            <a:endCxn id="20" idx="2"/>
+            <a:stCxn id="5" idx="2"/>
           </p:cNvCxnSpPr>
           <p:nvPr/>
         </p:nvCxnSpPr>
         <p:spPr>
-          <a:xfrm>
-            <a:off x="7287327" y="2972620"/>
-            <a:ext cx="460355" cy="0"/>
-          </a:xfrm>
-          <a:prstGeom prst="straightConnector1">
-            <a:avLst/>
-          </a:prstGeom>
-          <a:ln>
-            <a:tailEnd type="triangle"/>
-          </a:ln>
+          <a:xfrm flipH="1">
+            <a:off x="4887300" y="4113027"/>
+            <a:ext cx="848944" cy="887219"/>
+          </a:xfrm>
+          <a:prstGeom prst="line">
+            <a:avLst/>
+          </a:prstGeom>
         </p:spPr>
         <p:style>
           <a:lnRef idx="1">
@@ -26097,31 +26084,28 @@
       </p:cxnSp>
       <p:cxnSp>
         <p:nvCxnSpPr>
-          <p:cNvPr id="32" name="Straight Arrow Connector 31">
-            <a:extLst>
-              <a:ext uri="{FF2B5EF4-FFF2-40B4-BE49-F238E27FC236}">
-                <a16:creationId xmlns:a16="http://schemas.microsoft.com/office/drawing/2014/main" xmlns="" id="{03765C78-6E44-42E8-A389-88D3C0C77CD7}"/>
+          <p:cNvPr id="15" name="Straight Connector 14">
+            <a:extLst>
+              <a:ext uri="{FF2B5EF4-FFF2-40B4-BE49-F238E27FC236}">
+                <a16:creationId xmlns:a16="http://schemas.microsoft.com/office/drawing/2014/main" xmlns="" id="{9B54BDFE-788A-4561-9985-C975CAE6978E}"/>
               </a:ext>
             </a:extLst>
           </p:cNvPr>
           <p:cNvCxnSpPr>
             <a:cxnSpLocks/>
-            <a:stCxn id="20" idx="4"/>
-            <a:endCxn id="19" idx="0"/>
+            <a:stCxn id="5" idx="6"/>
+            <a:endCxn id="9" idx="0"/>
           </p:cNvCxnSpPr>
           <p:nvPr/>
         </p:nvCxnSpPr>
         <p:spPr>
           <a:xfrm>
-            <a:off x="8293612" y="3425625"/>
-            <a:ext cx="18854" cy="333912"/>
-          </a:xfrm>
-          <a:prstGeom prst="straightConnector1">
-            <a:avLst/>
-          </a:prstGeom>
-          <a:ln>
-            <a:tailEnd type="triangle"/>
-          </a:ln>
+            <a:off x="6807863" y="4113027"/>
+            <a:ext cx="545930" cy="887221"/>
+          </a:xfrm>
+          <a:prstGeom prst="line">
+            <a:avLst/>
+          </a:prstGeom>
         </p:spPr>
         <p:style>
           <a:lnRef idx="1">
@@ -26140,31 +26124,28 @@
       </p:cxnSp>
       <p:cxnSp>
         <p:nvCxnSpPr>
-          <p:cNvPr id="35" name="Straight Arrow Connector 34">
-            <a:extLst>
-              <a:ext uri="{FF2B5EF4-FFF2-40B4-BE49-F238E27FC236}">
-                <a16:creationId xmlns:a16="http://schemas.microsoft.com/office/drawing/2014/main" xmlns="" id="{7856A272-8E7D-4F00-A51D-8615A11FB3C6}"/>
+          <p:cNvPr id="16" name="Straight Connector 15">
+            <a:extLst>
+              <a:ext uri="{FF2B5EF4-FFF2-40B4-BE49-F238E27FC236}">
+                <a16:creationId xmlns:a16="http://schemas.microsoft.com/office/drawing/2014/main" xmlns="" id="{68F1224D-2307-4846-AAB2-2789647BCF23}"/>
               </a:ext>
             </a:extLst>
           </p:cNvPr>
           <p:cNvCxnSpPr>
             <a:cxnSpLocks/>
-            <a:stCxn id="20" idx="5"/>
-            <a:endCxn id="21" idx="1"/>
+            <a:stCxn id="8" idx="2"/>
+            <a:endCxn id="11" idx="0"/>
           </p:cNvCxnSpPr>
           <p:nvPr/>
         </p:nvCxnSpPr>
         <p:spPr>
-          <a:xfrm>
-            <a:off x="8679643" y="3292943"/>
-            <a:ext cx="799007" cy="599276"/>
-          </a:xfrm>
-          <a:prstGeom prst="straightConnector1">
-            <a:avLst/>
-          </a:prstGeom>
-          <a:ln>
-            <a:tailEnd type="triangle"/>
-          </a:ln>
+          <a:xfrm flipH="1">
+            <a:off x="8618860" y="4113027"/>
+            <a:ext cx="545930" cy="887219"/>
+          </a:xfrm>
+          <a:prstGeom prst="line">
+            <a:avLst/>
+          </a:prstGeom>
         </p:spPr>
         <p:style>
           <a:lnRef idx="1">
@@ -26183,117 +26164,28 @@
       </p:cxnSp>
       <p:cxnSp>
         <p:nvCxnSpPr>
-          <p:cNvPr id="38" name="Straight Arrow Connector 37">
-            <a:extLst>
-              <a:ext uri="{FF2B5EF4-FFF2-40B4-BE49-F238E27FC236}">
-                <a16:creationId xmlns:a16="http://schemas.microsoft.com/office/drawing/2014/main" xmlns="" id="{8F292BE1-F59D-4B85-A0E1-7132A3805CF7}"/>
+          <p:cNvPr id="17" name="Straight Connector 16">
+            <a:extLst>
+              <a:ext uri="{FF2B5EF4-FFF2-40B4-BE49-F238E27FC236}">
+                <a16:creationId xmlns:a16="http://schemas.microsoft.com/office/drawing/2014/main" xmlns="" id="{FEDD086A-E016-4E5F-A980-888B57244C82}"/>
               </a:ext>
             </a:extLst>
           </p:cNvPr>
           <p:cNvCxnSpPr>
             <a:cxnSpLocks/>
-            <a:stCxn id="21" idx="2"/>
-            <a:endCxn id="19" idx="6"/>
+            <a:stCxn id="8" idx="6"/>
+            <a:endCxn id="10" idx="0"/>
           </p:cNvCxnSpPr>
           <p:nvPr/>
         </p:nvCxnSpPr>
         <p:spPr>
-          <a:xfrm flipH="1">
-            <a:off x="8858396" y="4212543"/>
-            <a:ext cx="460355" cy="0"/>
-          </a:xfrm>
-          <a:prstGeom prst="straightConnector1">
-            <a:avLst/>
-          </a:prstGeom>
-          <a:ln>
-            <a:tailEnd type="triangle"/>
-          </a:ln>
-        </p:spPr>
-        <p:style>
-          <a:lnRef idx="1">
-            <a:schemeClr val="accent1"/>
-          </a:lnRef>
-          <a:fillRef idx="0">
-            <a:schemeClr val="accent1"/>
-          </a:fillRef>
-          <a:effectRef idx="0">
-            <a:schemeClr val="accent1"/>
-          </a:effectRef>
-          <a:fontRef idx="minor">
-            <a:schemeClr val="tx1"/>
-          </a:fontRef>
-        </p:style>
-      </p:cxnSp>
-      <p:cxnSp>
-        <p:nvCxnSpPr>
-          <p:cNvPr id="43" name="Straight Arrow Connector 42">
-            <a:extLst>
-              <a:ext uri="{FF2B5EF4-FFF2-40B4-BE49-F238E27FC236}">
-                <a16:creationId xmlns:a16="http://schemas.microsoft.com/office/drawing/2014/main" xmlns="" id="{EAB267AB-B304-4A9B-8571-FB119ECDBD6D}"/>
-              </a:ext>
-            </a:extLst>
-          </p:cNvPr>
-          <p:cNvCxnSpPr>
-            <a:cxnSpLocks/>
-            <a:stCxn id="21" idx="0"/>
-            <a:endCxn id="23" idx="4"/>
-          </p:cNvCxnSpPr>
-          <p:nvPr/>
-        </p:nvCxnSpPr>
-        <p:spPr>
-          <a:xfrm flipH="1" flipV="1">
-            <a:off x="9848959" y="3425625"/>
-            <a:ext cx="15722" cy="333912"/>
-          </a:xfrm>
-          <a:prstGeom prst="straightConnector1">
-            <a:avLst/>
-          </a:prstGeom>
-          <a:ln>
-            <a:tailEnd type="triangle"/>
-          </a:ln>
-        </p:spPr>
-        <p:style>
-          <a:lnRef idx="1">
-            <a:schemeClr val="accent1"/>
-          </a:lnRef>
-          <a:fillRef idx="0">
-            <a:schemeClr val="accent1"/>
-          </a:fillRef>
-          <a:effectRef idx="0">
-            <a:schemeClr val="accent1"/>
-          </a:effectRef>
-          <a:fontRef idx="minor">
-            <a:schemeClr val="tx1"/>
-          </a:fontRef>
-        </p:style>
-      </p:cxnSp>
-      <p:cxnSp>
-        <p:nvCxnSpPr>
-          <p:cNvPr id="46" name="Straight Arrow Connector 45">
-            <a:extLst>
-              <a:ext uri="{FF2B5EF4-FFF2-40B4-BE49-F238E27FC236}">
-                <a16:creationId xmlns:a16="http://schemas.microsoft.com/office/drawing/2014/main" xmlns="" id="{F90FF63D-F398-4F70-A13B-B076C40D0D95}"/>
-              </a:ext>
-            </a:extLst>
-          </p:cNvPr>
-          <p:cNvCxnSpPr>
-            <a:cxnSpLocks/>
-            <a:stCxn id="23" idx="2"/>
-            <a:endCxn id="20" idx="6"/>
-          </p:cNvCxnSpPr>
-          <p:nvPr/>
-        </p:nvCxnSpPr>
-        <p:spPr>
-          <a:xfrm flipH="1">
-            <a:off x="8839542" y="2972620"/>
-            <a:ext cx="463487" cy="0"/>
-          </a:xfrm>
-          <a:prstGeom prst="straightConnector1">
-            <a:avLst/>
-          </a:prstGeom>
-          <a:ln>
-            <a:tailEnd type="triangle"/>
-          </a:ln>
+          <a:xfrm>
+            <a:off x="10256650" y="4113027"/>
+            <a:ext cx="545930" cy="887219"/>
+          </a:xfrm>
+          <a:prstGeom prst="line">
+            <a:avLst/>
+          </a:prstGeom>
         </p:spPr>
         <p:style>
           <a:lnRef idx="1">
@@ -26313,7 +26205,7 @@
     </p:spTree>
     <p:extLst>
       <p:ext uri="{BB962C8B-B14F-4D97-AF65-F5344CB8AC3E}">
-        <p14:creationId xmlns:p14="http://schemas.microsoft.com/office/powerpoint/2010/main" val="3422234807"/>
+        <p14:creationId xmlns:p14="http://schemas.microsoft.com/office/powerpoint/2010/main" val="1255124921"/>
       </p:ext>
     </p:extLst>
   </p:cSld>
@@ -27068,49 +26960,10 @@
           </a:fontRef>
         </p:style>
       </p:cxnSp>
-      <p:sp>
-        <p:nvSpPr>
-          <p:cNvPr id="27" name="TextBox 26">
-            <a:extLst>
-              <a:ext uri="{FF2B5EF4-FFF2-40B4-BE49-F238E27FC236}">
-                <a16:creationId xmlns:a16="http://schemas.microsoft.com/office/drawing/2014/main" xmlns="" id="{8EFF6C43-1197-47C6-AFBF-132D9814A2E6}"/>
-              </a:ext>
-            </a:extLst>
-          </p:cNvPr>
-          <p:cNvSpPr txBox="1"/>
-          <p:nvPr/>
-        </p:nvSpPr>
-        <p:spPr>
-          <a:xfrm>
-            <a:off x="642158" y="4273940"/>
-            <a:ext cx="5839180" cy="615553"/>
-          </a:xfrm>
-          <a:prstGeom prst="rect">
-            <a:avLst/>
-          </a:prstGeom>
-          <a:noFill/>
-        </p:spPr>
-        <p:txBody>
-          <a:bodyPr wrap="square" rtlCol="0">
-            <a:spAutoFit/>
-          </a:bodyPr>
-          <a:lstStyle/>
-          <a:p>
-            <a:r>
-              <a:rPr lang="en-US" b="1" dirty="0"/>
-              <a:t>What is the output of a BFS traversal of this graph?</a:t>
-            </a:r>
-          </a:p>
-          <a:p>
-            <a:pPr lvl="5"/>
-            <a:endParaRPr lang="en-US" sz="1600" dirty="0"/>
-          </a:p>
-        </p:txBody>
-      </p:sp>
     </p:spTree>
     <p:extLst>
       <p:ext uri="{BB962C8B-B14F-4D97-AF65-F5344CB8AC3E}">
-        <p14:creationId xmlns:p14="http://schemas.microsoft.com/office/powerpoint/2010/main" val="4234671825"/>
+        <p14:creationId xmlns:p14="http://schemas.microsoft.com/office/powerpoint/2010/main" val="3422234807"/>
       </p:ext>
     </p:extLst>
   </p:cSld>
@@ -27867,10 +27720,10 @@
       </p:cxnSp>
       <p:sp>
         <p:nvSpPr>
-          <p:cNvPr id="26" name="TextBox 25">
-            <a:extLst>
-              <a:ext uri="{FF2B5EF4-FFF2-40B4-BE49-F238E27FC236}">
-                <a16:creationId xmlns:a16="http://schemas.microsoft.com/office/drawing/2014/main" xmlns="" id="{7C674BD7-2C40-476B-975D-7FA2EDC4C0BC}"/>
+          <p:cNvPr id="27" name="TextBox 26">
+            <a:extLst>
+              <a:ext uri="{FF2B5EF4-FFF2-40B4-BE49-F238E27FC236}">
+                <a16:creationId xmlns:a16="http://schemas.microsoft.com/office/drawing/2014/main" xmlns="" id="{8EFF6C43-1197-47C6-AFBF-132D9814A2E6}"/>
               </a:ext>
             </a:extLst>
           </p:cNvPr>
@@ -27880,7 +27733,7 @@
         <p:spPr>
           <a:xfrm>
             <a:off x="642158" y="4273940"/>
-            <a:ext cx="5839180" cy="2369880"/>
+            <a:ext cx="5839180" cy="615553"/>
           </a:xfrm>
           <a:prstGeom prst="rect">
             <a:avLst/>
@@ -27900,163 +27753,6 @@
           </a:p>
           <a:p>
             <a:pPr lvl="5"/>
-            <a:r>
-              <a:rPr lang="en-US" u="sng" dirty="0"/>
-              <a:t>Discovered</a:t>
-            </a:r>
-            <a:r>
-              <a:rPr lang="en-US" dirty="0"/>
-              <a:t>	</a:t>
-            </a:r>
-            <a:r>
-              <a:rPr lang="en-US" u="sng" dirty="0"/>
-              <a:t>Processed</a:t>
-            </a:r>
-          </a:p>
-          <a:p>
-            <a:pPr lvl="5"/>
-            <a:r>
-              <a:rPr lang="en-US" sz="1600" b="1" dirty="0"/>
-              <a:t> [ </a:t>
-            </a:r>
-            <a:r>
-              <a:rPr lang="en-US" sz="1600" dirty="0"/>
-              <a:t>0 </a:t>
-            </a:r>
-            <a:r>
-              <a:rPr lang="en-US" sz="1600" b="1" dirty="0"/>
-              <a:t>] 		 []</a:t>
-            </a:r>
-          </a:p>
-          <a:p>
-            <a:pPr lvl="5"/>
-            <a:r>
-              <a:rPr lang="en-US" sz="1600" b="1" dirty="0"/>
-              <a:t> [ </a:t>
-            </a:r>
-            <a:r>
-              <a:rPr lang="en-US" sz="1600" dirty="0"/>
-              <a:t>1,4,5</a:t>
-            </a:r>
-            <a:r>
-              <a:rPr lang="en-US" sz="1600" b="1" dirty="0"/>
-              <a:t> ]    	 [ </a:t>
-            </a:r>
-            <a:r>
-              <a:rPr lang="en-US" sz="1600" dirty="0"/>
-              <a:t>0</a:t>
-            </a:r>
-            <a:r>
-              <a:rPr lang="en-US" sz="1600" b="1" dirty="0"/>
-              <a:t> ]</a:t>
-            </a:r>
-          </a:p>
-          <a:p>
-            <a:pPr lvl="5"/>
-            <a:r>
-              <a:rPr lang="en-US" sz="1600" b="1" dirty="0"/>
-              <a:t> [</a:t>
-            </a:r>
-            <a:r>
-              <a:rPr lang="en-US" sz="1600" dirty="0"/>
-              <a:t> 4, 5, 3 </a:t>
-            </a:r>
-            <a:r>
-              <a:rPr lang="en-US" sz="1600" b="1" dirty="0"/>
-              <a:t>]  	 [ </a:t>
-            </a:r>
-            <a:r>
-              <a:rPr lang="en-US" sz="1600" dirty="0"/>
-              <a:t>0, 1 </a:t>
-            </a:r>
-            <a:r>
-              <a:rPr lang="en-US" sz="1600" b="1" dirty="0"/>
-              <a:t>]</a:t>
-            </a:r>
-          </a:p>
-          <a:p>
-            <a:pPr lvl="5"/>
-            <a:r>
-              <a:rPr lang="en-US" sz="1600" b="1" dirty="0"/>
-              <a:t> [ </a:t>
-            </a:r>
-            <a:r>
-              <a:rPr lang="en-US" sz="1600" dirty="0"/>
-              <a:t>5, 3 </a:t>
-            </a:r>
-            <a:r>
-              <a:rPr lang="en-US" sz="1600" b="1" dirty="0"/>
-              <a:t>]      	 [ </a:t>
-            </a:r>
-            <a:r>
-              <a:rPr lang="en-US" sz="1600" dirty="0"/>
-              <a:t>0, 1, 4 </a:t>
-            </a:r>
-            <a:r>
-              <a:rPr lang="en-US" sz="1600" b="1" dirty="0"/>
-              <a:t>]</a:t>
-            </a:r>
-          </a:p>
-          <a:p>
-            <a:pPr lvl="5"/>
-            <a:r>
-              <a:rPr lang="en-US" sz="1600" b="1" dirty="0"/>
-              <a:t> [ </a:t>
-            </a:r>
-            <a:r>
-              <a:rPr lang="en-US" sz="1600" dirty="0"/>
-              <a:t>3</a:t>
-            </a:r>
-            <a:r>
-              <a:rPr lang="en-US" sz="1600" b="1" dirty="0"/>
-              <a:t> ]         	 [ </a:t>
-            </a:r>
-            <a:r>
-              <a:rPr lang="en-US" sz="1600" dirty="0"/>
-              <a:t>0, 1, 4, 5 </a:t>
-            </a:r>
-            <a:r>
-              <a:rPr lang="en-US" sz="1600" b="1" dirty="0"/>
-              <a:t>]</a:t>
-            </a:r>
-          </a:p>
-          <a:p>
-            <a:pPr lvl="5"/>
-            <a:r>
-              <a:rPr lang="en-US" sz="1600" b="1" dirty="0"/>
-              <a:t> [ </a:t>
-            </a:r>
-            <a:r>
-              <a:rPr lang="en-US" sz="1600" dirty="0"/>
-              <a:t>2</a:t>
-            </a:r>
-            <a:r>
-              <a:rPr lang="en-US" sz="1600" b="1" dirty="0"/>
-              <a:t> ]          	 [ </a:t>
-            </a:r>
-            <a:r>
-              <a:rPr lang="en-US" sz="1600" dirty="0"/>
-              <a:t>0, 1, 4, 5, 3 </a:t>
-            </a:r>
-            <a:r>
-              <a:rPr lang="en-US" sz="1600" b="1" dirty="0"/>
-              <a:t>]</a:t>
-            </a:r>
-          </a:p>
-          <a:p>
-            <a:pPr lvl="5"/>
-            <a:r>
-              <a:rPr lang="en-US" sz="1600" b="1" dirty="0"/>
-              <a:t> []              	 [ </a:t>
-            </a:r>
-            <a:r>
-              <a:rPr lang="en-US" sz="1600" dirty="0"/>
-              <a:t>0, 1, 4, 5, 3, 2 </a:t>
-            </a:r>
-            <a:r>
-              <a:rPr lang="en-US" sz="1600" b="1" dirty="0"/>
-              <a:t>]</a:t>
-            </a:r>
             <a:endParaRPr lang="en-US" sz="1600" dirty="0"/>
           </a:p>
         </p:txBody>
@@ -28064,7 +27760,7 @@
     </p:spTree>
     <p:extLst>
       <p:ext uri="{BB962C8B-B14F-4D97-AF65-F5344CB8AC3E}">
-        <p14:creationId xmlns:p14="http://schemas.microsoft.com/office/powerpoint/2010/main" val="1647521261"/>
+        <p14:creationId xmlns:p14="http://schemas.microsoft.com/office/powerpoint/2010/main" val="4234671825"/>
       </p:ext>
     </p:extLst>
   </p:cSld>
@@ -28116,7 +27812,7 @@
           <a:p>
             <a:r>
               <a:rPr lang="en-US" sz="3200" dirty="0"/>
-              <a:t>implementation</a:t>
+              <a:t>Traversals</a:t>
             </a:r>
             <a:br>
               <a:rPr lang="en-US" sz="3200" dirty="0"/>
@@ -28143,8 +27839,8 @@
         </p:nvSpPr>
         <p:spPr>
           <a:xfrm>
-            <a:off x="1251693" y="3390205"/>
-            <a:ext cx="4576597" cy="369332"/>
+            <a:off x="976320" y="2519614"/>
+            <a:ext cx="4576597" cy="1754326"/>
           </a:xfrm>
           <a:prstGeom prst="rect">
             <a:avLst/>
@@ -28159,9 +27855,26 @@
           <a:p>
             <a:r>
               <a:rPr lang="en-US" b="1" dirty="0"/>
-              <a:t>CODEALONG!</a:t>
-            </a:r>
+              <a:t>Intuition</a:t>
+            </a:r>
+          </a:p>
+          <a:p>
+            <a:endParaRPr lang="en-US" b="1" dirty="0"/>
+          </a:p>
+          <a:p>
+            <a:r>
+              <a:rPr lang="en-US" dirty="0"/>
+              <a:t>Start at the source (root) node</a:t>
+            </a:r>
+          </a:p>
+          <a:p>
             <a:endParaRPr lang="en-US" dirty="0"/>
+          </a:p>
+          <a:p>
+            <a:r>
+              <a:rPr lang="en-US" dirty="0"/>
+              <a:t>Go through each of its neighbors (children) before going onto their children. </a:t>
+            </a:r>
           </a:p>
         </p:txBody>
       </p:sp>
@@ -28802,10 +28515,206 @@
           </a:fontRef>
         </p:style>
       </p:cxnSp>
+      <p:sp>
+        <p:nvSpPr>
+          <p:cNvPr id="26" name="TextBox 25">
+            <a:extLst>
+              <a:ext uri="{FF2B5EF4-FFF2-40B4-BE49-F238E27FC236}">
+                <a16:creationId xmlns:a16="http://schemas.microsoft.com/office/drawing/2014/main" xmlns="" id="{7C674BD7-2C40-476B-975D-7FA2EDC4C0BC}"/>
+              </a:ext>
+            </a:extLst>
+          </p:cNvPr>
+          <p:cNvSpPr txBox="1"/>
+          <p:nvPr/>
+        </p:nvSpPr>
+        <p:spPr>
+          <a:xfrm>
+            <a:off x="642158" y="4273940"/>
+            <a:ext cx="5839180" cy="2369880"/>
+          </a:xfrm>
+          <a:prstGeom prst="rect">
+            <a:avLst/>
+          </a:prstGeom>
+          <a:noFill/>
+        </p:spPr>
+        <p:txBody>
+          <a:bodyPr wrap="square" rtlCol="0">
+            <a:spAutoFit/>
+          </a:bodyPr>
+          <a:lstStyle/>
+          <a:p>
+            <a:r>
+              <a:rPr lang="en-US" b="1" dirty="0"/>
+              <a:t>What is the output of a BFS traversal of this graph?</a:t>
+            </a:r>
+          </a:p>
+          <a:p>
+            <a:pPr lvl="5"/>
+            <a:r>
+              <a:rPr lang="en-US" u="sng" dirty="0"/>
+              <a:t>Discovered</a:t>
+            </a:r>
+            <a:r>
+              <a:rPr lang="en-US" dirty="0"/>
+              <a:t>	</a:t>
+            </a:r>
+            <a:r>
+              <a:rPr lang="en-US" u="sng" dirty="0"/>
+              <a:t>Processed</a:t>
+            </a:r>
+          </a:p>
+          <a:p>
+            <a:pPr lvl="5"/>
+            <a:r>
+              <a:rPr lang="en-US" sz="1600" b="1" dirty="0"/>
+              <a:t> [ </a:t>
+            </a:r>
+            <a:r>
+              <a:rPr lang="en-US" sz="1600" dirty="0"/>
+              <a:t>0 </a:t>
+            </a:r>
+            <a:r>
+              <a:rPr lang="en-US" sz="1600" b="1" dirty="0"/>
+              <a:t>] 		 []</a:t>
+            </a:r>
+          </a:p>
+          <a:p>
+            <a:pPr lvl="5"/>
+            <a:r>
+              <a:rPr lang="en-US" sz="1600" b="1" dirty="0"/>
+              <a:t> [ </a:t>
+            </a:r>
+            <a:r>
+              <a:rPr lang="en-US" sz="1600" dirty="0"/>
+              <a:t>1,4,5</a:t>
+            </a:r>
+            <a:r>
+              <a:rPr lang="en-US" sz="1600" b="1" dirty="0"/>
+              <a:t> ]    	 [ </a:t>
+            </a:r>
+            <a:r>
+              <a:rPr lang="en-US" sz="1600" dirty="0"/>
+              <a:t>0</a:t>
+            </a:r>
+            <a:r>
+              <a:rPr lang="en-US" sz="1600" b="1" dirty="0"/>
+              <a:t> ]</a:t>
+            </a:r>
+          </a:p>
+          <a:p>
+            <a:pPr lvl="5"/>
+            <a:r>
+              <a:rPr lang="en-US" sz="1600" b="1" dirty="0"/>
+              <a:t> [</a:t>
+            </a:r>
+            <a:r>
+              <a:rPr lang="en-US" sz="1600" dirty="0"/>
+              <a:t> 4, 5, 3 </a:t>
+            </a:r>
+            <a:r>
+              <a:rPr lang="en-US" sz="1600" b="1" dirty="0"/>
+              <a:t>]  	 [ </a:t>
+            </a:r>
+            <a:r>
+              <a:rPr lang="en-US" sz="1600" dirty="0"/>
+              <a:t>0, 1 </a:t>
+            </a:r>
+            <a:r>
+              <a:rPr lang="en-US" sz="1600" b="1" dirty="0"/>
+              <a:t>]</a:t>
+            </a:r>
+          </a:p>
+          <a:p>
+            <a:pPr lvl="5"/>
+            <a:r>
+              <a:rPr lang="en-US" sz="1600" b="1" dirty="0"/>
+              <a:t> [ </a:t>
+            </a:r>
+            <a:r>
+              <a:rPr lang="en-US" sz="1600" dirty="0"/>
+              <a:t>5, 3 </a:t>
+            </a:r>
+            <a:r>
+              <a:rPr lang="en-US" sz="1600" b="1" dirty="0"/>
+              <a:t>]      	 [ </a:t>
+            </a:r>
+            <a:r>
+              <a:rPr lang="en-US" sz="1600" dirty="0"/>
+              <a:t>0, 1, 4 </a:t>
+            </a:r>
+            <a:r>
+              <a:rPr lang="en-US" sz="1600" b="1" dirty="0"/>
+              <a:t>]</a:t>
+            </a:r>
+          </a:p>
+          <a:p>
+            <a:pPr lvl="5"/>
+            <a:r>
+              <a:rPr lang="en-US" sz="1600" b="1" dirty="0"/>
+              <a:t> [ </a:t>
+            </a:r>
+            <a:r>
+              <a:rPr lang="en-US" sz="1600" dirty="0"/>
+              <a:t>3</a:t>
+            </a:r>
+            <a:r>
+              <a:rPr lang="en-US" sz="1600" b="1" dirty="0"/>
+              <a:t> ]         	 [ </a:t>
+            </a:r>
+            <a:r>
+              <a:rPr lang="en-US" sz="1600" dirty="0"/>
+              <a:t>0, 1, 4, 5 </a:t>
+            </a:r>
+            <a:r>
+              <a:rPr lang="en-US" sz="1600" b="1" dirty="0"/>
+              <a:t>]</a:t>
+            </a:r>
+          </a:p>
+          <a:p>
+            <a:pPr lvl="5"/>
+            <a:r>
+              <a:rPr lang="en-US" sz="1600" b="1" dirty="0"/>
+              <a:t> [ </a:t>
+            </a:r>
+            <a:r>
+              <a:rPr lang="en-US" sz="1600" dirty="0"/>
+              <a:t>2</a:t>
+            </a:r>
+            <a:r>
+              <a:rPr lang="en-US" sz="1600" b="1" dirty="0"/>
+              <a:t> ]          	 [ </a:t>
+            </a:r>
+            <a:r>
+              <a:rPr lang="en-US" sz="1600" dirty="0"/>
+              <a:t>0, 1, 4, 5, 3 </a:t>
+            </a:r>
+            <a:r>
+              <a:rPr lang="en-US" sz="1600" b="1" dirty="0"/>
+              <a:t>]</a:t>
+            </a:r>
+          </a:p>
+          <a:p>
+            <a:pPr lvl="5"/>
+            <a:r>
+              <a:rPr lang="en-US" sz="1600" b="1" dirty="0"/>
+              <a:t> []              	 [ </a:t>
+            </a:r>
+            <a:r>
+              <a:rPr lang="en-US" sz="1600" dirty="0"/>
+              <a:t>0, 1, 4, 5, 3, 2 </a:t>
+            </a:r>
+            <a:r>
+              <a:rPr lang="en-US" sz="1600" b="1" dirty="0"/>
+              <a:t>]</a:t>
+            </a:r>
+            <a:endParaRPr lang="en-US" sz="1600" dirty="0"/>
+          </a:p>
+        </p:txBody>
+      </p:sp>
     </p:spTree>
     <p:extLst>
       <p:ext uri="{BB962C8B-B14F-4D97-AF65-F5344CB8AC3E}">
-        <p14:creationId xmlns:p14="http://schemas.microsoft.com/office/powerpoint/2010/main" val="1972130019"/>
+        <p14:creationId xmlns:p14="http://schemas.microsoft.com/office/powerpoint/2010/main" val="1647521261"/>
       </p:ext>
     </p:extLst>
   </p:cSld>
@@ -28857,26 +28766,14 @@
           <a:p>
             <a:r>
               <a:rPr lang="en-US" sz="3200" dirty="0"/>
-              <a:t>Traversals</a:t>
+              <a:t>implementation</a:t>
             </a:r>
             <a:br>
               <a:rPr lang="en-US" sz="3200" dirty="0"/>
             </a:br>
             <a:r>
-              <a:rPr lang="en-US" sz="2000" b="1" dirty="0" err="1"/>
-              <a:t>DEpth</a:t>
-            </a:r>
-            <a:r>
               <a:rPr lang="en-US" sz="2000" b="1" dirty="0"/>
-              <a:t> First Search (</a:t>
-            </a:r>
-            <a:r>
-              <a:rPr lang="en-US" sz="2000" b="1" dirty="0" err="1"/>
-              <a:t>dFS</a:t>
-            </a:r>
-            <a:r>
-              <a:rPr lang="en-US" sz="2000" b="1" dirty="0"/>
-              <a:t>)</a:t>
+              <a:t>Breadth First Search (BFS)</a:t>
             </a:r>
             <a:endParaRPr lang="en-US" sz="2000" dirty="0"/>
           </a:p>
@@ -28896,8 +28793,8 @@
         </p:nvSpPr>
         <p:spPr>
           <a:xfrm>
-            <a:off x="976320" y="2519614"/>
-            <a:ext cx="4774514" cy="1754326"/>
+            <a:off x="1251693" y="3390205"/>
+            <a:ext cx="4576597" cy="369332"/>
           </a:xfrm>
           <a:prstGeom prst="rect">
             <a:avLst/>
@@ -28912,26 +28809,9 @@
           <a:p>
             <a:r>
               <a:rPr lang="en-US" b="1" dirty="0"/>
-              <a:t>Intuition</a:t>
-            </a:r>
-          </a:p>
-          <a:p>
-            <a:endParaRPr lang="en-US" b="1" dirty="0"/>
-          </a:p>
-          <a:p>
-            <a:r>
-              <a:rPr lang="en-US" dirty="0"/>
-              <a:t>Start at the source (or arbitrary node)</a:t>
-            </a:r>
-          </a:p>
-          <a:p>
+              <a:t>CODEALONG!</a:t>
+            </a:r>
             <a:endParaRPr lang="en-US" dirty="0"/>
-          </a:p>
-          <a:p>
-            <a:r>
-              <a:rPr lang="en-US" dirty="0"/>
-              <a:t>Explore each branch completely before going to next branch.</a:t>
-            </a:r>
           </a:p>
         </p:txBody>
       </p:sp>
@@ -29572,45 +29452,10 @@
           </a:fontRef>
         </p:style>
       </p:cxnSp>
-      <p:sp>
-        <p:nvSpPr>
-          <p:cNvPr id="27" name="TextBox 26">
-            <a:extLst>
-              <a:ext uri="{FF2B5EF4-FFF2-40B4-BE49-F238E27FC236}">
-                <a16:creationId xmlns:a16="http://schemas.microsoft.com/office/drawing/2014/main" xmlns="" id="{F110B75F-3D0B-4EF5-BF60-7D9FB56C00D3}"/>
-              </a:ext>
-            </a:extLst>
-          </p:cNvPr>
-          <p:cNvSpPr txBox="1"/>
-          <p:nvPr/>
-        </p:nvSpPr>
-        <p:spPr>
-          <a:xfrm>
-            <a:off x="642158" y="4273940"/>
-            <a:ext cx="5839180" cy="369332"/>
-          </a:xfrm>
-          <a:prstGeom prst="rect">
-            <a:avLst/>
-          </a:prstGeom>
-          <a:noFill/>
-        </p:spPr>
-        <p:txBody>
-          <a:bodyPr wrap="square" rtlCol="0">
-            <a:spAutoFit/>
-          </a:bodyPr>
-          <a:lstStyle/>
-          <a:p>
-            <a:r>
-              <a:rPr lang="en-US" b="1" dirty="0"/>
-              <a:t>What is the output of a DFS traversal of this graph?</a:t>
-            </a:r>
-          </a:p>
-        </p:txBody>
-      </p:sp>
     </p:spTree>
     <p:extLst>
       <p:ext uri="{BB962C8B-B14F-4D97-AF65-F5344CB8AC3E}">
-        <p14:creationId xmlns:p14="http://schemas.microsoft.com/office/powerpoint/2010/main" val="1123840811"/>
+        <p14:creationId xmlns:p14="http://schemas.microsoft.com/office/powerpoint/2010/main" val="1972130019"/>
       </p:ext>
     </p:extLst>
   </p:cSld>
@@ -29668,8 +29513,20 @@
               <a:rPr lang="en-US" sz="3200" dirty="0"/>
             </a:br>
             <a:r>
+              <a:rPr lang="en-US" sz="2000" b="1" dirty="0" err="1"/>
+              <a:t>DEpth</a:t>
+            </a:r>
+            <a:r>
               <a:rPr lang="en-US" sz="2000" b="1" dirty="0"/>
-              <a:t>Depth First Search (DFS)</a:t>
+              <a:t> First Search (</a:t>
+            </a:r>
+            <a:r>
+              <a:rPr lang="en-US" sz="2000" b="1" dirty="0" err="1"/>
+              <a:t>dFS</a:t>
+            </a:r>
+            <a:r>
+              <a:rPr lang="en-US" sz="2000" b="1" dirty="0"/>
+              <a:t>)</a:t>
             </a:r>
             <a:endParaRPr lang="en-US" sz="2000" dirty="0"/>
           </a:p>
@@ -29690,7 +29547,7 @@
         <p:spPr>
           <a:xfrm>
             <a:off x="976320" y="2519614"/>
-            <a:ext cx="4688939" cy="1754326"/>
+            <a:ext cx="4774514" cy="1754326"/>
           </a:xfrm>
           <a:prstGeom prst="rect">
             <a:avLst/>
@@ -30367,10 +30224,10 @@
       </p:cxnSp>
       <p:sp>
         <p:nvSpPr>
-          <p:cNvPr id="26" name="TextBox 25">
-            <a:extLst>
-              <a:ext uri="{FF2B5EF4-FFF2-40B4-BE49-F238E27FC236}">
-                <a16:creationId xmlns:a16="http://schemas.microsoft.com/office/drawing/2014/main" xmlns="" id="{7C674BD7-2C40-476B-975D-7FA2EDC4C0BC}"/>
+          <p:cNvPr id="27" name="TextBox 26">
+            <a:extLst>
+              <a:ext uri="{FF2B5EF4-FFF2-40B4-BE49-F238E27FC236}">
+                <a16:creationId xmlns:a16="http://schemas.microsoft.com/office/drawing/2014/main" xmlns="" id="{F110B75F-3D0B-4EF5-BF60-7D9FB56C00D3}"/>
               </a:ext>
             </a:extLst>
           </p:cNvPr>
@@ -30380,7 +30237,7 @@
         <p:spPr>
           <a:xfrm>
             <a:off x="642158" y="4273940"/>
-            <a:ext cx="5839180" cy="2369880"/>
+            <a:ext cx="5839180" cy="369332"/>
           </a:xfrm>
           <a:prstGeom prst="rect">
             <a:avLst/>
@@ -30398,245 +30255,12 @@
               <a:t>What is the output of a DFS traversal of this graph?</a:t>
             </a:r>
           </a:p>
-          <a:p>
-            <a:pPr lvl="5"/>
-            <a:r>
-              <a:rPr lang="en-US" u="sng" dirty="0"/>
-              <a:t>Discovered</a:t>
-            </a:r>
-            <a:r>
-              <a:rPr lang="en-US" dirty="0"/>
-              <a:t>	</a:t>
-            </a:r>
-            <a:r>
-              <a:rPr lang="en-US" u="sng" dirty="0"/>
-              <a:t>Processed</a:t>
-            </a:r>
-          </a:p>
-          <a:p>
-            <a:pPr lvl="5"/>
-            <a:r>
-              <a:rPr lang="en-US" sz="1600" b="1" dirty="0"/>
-              <a:t> [ </a:t>
-            </a:r>
-            <a:r>
-              <a:rPr lang="en-US" sz="1600" dirty="0"/>
-              <a:t>0 </a:t>
-            </a:r>
-            <a:r>
-              <a:rPr lang="en-US" sz="1600" b="1" dirty="0"/>
-              <a:t>] 		 []</a:t>
-            </a:r>
-          </a:p>
-          <a:p>
-            <a:pPr lvl="5"/>
-            <a:r>
-              <a:rPr lang="en-US" sz="1600" b="1" dirty="0"/>
-              <a:t> [ </a:t>
-            </a:r>
-            <a:r>
-              <a:rPr lang="en-US" sz="1600" dirty="0"/>
-              <a:t>5,4,1</a:t>
-            </a:r>
-            <a:r>
-              <a:rPr lang="en-US" sz="1600" b="1" dirty="0"/>
-              <a:t> ]    	 [ </a:t>
-            </a:r>
-            <a:r>
-              <a:rPr lang="en-US" sz="1600" dirty="0"/>
-              <a:t>0</a:t>
-            </a:r>
-            <a:r>
-              <a:rPr lang="en-US" sz="1600" b="1" dirty="0"/>
-              <a:t> ]</a:t>
-            </a:r>
-          </a:p>
-          <a:p>
-            <a:pPr lvl="5"/>
-            <a:r>
-              <a:rPr lang="en-US" sz="1600" b="1" dirty="0"/>
-              <a:t> [</a:t>
-            </a:r>
-            <a:r>
-              <a:rPr lang="en-US" sz="1600" dirty="0"/>
-              <a:t> 5,4, 3</a:t>
-            </a:r>
-            <a:r>
-              <a:rPr lang="en-US" sz="1600" b="1" dirty="0"/>
-              <a:t>]  	 	 [ </a:t>
-            </a:r>
-            <a:r>
-              <a:rPr lang="en-US" sz="1600" dirty="0"/>
-              <a:t>0, 1 </a:t>
-            </a:r>
-            <a:r>
-              <a:rPr lang="en-US" sz="1600" b="1" dirty="0"/>
-              <a:t>]</a:t>
-            </a:r>
-          </a:p>
-          <a:p>
-            <a:pPr lvl="5"/>
-            <a:r>
-              <a:rPr lang="en-US" sz="1600" b="1" dirty="0"/>
-              <a:t> [ </a:t>
-            </a:r>
-            <a:r>
-              <a:rPr lang="en-US" sz="1600" dirty="0"/>
-              <a:t>5,4, 2 </a:t>
-            </a:r>
-            <a:r>
-              <a:rPr lang="en-US" sz="1600" b="1" dirty="0"/>
-              <a:t>]      	 [ </a:t>
-            </a:r>
-            <a:r>
-              <a:rPr lang="en-US" sz="1600" dirty="0"/>
-              <a:t>0, 1, 3 </a:t>
-            </a:r>
-            <a:r>
-              <a:rPr lang="en-US" sz="1600" b="1" dirty="0"/>
-              <a:t>]</a:t>
-            </a:r>
-          </a:p>
-          <a:p>
-            <a:pPr lvl="5"/>
-            <a:r>
-              <a:rPr lang="en-US" sz="1600" b="1" dirty="0"/>
-              <a:t> [ </a:t>
-            </a:r>
-            <a:r>
-              <a:rPr lang="en-US" sz="1600" dirty="0"/>
-              <a:t>5,4</a:t>
-            </a:r>
-            <a:r>
-              <a:rPr lang="en-US" sz="1600" b="1" dirty="0"/>
-              <a:t> ]         	 [ </a:t>
-            </a:r>
-            <a:r>
-              <a:rPr lang="en-US" sz="1600" dirty="0"/>
-              <a:t>0, 1, 3, 2 </a:t>
-            </a:r>
-            <a:r>
-              <a:rPr lang="en-US" sz="1600" b="1" dirty="0"/>
-              <a:t>]</a:t>
-            </a:r>
-          </a:p>
-          <a:p>
-            <a:pPr lvl="5"/>
-            <a:r>
-              <a:rPr lang="en-US" sz="1600" b="1" dirty="0"/>
-              <a:t> [ </a:t>
-            </a:r>
-            <a:r>
-              <a:rPr lang="en-US" sz="1600" dirty="0"/>
-              <a:t>5</a:t>
-            </a:r>
-            <a:r>
-              <a:rPr lang="en-US" sz="1600" b="1" dirty="0"/>
-              <a:t> ]          	 [ </a:t>
-            </a:r>
-            <a:r>
-              <a:rPr lang="en-US" sz="1600" dirty="0"/>
-              <a:t>0, 1, 3, 2, 4 </a:t>
-            </a:r>
-            <a:r>
-              <a:rPr lang="en-US" sz="1600" b="1" dirty="0"/>
-              <a:t>]</a:t>
-            </a:r>
-          </a:p>
-          <a:p>
-            <a:pPr lvl="5"/>
-            <a:r>
-              <a:rPr lang="en-US" sz="1600" b="1" dirty="0"/>
-              <a:t> []              	 [ </a:t>
-            </a:r>
-            <a:r>
-              <a:rPr lang="en-US" sz="1600" dirty="0"/>
-              <a:t>0, 1, 3, 2, 4, 5 </a:t>
-            </a:r>
-            <a:r>
-              <a:rPr lang="en-US" sz="1600" b="1" dirty="0"/>
-              <a:t>]</a:t>
-            </a:r>
-            <a:endParaRPr lang="en-US" sz="1600" dirty="0"/>
-          </a:p>
-        </p:txBody>
-      </p:sp>
-      <p:sp>
-        <p:nvSpPr>
-          <p:cNvPr id="3" name="TextBox 2"/>
-          <p:cNvSpPr txBox="1"/>
-          <p:nvPr/>
-        </p:nvSpPr>
-        <p:spPr>
-          <a:xfrm>
-            <a:off x="7287327" y="4889494"/>
-            <a:ext cx="696024" cy="1754326"/>
-          </a:xfrm>
-          <a:prstGeom prst="rect">
-            <a:avLst/>
-          </a:prstGeom>
-          <a:noFill/>
-        </p:spPr>
-        <p:txBody>
-          <a:bodyPr wrap="none" rtlCol="0">
-            <a:spAutoFit/>
-          </a:bodyPr>
-          <a:lstStyle/>
-          <a:p>
-            <a:r>
-              <a:rPr lang="en-US" b="1" dirty="0" smtClean="0"/>
-              <a:t>0</a:t>
-            </a:r>
-          </a:p>
-          <a:p>
-            <a:r>
-              <a:rPr lang="en-US" b="1" dirty="0" smtClean="0"/>
-              <a:t>  1</a:t>
-            </a:r>
-          </a:p>
-          <a:p>
-            <a:r>
-              <a:rPr lang="en-US" b="1" dirty="0"/>
-              <a:t> </a:t>
-            </a:r>
-            <a:r>
-              <a:rPr lang="en-US" b="1" dirty="0" smtClean="0"/>
-              <a:t>   3</a:t>
-            </a:r>
-          </a:p>
-          <a:p>
-            <a:r>
-              <a:rPr lang="en-US" b="1" dirty="0"/>
-              <a:t> </a:t>
-            </a:r>
-            <a:r>
-              <a:rPr lang="en-US" b="1" dirty="0" smtClean="0"/>
-              <a:t>     2</a:t>
-            </a:r>
-          </a:p>
-          <a:p>
-            <a:r>
-              <a:rPr lang="en-US" b="1" dirty="0"/>
-              <a:t> </a:t>
-            </a:r>
-            <a:r>
-              <a:rPr lang="en-US" b="1" dirty="0" smtClean="0"/>
-              <a:t>   4</a:t>
-            </a:r>
-          </a:p>
-          <a:p>
-            <a:r>
-              <a:rPr lang="en-US" b="1" dirty="0" smtClean="0"/>
-              <a:t>5</a:t>
-            </a:r>
-            <a:endParaRPr lang="en-US" b="1" dirty="0"/>
-          </a:p>
         </p:txBody>
       </p:sp>
     </p:spTree>
     <p:extLst>
       <p:ext uri="{BB962C8B-B14F-4D97-AF65-F5344CB8AC3E}">
-        <p14:creationId xmlns:p14="http://schemas.microsoft.com/office/powerpoint/2010/main" val="1396827793"/>
+        <p14:creationId xmlns:p14="http://schemas.microsoft.com/office/powerpoint/2010/main" val="1123840811"/>
       </p:ext>
     </p:extLst>
   </p:cSld>
@@ -30793,14 +30417,14 @@
           <a:p>
             <a:r>
               <a:rPr lang="en-US" sz="3200" dirty="0"/>
-              <a:t>implementation</a:t>
+              <a:t>Traversals</a:t>
             </a:r>
             <a:br>
               <a:rPr lang="en-US" sz="3200" dirty="0"/>
             </a:br>
             <a:r>
               <a:rPr lang="en-US" sz="2000" b="1" dirty="0"/>
-              <a:t>DEPTH First Search (DFS)</a:t>
+              <a:t>Depth First Search (DFS)</a:t>
             </a:r>
             <a:endParaRPr lang="en-US" sz="2000" dirty="0"/>
           </a:p>
@@ -30820,8 +30444,8 @@
         </p:nvSpPr>
         <p:spPr>
           <a:xfrm>
-            <a:off x="1251693" y="3390205"/>
-            <a:ext cx="4576597" cy="369332"/>
+            <a:off x="976320" y="2519614"/>
+            <a:ext cx="4688939" cy="1754326"/>
           </a:xfrm>
           <a:prstGeom prst="rect">
             <a:avLst/>
@@ -30836,9 +30460,26 @@
           <a:p>
             <a:r>
               <a:rPr lang="en-US" b="1" dirty="0"/>
-              <a:t>CODEALONG!</a:t>
-            </a:r>
+              <a:t>Intuition</a:t>
+            </a:r>
+          </a:p>
+          <a:p>
+            <a:endParaRPr lang="en-US" b="1" dirty="0"/>
+          </a:p>
+          <a:p>
+            <a:r>
+              <a:rPr lang="en-US" dirty="0"/>
+              <a:t>Start at the source (or arbitrary node)</a:t>
+            </a:r>
+          </a:p>
+          <a:p>
             <a:endParaRPr lang="en-US" dirty="0"/>
+          </a:p>
+          <a:p>
+            <a:r>
+              <a:rPr lang="en-US" dirty="0"/>
+              <a:t>Explore each branch completely before going to next branch.</a:t>
+            </a:r>
           </a:p>
         </p:txBody>
       </p:sp>
@@ -31479,10 +31120,278 @@
           </a:fontRef>
         </p:style>
       </p:cxnSp>
+      <p:sp>
+        <p:nvSpPr>
+          <p:cNvPr id="26" name="TextBox 25">
+            <a:extLst>
+              <a:ext uri="{FF2B5EF4-FFF2-40B4-BE49-F238E27FC236}">
+                <a16:creationId xmlns:a16="http://schemas.microsoft.com/office/drawing/2014/main" xmlns="" id="{7C674BD7-2C40-476B-975D-7FA2EDC4C0BC}"/>
+              </a:ext>
+            </a:extLst>
+          </p:cNvPr>
+          <p:cNvSpPr txBox="1"/>
+          <p:nvPr/>
+        </p:nvSpPr>
+        <p:spPr>
+          <a:xfrm>
+            <a:off x="642158" y="4273940"/>
+            <a:ext cx="5839180" cy="2369880"/>
+          </a:xfrm>
+          <a:prstGeom prst="rect">
+            <a:avLst/>
+          </a:prstGeom>
+          <a:noFill/>
+        </p:spPr>
+        <p:txBody>
+          <a:bodyPr wrap="square" rtlCol="0">
+            <a:spAutoFit/>
+          </a:bodyPr>
+          <a:lstStyle/>
+          <a:p>
+            <a:r>
+              <a:rPr lang="en-US" b="1" dirty="0"/>
+              <a:t>What is the output of a DFS traversal of this graph?</a:t>
+            </a:r>
+          </a:p>
+          <a:p>
+            <a:pPr lvl="5"/>
+            <a:r>
+              <a:rPr lang="en-US" u="sng" dirty="0"/>
+              <a:t>Discovered</a:t>
+            </a:r>
+            <a:r>
+              <a:rPr lang="en-US" dirty="0"/>
+              <a:t>	</a:t>
+            </a:r>
+            <a:r>
+              <a:rPr lang="en-US" u="sng" dirty="0"/>
+              <a:t>Processed</a:t>
+            </a:r>
+          </a:p>
+          <a:p>
+            <a:pPr lvl="5"/>
+            <a:r>
+              <a:rPr lang="en-US" sz="1600" b="1" dirty="0"/>
+              <a:t> [ </a:t>
+            </a:r>
+            <a:r>
+              <a:rPr lang="en-US" sz="1600" dirty="0"/>
+              <a:t>0 </a:t>
+            </a:r>
+            <a:r>
+              <a:rPr lang="en-US" sz="1600" b="1" dirty="0"/>
+              <a:t>] 		 []</a:t>
+            </a:r>
+          </a:p>
+          <a:p>
+            <a:pPr lvl="5"/>
+            <a:r>
+              <a:rPr lang="en-US" sz="1600" b="1" dirty="0"/>
+              <a:t> [ </a:t>
+            </a:r>
+            <a:r>
+              <a:rPr lang="en-US" sz="1600" dirty="0"/>
+              <a:t>5,4,1</a:t>
+            </a:r>
+            <a:r>
+              <a:rPr lang="en-US" sz="1600" b="1" dirty="0"/>
+              <a:t> ]    	 [ </a:t>
+            </a:r>
+            <a:r>
+              <a:rPr lang="en-US" sz="1600" dirty="0"/>
+              <a:t>0</a:t>
+            </a:r>
+            <a:r>
+              <a:rPr lang="en-US" sz="1600" b="1" dirty="0"/>
+              <a:t> ]</a:t>
+            </a:r>
+          </a:p>
+          <a:p>
+            <a:pPr lvl="5"/>
+            <a:r>
+              <a:rPr lang="en-US" sz="1600" b="1" dirty="0"/>
+              <a:t> [</a:t>
+            </a:r>
+            <a:r>
+              <a:rPr lang="en-US" sz="1600" dirty="0"/>
+              <a:t> 5,4, 3</a:t>
+            </a:r>
+            <a:r>
+              <a:rPr lang="en-US" sz="1600" b="1" dirty="0"/>
+              <a:t>]  	 	 [ </a:t>
+            </a:r>
+            <a:r>
+              <a:rPr lang="en-US" sz="1600" dirty="0"/>
+              <a:t>0, 1 </a:t>
+            </a:r>
+            <a:r>
+              <a:rPr lang="en-US" sz="1600" b="1" dirty="0"/>
+              <a:t>]</a:t>
+            </a:r>
+          </a:p>
+          <a:p>
+            <a:pPr lvl="5"/>
+            <a:r>
+              <a:rPr lang="en-US" sz="1600" b="1" dirty="0"/>
+              <a:t> [ </a:t>
+            </a:r>
+            <a:r>
+              <a:rPr lang="en-US" sz="1600" dirty="0"/>
+              <a:t>5,4, 2 </a:t>
+            </a:r>
+            <a:r>
+              <a:rPr lang="en-US" sz="1600" b="1" dirty="0"/>
+              <a:t>]      	 [ </a:t>
+            </a:r>
+            <a:r>
+              <a:rPr lang="en-US" sz="1600" dirty="0"/>
+              <a:t>0, 1, 3 </a:t>
+            </a:r>
+            <a:r>
+              <a:rPr lang="en-US" sz="1600" b="1" dirty="0"/>
+              <a:t>]</a:t>
+            </a:r>
+          </a:p>
+          <a:p>
+            <a:pPr lvl="5"/>
+            <a:r>
+              <a:rPr lang="en-US" sz="1600" b="1" dirty="0"/>
+              <a:t> [ </a:t>
+            </a:r>
+            <a:r>
+              <a:rPr lang="en-US" sz="1600" dirty="0"/>
+              <a:t>5,4</a:t>
+            </a:r>
+            <a:r>
+              <a:rPr lang="en-US" sz="1600" b="1" dirty="0"/>
+              <a:t> ]         	 [ </a:t>
+            </a:r>
+            <a:r>
+              <a:rPr lang="en-US" sz="1600" dirty="0"/>
+              <a:t>0, 1, 3, 2 </a:t>
+            </a:r>
+            <a:r>
+              <a:rPr lang="en-US" sz="1600" b="1" dirty="0"/>
+              <a:t>]</a:t>
+            </a:r>
+          </a:p>
+          <a:p>
+            <a:pPr lvl="5"/>
+            <a:r>
+              <a:rPr lang="en-US" sz="1600" b="1" dirty="0"/>
+              <a:t> [ </a:t>
+            </a:r>
+            <a:r>
+              <a:rPr lang="en-US" sz="1600" dirty="0"/>
+              <a:t>5</a:t>
+            </a:r>
+            <a:r>
+              <a:rPr lang="en-US" sz="1600" b="1" dirty="0"/>
+              <a:t> ]          	 [ </a:t>
+            </a:r>
+            <a:r>
+              <a:rPr lang="en-US" sz="1600" dirty="0"/>
+              <a:t>0, 1, 3, 2, 4 </a:t>
+            </a:r>
+            <a:r>
+              <a:rPr lang="en-US" sz="1600" b="1" dirty="0"/>
+              <a:t>]</a:t>
+            </a:r>
+          </a:p>
+          <a:p>
+            <a:pPr lvl="5"/>
+            <a:r>
+              <a:rPr lang="en-US" sz="1600" b="1" dirty="0"/>
+              <a:t> []              	 [ </a:t>
+            </a:r>
+            <a:r>
+              <a:rPr lang="en-US" sz="1600" dirty="0"/>
+              <a:t>0, 1, 3, 2, 4, 5 </a:t>
+            </a:r>
+            <a:r>
+              <a:rPr lang="en-US" sz="1600" b="1" dirty="0"/>
+              <a:t>]</a:t>
+            </a:r>
+            <a:endParaRPr lang="en-US" sz="1600" dirty="0"/>
+          </a:p>
+        </p:txBody>
+      </p:sp>
+      <p:sp>
+        <p:nvSpPr>
+          <p:cNvPr id="3" name="TextBox 2"/>
+          <p:cNvSpPr txBox="1"/>
+          <p:nvPr/>
+        </p:nvSpPr>
+        <p:spPr>
+          <a:xfrm>
+            <a:off x="7287327" y="4889494"/>
+            <a:ext cx="696024" cy="1754326"/>
+          </a:xfrm>
+          <a:prstGeom prst="rect">
+            <a:avLst/>
+          </a:prstGeom>
+          <a:noFill/>
+        </p:spPr>
+        <p:txBody>
+          <a:bodyPr wrap="none" rtlCol="0">
+            <a:spAutoFit/>
+          </a:bodyPr>
+          <a:lstStyle/>
+          <a:p>
+            <a:r>
+              <a:rPr lang="en-US" b="1" dirty="0" smtClean="0"/>
+              <a:t>0</a:t>
+            </a:r>
+          </a:p>
+          <a:p>
+            <a:r>
+              <a:rPr lang="en-US" b="1" dirty="0" smtClean="0"/>
+              <a:t>  1</a:t>
+            </a:r>
+          </a:p>
+          <a:p>
+            <a:r>
+              <a:rPr lang="en-US" b="1" dirty="0"/>
+              <a:t> </a:t>
+            </a:r>
+            <a:r>
+              <a:rPr lang="en-US" b="1" dirty="0" smtClean="0"/>
+              <a:t>   3</a:t>
+            </a:r>
+          </a:p>
+          <a:p>
+            <a:r>
+              <a:rPr lang="en-US" b="1" dirty="0"/>
+              <a:t> </a:t>
+            </a:r>
+            <a:r>
+              <a:rPr lang="en-US" b="1" dirty="0" smtClean="0"/>
+              <a:t>     2</a:t>
+            </a:r>
+          </a:p>
+          <a:p>
+            <a:r>
+              <a:rPr lang="en-US" b="1" dirty="0"/>
+              <a:t> </a:t>
+            </a:r>
+            <a:r>
+              <a:rPr lang="en-US" b="1" dirty="0" smtClean="0"/>
+              <a:t>   4</a:t>
+            </a:r>
+          </a:p>
+          <a:p>
+            <a:r>
+              <a:rPr lang="en-US" b="1" dirty="0" smtClean="0"/>
+              <a:t>5</a:t>
+            </a:r>
+            <a:endParaRPr lang="en-US" b="1" dirty="0"/>
+          </a:p>
+        </p:txBody>
+      </p:sp>
     </p:spTree>
     <p:extLst>
       <p:ext uri="{BB962C8B-B14F-4D97-AF65-F5344CB8AC3E}">
-        <p14:creationId xmlns:p14="http://schemas.microsoft.com/office/powerpoint/2010/main" val="3842887877"/>
+        <p14:creationId xmlns:p14="http://schemas.microsoft.com/office/powerpoint/2010/main" val="1396827793"/>
       </p:ext>
     </p:extLst>
   </p:cSld>
@@ -31534,7 +31443,14 @@
           <a:p>
             <a:r>
               <a:rPr lang="en-US" sz="3200" dirty="0"/>
-              <a:t>tidbits</a:t>
+              <a:t>implementation</a:t>
+            </a:r>
+            <a:br>
+              <a:rPr lang="en-US" sz="3200" dirty="0"/>
+            </a:br>
+            <a:r>
+              <a:rPr lang="en-US" sz="2000" b="1" dirty="0"/>
+              <a:t>DEPTH First Search (DFS)</a:t>
             </a:r>
             <a:endParaRPr lang="en-US" sz="2000" dirty="0"/>
           </a:p>
@@ -31554,8 +31470,8 @@
         </p:nvSpPr>
         <p:spPr>
           <a:xfrm>
-            <a:off x="2231137" y="2601640"/>
-            <a:ext cx="3820122" cy="1754326"/>
+            <a:off x="1251693" y="3390205"/>
+            <a:ext cx="4576597" cy="369332"/>
           </a:xfrm>
           <a:prstGeom prst="rect">
             <a:avLst/>
@@ -31570,145 +31486,653 @@
           <a:p>
             <a:r>
               <a:rPr lang="en-US" b="1" dirty="0"/>
-              <a:t>BFS </a:t>
-            </a:r>
-            <a:r>
-              <a:rPr lang="en-US" dirty="0"/>
-              <a:t>is awesome for finding shortest path between two nodes in an unweighted graph.</a:t>
-            </a:r>
-          </a:p>
-          <a:p>
+              <a:t>CODEALONG!</a:t>
+            </a:r>
             <a:endParaRPr lang="en-US" dirty="0"/>
           </a:p>
-          <a:p>
-            <a:r>
-              <a:rPr lang="en-US" b="1" dirty="0"/>
-              <a:t>BFS </a:t>
-            </a:r>
-            <a:r>
-              <a:rPr lang="en-US" dirty="0"/>
-              <a:t>– think of queues and iterative implementation.</a:t>
-            </a:r>
-            <a:endParaRPr lang="en-US" b="1" dirty="0"/>
-          </a:p>
-        </p:txBody>
-      </p:sp>
-      <p:sp>
-        <p:nvSpPr>
-          <p:cNvPr id="26" name="TextBox 25">
-            <a:extLst>
-              <a:ext uri="{FF2B5EF4-FFF2-40B4-BE49-F238E27FC236}">
-                <a16:creationId xmlns:a16="http://schemas.microsoft.com/office/drawing/2014/main" xmlns="" id="{AEA3CE33-3193-4A10-B752-AF0D734241BC}"/>
-              </a:ext>
-            </a:extLst>
-          </p:cNvPr>
-          <p:cNvSpPr txBox="1"/>
-          <p:nvPr/>
-        </p:nvSpPr>
-        <p:spPr>
-          <a:xfrm>
-            <a:off x="6051259" y="2601640"/>
-            <a:ext cx="3909605" cy="1477328"/>
-          </a:xfrm>
-          <a:prstGeom prst="rect">
-            <a:avLst/>
-          </a:prstGeom>
-          <a:noFill/>
-        </p:spPr>
-        <p:txBody>
-          <a:bodyPr wrap="square" rtlCol="0">
-            <a:spAutoFit/>
-          </a:bodyPr>
-          <a:lstStyle/>
-          <a:p>
-            <a:r>
-              <a:rPr lang="en-US" b="1" dirty="0"/>
-              <a:t>DFS </a:t>
-            </a:r>
-            <a:r>
-              <a:rPr lang="en-US" dirty="0"/>
-              <a:t>is awesome for going through each node. Technically doable with either BFS/DFS though.</a:t>
-            </a:r>
-          </a:p>
-          <a:p>
-            <a:endParaRPr lang="en-US" dirty="0"/>
-          </a:p>
-          <a:p>
-            <a:r>
-              <a:rPr lang="en-US" b="1" dirty="0"/>
-              <a:t>DFS </a:t>
-            </a:r>
-            <a:r>
-              <a:rPr lang="en-US" dirty="0"/>
-              <a:t>– think of stacks/recursion.</a:t>
-            </a:r>
-            <a:endParaRPr lang="en-US" b="1" dirty="0"/>
-          </a:p>
-        </p:txBody>
-      </p:sp>
-      <p:sp>
-        <p:nvSpPr>
-          <p:cNvPr id="3" name="TextBox 2">
-            <a:extLst>
-              <a:ext uri="{FF2B5EF4-FFF2-40B4-BE49-F238E27FC236}">
-                <a16:creationId xmlns:a16="http://schemas.microsoft.com/office/drawing/2014/main" xmlns="" id="{0E019EA2-B23D-4DDF-B114-6802B3C7FF2C}"/>
-              </a:ext>
-            </a:extLst>
-          </p:cNvPr>
-          <p:cNvSpPr txBox="1"/>
-          <p:nvPr/>
-        </p:nvSpPr>
-        <p:spPr>
-          <a:xfrm>
-            <a:off x="2231136" y="5063735"/>
-            <a:ext cx="7790079" cy="1477328"/>
-          </a:xfrm>
-          <a:prstGeom prst="rect">
-            <a:avLst/>
-          </a:prstGeom>
-          <a:noFill/>
-        </p:spPr>
-        <p:txBody>
-          <a:bodyPr wrap="square" rtlCol="0">
-            <a:spAutoFit/>
-          </a:bodyPr>
+        </p:txBody>
+      </p:sp>
+      <p:sp>
+        <p:nvSpPr>
+          <p:cNvPr id="18" name="Oval 17">
+            <a:extLst>
+              <a:ext uri="{FF2B5EF4-FFF2-40B4-BE49-F238E27FC236}">
+                <a16:creationId xmlns:a16="http://schemas.microsoft.com/office/drawing/2014/main" xmlns="" id="{E3A70C93-FBFE-4C6B-9718-B3E23D7AF78C}"/>
+              </a:ext>
+            </a:extLst>
+          </p:cNvPr>
+          <p:cNvSpPr/>
+          <p:nvPr/>
+        </p:nvSpPr>
+        <p:spPr>
+          <a:xfrm>
+            <a:off x="6195467" y="2519614"/>
+            <a:ext cx="1091860" cy="906011"/>
+          </a:xfrm>
+          <a:prstGeom prst="ellipse">
+            <a:avLst/>
+          </a:prstGeom>
+        </p:spPr>
+        <p:style>
+          <a:lnRef idx="2">
+            <a:schemeClr val="accent1">
+              <a:shade val="50000"/>
+            </a:schemeClr>
+          </a:lnRef>
+          <a:fillRef idx="1">
+            <a:schemeClr val="accent1"/>
+          </a:fillRef>
+          <a:effectRef idx="0">
+            <a:schemeClr val="accent1"/>
+          </a:effectRef>
+          <a:fontRef idx="minor">
+            <a:schemeClr val="lt1"/>
+          </a:fontRef>
+        </p:style>
+        <p:txBody>
+          <a:bodyPr rtlCol="0" anchor="ctr"/>
           <a:lstStyle/>
           <a:p>
             <a:pPr algn="ctr"/>
             <a:r>
-              <a:rPr lang="en-US" dirty="0"/>
-              <a:t>For implementation, the way we track the processed nodes doesn’t matter. But the way we track the discovered nodes does.</a:t>
-            </a:r>
-          </a:p>
+              <a:rPr lang="en-US" sz="1400" dirty="0"/>
+              <a:t>0</a:t>
+            </a:r>
+          </a:p>
+        </p:txBody>
+      </p:sp>
+      <p:sp>
+        <p:nvSpPr>
+          <p:cNvPr id="19" name="Oval 18">
+            <a:extLst>
+              <a:ext uri="{FF2B5EF4-FFF2-40B4-BE49-F238E27FC236}">
+                <a16:creationId xmlns:a16="http://schemas.microsoft.com/office/drawing/2014/main" xmlns="" id="{A9D8A195-C61E-45AF-8911-D48B6D5EFA63}"/>
+              </a:ext>
+            </a:extLst>
+          </p:cNvPr>
+          <p:cNvSpPr/>
+          <p:nvPr/>
+        </p:nvSpPr>
+        <p:spPr>
+          <a:xfrm>
+            <a:off x="7766536" y="3759537"/>
+            <a:ext cx="1091860" cy="906011"/>
+          </a:xfrm>
+          <a:prstGeom prst="ellipse">
+            <a:avLst/>
+          </a:prstGeom>
+        </p:spPr>
+        <p:style>
+          <a:lnRef idx="2">
+            <a:schemeClr val="accent1">
+              <a:shade val="50000"/>
+            </a:schemeClr>
+          </a:lnRef>
+          <a:fillRef idx="1">
+            <a:schemeClr val="accent1"/>
+          </a:fillRef>
+          <a:effectRef idx="0">
+            <a:schemeClr val="accent1"/>
+          </a:effectRef>
+          <a:fontRef idx="minor">
+            <a:schemeClr val="lt1"/>
+          </a:fontRef>
+        </p:style>
+        <p:txBody>
+          <a:bodyPr rtlCol="0" anchor="ctr"/>
+          <a:lstStyle/>
           <a:p>
             <a:pPr algn="ctr"/>
-            <a:endParaRPr lang="en-US" dirty="0"/>
-          </a:p>
+            <a:r>
+              <a:rPr lang="en-US" sz="1400" dirty="0"/>
+              <a:t>4</a:t>
+            </a:r>
+          </a:p>
+        </p:txBody>
+      </p:sp>
+      <p:sp>
+        <p:nvSpPr>
+          <p:cNvPr id="20" name="Oval 19">
+            <a:extLst>
+              <a:ext uri="{FF2B5EF4-FFF2-40B4-BE49-F238E27FC236}">
+                <a16:creationId xmlns:a16="http://schemas.microsoft.com/office/drawing/2014/main" xmlns="" id="{2530DC6F-0310-49DD-B461-F5E79C06D842}"/>
+              </a:ext>
+            </a:extLst>
+          </p:cNvPr>
+          <p:cNvSpPr/>
+          <p:nvPr/>
+        </p:nvSpPr>
+        <p:spPr>
+          <a:xfrm>
+            <a:off x="7747682" y="2519614"/>
+            <a:ext cx="1091860" cy="906011"/>
+          </a:xfrm>
+          <a:prstGeom prst="ellipse">
+            <a:avLst/>
+          </a:prstGeom>
+        </p:spPr>
+        <p:style>
+          <a:lnRef idx="2">
+            <a:schemeClr val="accent1">
+              <a:shade val="50000"/>
+            </a:schemeClr>
+          </a:lnRef>
+          <a:fillRef idx="1">
+            <a:schemeClr val="accent1"/>
+          </a:fillRef>
+          <a:effectRef idx="0">
+            <a:schemeClr val="accent1"/>
+          </a:effectRef>
+          <a:fontRef idx="minor">
+            <a:schemeClr val="lt1"/>
+          </a:fontRef>
+        </p:style>
+        <p:txBody>
+          <a:bodyPr rtlCol="0" anchor="ctr"/>
+          <a:lstStyle/>
           <a:p>
             <a:pPr algn="ctr"/>
             <a:r>
-              <a:rPr lang="en-US" dirty="0"/>
-              <a:t>With BFS, use a </a:t>
-            </a:r>
-            <a:r>
-              <a:rPr lang="en-US" dirty="0" smtClean="0"/>
-              <a:t>queue.</a:t>
-            </a:r>
-            <a:endParaRPr lang="en-US" dirty="0"/>
-          </a:p>
+              <a:rPr lang="en-US" sz="1400" dirty="0"/>
+              <a:t>1</a:t>
+            </a:r>
+          </a:p>
+        </p:txBody>
+      </p:sp>
+      <p:sp>
+        <p:nvSpPr>
+          <p:cNvPr id="21" name="Oval 20">
+            <a:extLst>
+              <a:ext uri="{FF2B5EF4-FFF2-40B4-BE49-F238E27FC236}">
+                <a16:creationId xmlns:a16="http://schemas.microsoft.com/office/drawing/2014/main" xmlns="" id="{2D30383C-AFC4-4EF5-A144-B7D7383317B0}"/>
+              </a:ext>
+            </a:extLst>
+          </p:cNvPr>
+          <p:cNvSpPr/>
+          <p:nvPr/>
+        </p:nvSpPr>
+        <p:spPr>
+          <a:xfrm>
+            <a:off x="9318751" y="3759537"/>
+            <a:ext cx="1091860" cy="906011"/>
+          </a:xfrm>
+          <a:prstGeom prst="ellipse">
+            <a:avLst/>
+          </a:prstGeom>
+        </p:spPr>
+        <p:style>
+          <a:lnRef idx="2">
+            <a:schemeClr val="accent1">
+              <a:shade val="50000"/>
+            </a:schemeClr>
+          </a:lnRef>
+          <a:fillRef idx="1">
+            <a:schemeClr val="accent1"/>
+          </a:fillRef>
+          <a:effectRef idx="0">
+            <a:schemeClr val="accent1"/>
+          </a:effectRef>
+          <a:fontRef idx="minor">
+            <a:schemeClr val="lt1"/>
+          </a:fontRef>
+        </p:style>
+        <p:txBody>
+          <a:bodyPr rtlCol="0" anchor="ctr"/>
+          <a:lstStyle/>
           <a:p>
             <a:pPr algn="ctr"/>
             <a:r>
-              <a:rPr lang="en-US" dirty="0"/>
-              <a:t>With DFS, use a stack.</a:t>
-            </a:r>
-          </a:p>
-        </p:txBody>
-      </p:sp>
+              <a:rPr lang="en-US" sz="1400" dirty="0"/>
+              <a:t>3</a:t>
+            </a:r>
+          </a:p>
+        </p:txBody>
+      </p:sp>
+      <p:sp>
+        <p:nvSpPr>
+          <p:cNvPr id="22" name="Oval 21">
+            <a:extLst>
+              <a:ext uri="{FF2B5EF4-FFF2-40B4-BE49-F238E27FC236}">
+                <a16:creationId xmlns:a16="http://schemas.microsoft.com/office/drawing/2014/main" xmlns="" id="{B7933EEF-65C0-4D7E-8EDC-F9EC80CC53A9}"/>
+              </a:ext>
+            </a:extLst>
+          </p:cNvPr>
+          <p:cNvSpPr/>
+          <p:nvPr/>
+        </p:nvSpPr>
+        <p:spPr>
+          <a:xfrm>
+            <a:off x="6214321" y="3759537"/>
+            <a:ext cx="1091860" cy="906011"/>
+          </a:xfrm>
+          <a:prstGeom prst="ellipse">
+            <a:avLst/>
+          </a:prstGeom>
+        </p:spPr>
+        <p:style>
+          <a:lnRef idx="2">
+            <a:schemeClr val="accent1">
+              <a:shade val="50000"/>
+            </a:schemeClr>
+          </a:lnRef>
+          <a:fillRef idx="1">
+            <a:schemeClr val="accent1"/>
+          </a:fillRef>
+          <a:effectRef idx="0">
+            <a:schemeClr val="accent1"/>
+          </a:effectRef>
+          <a:fontRef idx="minor">
+            <a:schemeClr val="lt1"/>
+          </a:fontRef>
+        </p:style>
+        <p:txBody>
+          <a:bodyPr rtlCol="0" anchor="ctr"/>
+          <a:lstStyle/>
+          <a:p>
+            <a:pPr algn="ctr"/>
+            <a:r>
+              <a:rPr lang="en-US" sz="1400" dirty="0"/>
+              <a:t>5</a:t>
+            </a:r>
+          </a:p>
+        </p:txBody>
+      </p:sp>
+      <p:sp>
+        <p:nvSpPr>
+          <p:cNvPr id="23" name="Oval 22">
+            <a:extLst>
+              <a:ext uri="{FF2B5EF4-FFF2-40B4-BE49-F238E27FC236}">
+                <a16:creationId xmlns:a16="http://schemas.microsoft.com/office/drawing/2014/main" xmlns="" id="{ACBC3861-7CD0-492B-A8F2-5D5897647B0E}"/>
+              </a:ext>
+            </a:extLst>
+          </p:cNvPr>
+          <p:cNvSpPr/>
+          <p:nvPr/>
+        </p:nvSpPr>
+        <p:spPr>
+          <a:xfrm>
+            <a:off x="9303029" y="2519614"/>
+            <a:ext cx="1091860" cy="906011"/>
+          </a:xfrm>
+          <a:prstGeom prst="ellipse">
+            <a:avLst/>
+          </a:prstGeom>
+        </p:spPr>
+        <p:style>
+          <a:lnRef idx="2">
+            <a:schemeClr val="accent1">
+              <a:shade val="50000"/>
+            </a:schemeClr>
+          </a:lnRef>
+          <a:fillRef idx="1">
+            <a:schemeClr val="accent1"/>
+          </a:fillRef>
+          <a:effectRef idx="0">
+            <a:schemeClr val="accent1"/>
+          </a:effectRef>
+          <a:fontRef idx="minor">
+            <a:schemeClr val="lt1"/>
+          </a:fontRef>
+        </p:style>
+        <p:txBody>
+          <a:bodyPr rtlCol="0" anchor="ctr"/>
+          <a:lstStyle/>
+          <a:p>
+            <a:pPr algn="ctr"/>
+            <a:r>
+              <a:rPr lang="en-US" sz="1400" dirty="0"/>
+              <a:t>2</a:t>
+            </a:r>
+          </a:p>
+        </p:txBody>
+      </p:sp>
+      <p:cxnSp>
+        <p:nvCxnSpPr>
+          <p:cNvPr id="24" name="Straight Arrow Connector 23">
+            <a:extLst>
+              <a:ext uri="{FF2B5EF4-FFF2-40B4-BE49-F238E27FC236}">
+                <a16:creationId xmlns:a16="http://schemas.microsoft.com/office/drawing/2014/main" xmlns="" id="{BD2AC117-99A4-4902-86EA-A6FFA7DC4319}"/>
+              </a:ext>
+            </a:extLst>
+          </p:cNvPr>
+          <p:cNvCxnSpPr>
+            <a:stCxn id="18" idx="4"/>
+            <a:endCxn id="22" idx="0"/>
+          </p:cNvCxnSpPr>
+          <p:nvPr/>
+        </p:nvCxnSpPr>
+        <p:spPr>
+          <a:xfrm>
+            <a:off x="6741397" y="3425625"/>
+            <a:ext cx="18854" cy="333912"/>
+          </a:xfrm>
+          <a:prstGeom prst="straightConnector1">
+            <a:avLst/>
+          </a:prstGeom>
+          <a:ln>
+            <a:tailEnd type="triangle"/>
+          </a:ln>
+        </p:spPr>
+        <p:style>
+          <a:lnRef idx="1">
+            <a:schemeClr val="accent1"/>
+          </a:lnRef>
+          <a:fillRef idx="0">
+            <a:schemeClr val="accent1"/>
+          </a:fillRef>
+          <a:effectRef idx="0">
+            <a:schemeClr val="accent1"/>
+          </a:effectRef>
+          <a:fontRef idx="minor">
+            <a:schemeClr val="tx1"/>
+          </a:fontRef>
+        </p:style>
+      </p:cxnSp>
+      <p:cxnSp>
+        <p:nvCxnSpPr>
+          <p:cNvPr id="25" name="Straight Arrow Connector 24">
+            <a:extLst>
+              <a:ext uri="{FF2B5EF4-FFF2-40B4-BE49-F238E27FC236}">
+                <a16:creationId xmlns:a16="http://schemas.microsoft.com/office/drawing/2014/main" xmlns="" id="{DA3EDF12-09A3-47E6-94BF-4D56401E8BC1}"/>
+              </a:ext>
+            </a:extLst>
+          </p:cNvPr>
+          <p:cNvCxnSpPr>
+            <a:cxnSpLocks/>
+            <a:stCxn id="18" idx="5"/>
+            <a:endCxn id="19" idx="1"/>
+          </p:cNvCxnSpPr>
+          <p:nvPr/>
+        </p:nvCxnSpPr>
+        <p:spPr>
+          <a:xfrm>
+            <a:off x="7127428" y="3292943"/>
+            <a:ext cx="799007" cy="599276"/>
+          </a:xfrm>
+          <a:prstGeom prst="straightConnector1">
+            <a:avLst/>
+          </a:prstGeom>
+          <a:ln>
+            <a:tailEnd type="triangle"/>
+          </a:ln>
+        </p:spPr>
+        <p:style>
+          <a:lnRef idx="1">
+            <a:schemeClr val="accent1"/>
+          </a:lnRef>
+          <a:fillRef idx="0">
+            <a:schemeClr val="accent1"/>
+          </a:fillRef>
+          <a:effectRef idx="0">
+            <a:schemeClr val="accent1"/>
+          </a:effectRef>
+          <a:fontRef idx="minor">
+            <a:schemeClr val="tx1"/>
+          </a:fontRef>
+        </p:style>
+      </p:cxnSp>
+      <p:cxnSp>
+        <p:nvCxnSpPr>
+          <p:cNvPr id="28" name="Straight Arrow Connector 27">
+            <a:extLst>
+              <a:ext uri="{FF2B5EF4-FFF2-40B4-BE49-F238E27FC236}">
+                <a16:creationId xmlns:a16="http://schemas.microsoft.com/office/drawing/2014/main" xmlns="" id="{3EF20996-34DB-42A5-BA07-F3C4B821C43B}"/>
+              </a:ext>
+            </a:extLst>
+          </p:cNvPr>
+          <p:cNvCxnSpPr>
+            <a:cxnSpLocks/>
+            <a:stCxn id="18" idx="6"/>
+            <a:endCxn id="20" idx="2"/>
+          </p:cNvCxnSpPr>
+          <p:nvPr/>
+        </p:nvCxnSpPr>
+        <p:spPr>
+          <a:xfrm>
+            <a:off x="7287327" y="2972620"/>
+            <a:ext cx="460355" cy="0"/>
+          </a:xfrm>
+          <a:prstGeom prst="straightConnector1">
+            <a:avLst/>
+          </a:prstGeom>
+          <a:ln>
+            <a:tailEnd type="triangle"/>
+          </a:ln>
+        </p:spPr>
+        <p:style>
+          <a:lnRef idx="1">
+            <a:schemeClr val="accent1"/>
+          </a:lnRef>
+          <a:fillRef idx="0">
+            <a:schemeClr val="accent1"/>
+          </a:fillRef>
+          <a:effectRef idx="0">
+            <a:schemeClr val="accent1"/>
+          </a:effectRef>
+          <a:fontRef idx="minor">
+            <a:schemeClr val="tx1"/>
+          </a:fontRef>
+        </p:style>
+      </p:cxnSp>
+      <p:cxnSp>
+        <p:nvCxnSpPr>
+          <p:cNvPr id="32" name="Straight Arrow Connector 31">
+            <a:extLst>
+              <a:ext uri="{FF2B5EF4-FFF2-40B4-BE49-F238E27FC236}">
+                <a16:creationId xmlns:a16="http://schemas.microsoft.com/office/drawing/2014/main" xmlns="" id="{03765C78-6E44-42E8-A389-88D3C0C77CD7}"/>
+              </a:ext>
+            </a:extLst>
+          </p:cNvPr>
+          <p:cNvCxnSpPr>
+            <a:cxnSpLocks/>
+            <a:stCxn id="20" idx="4"/>
+            <a:endCxn id="19" idx="0"/>
+          </p:cNvCxnSpPr>
+          <p:nvPr/>
+        </p:nvCxnSpPr>
+        <p:spPr>
+          <a:xfrm>
+            <a:off x="8293612" y="3425625"/>
+            <a:ext cx="18854" cy="333912"/>
+          </a:xfrm>
+          <a:prstGeom prst="straightConnector1">
+            <a:avLst/>
+          </a:prstGeom>
+          <a:ln>
+            <a:tailEnd type="triangle"/>
+          </a:ln>
+        </p:spPr>
+        <p:style>
+          <a:lnRef idx="1">
+            <a:schemeClr val="accent1"/>
+          </a:lnRef>
+          <a:fillRef idx="0">
+            <a:schemeClr val="accent1"/>
+          </a:fillRef>
+          <a:effectRef idx="0">
+            <a:schemeClr val="accent1"/>
+          </a:effectRef>
+          <a:fontRef idx="minor">
+            <a:schemeClr val="tx1"/>
+          </a:fontRef>
+        </p:style>
+      </p:cxnSp>
+      <p:cxnSp>
+        <p:nvCxnSpPr>
+          <p:cNvPr id="35" name="Straight Arrow Connector 34">
+            <a:extLst>
+              <a:ext uri="{FF2B5EF4-FFF2-40B4-BE49-F238E27FC236}">
+                <a16:creationId xmlns:a16="http://schemas.microsoft.com/office/drawing/2014/main" xmlns="" id="{7856A272-8E7D-4F00-A51D-8615A11FB3C6}"/>
+              </a:ext>
+            </a:extLst>
+          </p:cNvPr>
+          <p:cNvCxnSpPr>
+            <a:cxnSpLocks/>
+            <a:stCxn id="20" idx="5"/>
+            <a:endCxn id="21" idx="1"/>
+          </p:cNvCxnSpPr>
+          <p:nvPr/>
+        </p:nvCxnSpPr>
+        <p:spPr>
+          <a:xfrm>
+            <a:off x="8679643" y="3292943"/>
+            <a:ext cx="799007" cy="599276"/>
+          </a:xfrm>
+          <a:prstGeom prst="straightConnector1">
+            <a:avLst/>
+          </a:prstGeom>
+          <a:ln>
+            <a:tailEnd type="triangle"/>
+          </a:ln>
+        </p:spPr>
+        <p:style>
+          <a:lnRef idx="1">
+            <a:schemeClr val="accent1"/>
+          </a:lnRef>
+          <a:fillRef idx="0">
+            <a:schemeClr val="accent1"/>
+          </a:fillRef>
+          <a:effectRef idx="0">
+            <a:schemeClr val="accent1"/>
+          </a:effectRef>
+          <a:fontRef idx="minor">
+            <a:schemeClr val="tx1"/>
+          </a:fontRef>
+        </p:style>
+      </p:cxnSp>
+      <p:cxnSp>
+        <p:nvCxnSpPr>
+          <p:cNvPr id="38" name="Straight Arrow Connector 37">
+            <a:extLst>
+              <a:ext uri="{FF2B5EF4-FFF2-40B4-BE49-F238E27FC236}">
+                <a16:creationId xmlns:a16="http://schemas.microsoft.com/office/drawing/2014/main" xmlns="" id="{8F292BE1-F59D-4B85-A0E1-7132A3805CF7}"/>
+              </a:ext>
+            </a:extLst>
+          </p:cNvPr>
+          <p:cNvCxnSpPr>
+            <a:cxnSpLocks/>
+            <a:stCxn id="21" idx="2"/>
+            <a:endCxn id="19" idx="6"/>
+          </p:cNvCxnSpPr>
+          <p:nvPr/>
+        </p:nvCxnSpPr>
+        <p:spPr>
+          <a:xfrm flipH="1">
+            <a:off x="8858396" y="4212543"/>
+            <a:ext cx="460355" cy="0"/>
+          </a:xfrm>
+          <a:prstGeom prst="straightConnector1">
+            <a:avLst/>
+          </a:prstGeom>
+          <a:ln>
+            <a:tailEnd type="triangle"/>
+          </a:ln>
+        </p:spPr>
+        <p:style>
+          <a:lnRef idx="1">
+            <a:schemeClr val="accent1"/>
+          </a:lnRef>
+          <a:fillRef idx="0">
+            <a:schemeClr val="accent1"/>
+          </a:fillRef>
+          <a:effectRef idx="0">
+            <a:schemeClr val="accent1"/>
+          </a:effectRef>
+          <a:fontRef idx="minor">
+            <a:schemeClr val="tx1"/>
+          </a:fontRef>
+        </p:style>
+      </p:cxnSp>
+      <p:cxnSp>
+        <p:nvCxnSpPr>
+          <p:cNvPr id="43" name="Straight Arrow Connector 42">
+            <a:extLst>
+              <a:ext uri="{FF2B5EF4-FFF2-40B4-BE49-F238E27FC236}">
+                <a16:creationId xmlns:a16="http://schemas.microsoft.com/office/drawing/2014/main" xmlns="" id="{EAB267AB-B304-4A9B-8571-FB119ECDBD6D}"/>
+              </a:ext>
+            </a:extLst>
+          </p:cNvPr>
+          <p:cNvCxnSpPr>
+            <a:cxnSpLocks/>
+            <a:stCxn id="21" idx="0"/>
+            <a:endCxn id="23" idx="4"/>
+          </p:cNvCxnSpPr>
+          <p:nvPr/>
+        </p:nvCxnSpPr>
+        <p:spPr>
+          <a:xfrm flipH="1" flipV="1">
+            <a:off x="9848959" y="3425625"/>
+            <a:ext cx="15722" cy="333912"/>
+          </a:xfrm>
+          <a:prstGeom prst="straightConnector1">
+            <a:avLst/>
+          </a:prstGeom>
+          <a:ln>
+            <a:tailEnd type="triangle"/>
+          </a:ln>
+        </p:spPr>
+        <p:style>
+          <a:lnRef idx="1">
+            <a:schemeClr val="accent1"/>
+          </a:lnRef>
+          <a:fillRef idx="0">
+            <a:schemeClr val="accent1"/>
+          </a:fillRef>
+          <a:effectRef idx="0">
+            <a:schemeClr val="accent1"/>
+          </a:effectRef>
+          <a:fontRef idx="minor">
+            <a:schemeClr val="tx1"/>
+          </a:fontRef>
+        </p:style>
+      </p:cxnSp>
+      <p:cxnSp>
+        <p:nvCxnSpPr>
+          <p:cNvPr id="46" name="Straight Arrow Connector 45">
+            <a:extLst>
+              <a:ext uri="{FF2B5EF4-FFF2-40B4-BE49-F238E27FC236}">
+                <a16:creationId xmlns:a16="http://schemas.microsoft.com/office/drawing/2014/main" xmlns="" id="{F90FF63D-F398-4F70-A13B-B076C40D0D95}"/>
+              </a:ext>
+            </a:extLst>
+          </p:cNvPr>
+          <p:cNvCxnSpPr>
+            <a:cxnSpLocks/>
+            <a:stCxn id="23" idx="2"/>
+            <a:endCxn id="20" idx="6"/>
+          </p:cNvCxnSpPr>
+          <p:nvPr/>
+        </p:nvCxnSpPr>
+        <p:spPr>
+          <a:xfrm flipH="1">
+            <a:off x="8839542" y="2972620"/>
+            <a:ext cx="463487" cy="0"/>
+          </a:xfrm>
+          <a:prstGeom prst="straightConnector1">
+            <a:avLst/>
+          </a:prstGeom>
+          <a:ln>
+            <a:tailEnd type="triangle"/>
+          </a:ln>
+        </p:spPr>
+        <p:style>
+          <a:lnRef idx="1">
+            <a:schemeClr val="accent1"/>
+          </a:lnRef>
+          <a:fillRef idx="0">
+            <a:schemeClr val="accent1"/>
+          </a:fillRef>
+          <a:effectRef idx="0">
+            <a:schemeClr val="accent1"/>
+          </a:effectRef>
+          <a:fontRef idx="minor">
+            <a:schemeClr val="tx1"/>
+          </a:fontRef>
+        </p:style>
+      </p:cxnSp>
     </p:spTree>
     <p:extLst>
       <p:ext uri="{BB962C8B-B14F-4D97-AF65-F5344CB8AC3E}">
-        <p14:creationId xmlns:p14="http://schemas.microsoft.com/office/powerpoint/2010/main" val="3532886450"/>
+        <p14:creationId xmlns:p14="http://schemas.microsoft.com/office/powerpoint/2010/main" val="3842887877"/>
       </p:ext>
     </p:extLst>
   </p:cSld>
@@ -31737,6 +32161,232 @@
       </p:grpSpPr>
       <p:sp>
         <p:nvSpPr>
+          <p:cNvPr id="2" name="Title 1">
+            <a:extLst>
+              <a:ext uri="{FF2B5EF4-FFF2-40B4-BE49-F238E27FC236}">
+                <a16:creationId xmlns:a16="http://schemas.microsoft.com/office/drawing/2014/main" xmlns="" id="{EA0A0B80-C671-45FE-AD43-BCCECA327249}"/>
+              </a:ext>
+            </a:extLst>
+          </p:cNvPr>
+          <p:cNvSpPr>
+            <a:spLocks noGrp="1"/>
+          </p:cNvSpPr>
+          <p:nvPr>
+            <p:ph type="title"/>
+          </p:nvPr>
+        </p:nvSpPr>
+        <p:spPr/>
+        <p:txBody>
+          <a:bodyPr>
+            <a:noAutofit/>
+          </a:bodyPr>
+          <a:lstStyle/>
+          <a:p>
+            <a:r>
+              <a:rPr lang="en-US" sz="3200" dirty="0"/>
+              <a:t>tidbits</a:t>
+            </a:r>
+            <a:endParaRPr lang="en-US" sz="2000" dirty="0"/>
+          </a:p>
+        </p:txBody>
+      </p:sp>
+      <p:sp>
+        <p:nvSpPr>
+          <p:cNvPr id="4" name="TextBox 3">
+            <a:extLst>
+              <a:ext uri="{FF2B5EF4-FFF2-40B4-BE49-F238E27FC236}">
+                <a16:creationId xmlns:a16="http://schemas.microsoft.com/office/drawing/2014/main" xmlns="" id="{FC83256C-DAFE-4855-A791-481784FAD0A6}"/>
+              </a:ext>
+            </a:extLst>
+          </p:cNvPr>
+          <p:cNvSpPr txBox="1"/>
+          <p:nvPr/>
+        </p:nvSpPr>
+        <p:spPr>
+          <a:xfrm>
+            <a:off x="2231137" y="2601640"/>
+            <a:ext cx="3820122" cy="1754326"/>
+          </a:xfrm>
+          <a:prstGeom prst="rect">
+            <a:avLst/>
+          </a:prstGeom>
+          <a:noFill/>
+        </p:spPr>
+        <p:txBody>
+          <a:bodyPr wrap="square" rtlCol="0">
+            <a:spAutoFit/>
+          </a:bodyPr>
+          <a:lstStyle/>
+          <a:p>
+            <a:r>
+              <a:rPr lang="en-US" b="1" dirty="0"/>
+              <a:t>BFS </a:t>
+            </a:r>
+            <a:r>
+              <a:rPr lang="en-US" dirty="0"/>
+              <a:t>is awesome for finding shortest path between two nodes in an unweighted graph.</a:t>
+            </a:r>
+          </a:p>
+          <a:p>
+            <a:endParaRPr lang="en-US" dirty="0"/>
+          </a:p>
+          <a:p>
+            <a:r>
+              <a:rPr lang="en-US" b="1" dirty="0"/>
+              <a:t>BFS </a:t>
+            </a:r>
+            <a:r>
+              <a:rPr lang="en-US" dirty="0"/>
+              <a:t>– think of queues and iterative implementation.</a:t>
+            </a:r>
+            <a:endParaRPr lang="en-US" b="1" dirty="0"/>
+          </a:p>
+        </p:txBody>
+      </p:sp>
+      <p:sp>
+        <p:nvSpPr>
+          <p:cNvPr id="26" name="TextBox 25">
+            <a:extLst>
+              <a:ext uri="{FF2B5EF4-FFF2-40B4-BE49-F238E27FC236}">
+                <a16:creationId xmlns:a16="http://schemas.microsoft.com/office/drawing/2014/main" xmlns="" id="{AEA3CE33-3193-4A10-B752-AF0D734241BC}"/>
+              </a:ext>
+            </a:extLst>
+          </p:cNvPr>
+          <p:cNvSpPr txBox="1"/>
+          <p:nvPr/>
+        </p:nvSpPr>
+        <p:spPr>
+          <a:xfrm>
+            <a:off x="6051259" y="2601640"/>
+            <a:ext cx="3909605" cy="1477328"/>
+          </a:xfrm>
+          <a:prstGeom prst="rect">
+            <a:avLst/>
+          </a:prstGeom>
+          <a:noFill/>
+        </p:spPr>
+        <p:txBody>
+          <a:bodyPr wrap="square" rtlCol="0">
+            <a:spAutoFit/>
+          </a:bodyPr>
+          <a:lstStyle/>
+          <a:p>
+            <a:r>
+              <a:rPr lang="en-US" b="1" dirty="0"/>
+              <a:t>DFS </a:t>
+            </a:r>
+            <a:r>
+              <a:rPr lang="en-US" dirty="0"/>
+              <a:t>is awesome for going through each node. Technically doable with either BFS/DFS though.</a:t>
+            </a:r>
+          </a:p>
+          <a:p>
+            <a:endParaRPr lang="en-US" dirty="0"/>
+          </a:p>
+          <a:p>
+            <a:r>
+              <a:rPr lang="en-US" b="1" dirty="0"/>
+              <a:t>DFS </a:t>
+            </a:r>
+            <a:r>
+              <a:rPr lang="en-US" dirty="0"/>
+              <a:t>– think of stacks/recursion.</a:t>
+            </a:r>
+            <a:endParaRPr lang="en-US" b="1" dirty="0"/>
+          </a:p>
+        </p:txBody>
+      </p:sp>
+      <p:sp>
+        <p:nvSpPr>
+          <p:cNvPr id="3" name="TextBox 2">
+            <a:extLst>
+              <a:ext uri="{FF2B5EF4-FFF2-40B4-BE49-F238E27FC236}">
+                <a16:creationId xmlns:a16="http://schemas.microsoft.com/office/drawing/2014/main" xmlns="" id="{0E019EA2-B23D-4DDF-B114-6802B3C7FF2C}"/>
+              </a:ext>
+            </a:extLst>
+          </p:cNvPr>
+          <p:cNvSpPr txBox="1"/>
+          <p:nvPr/>
+        </p:nvSpPr>
+        <p:spPr>
+          <a:xfrm>
+            <a:off x="2231136" y="5063735"/>
+            <a:ext cx="7790079" cy="1477328"/>
+          </a:xfrm>
+          <a:prstGeom prst="rect">
+            <a:avLst/>
+          </a:prstGeom>
+          <a:noFill/>
+        </p:spPr>
+        <p:txBody>
+          <a:bodyPr wrap="square" rtlCol="0">
+            <a:spAutoFit/>
+          </a:bodyPr>
+          <a:lstStyle/>
+          <a:p>
+            <a:pPr algn="ctr"/>
+            <a:r>
+              <a:rPr lang="en-US" dirty="0"/>
+              <a:t>For implementation, the way we track the processed nodes doesn’t matter. But the way we track the discovered nodes does.</a:t>
+            </a:r>
+          </a:p>
+          <a:p>
+            <a:pPr algn="ctr"/>
+            <a:endParaRPr lang="en-US" dirty="0"/>
+          </a:p>
+          <a:p>
+            <a:pPr algn="ctr"/>
+            <a:r>
+              <a:rPr lang="en-US" dirty="0"/>
+              <a:t>With BFS, use a </a:t>
+            </a:r>
+            <a:r>
+              <a:rPr lang="en-US" dirty="0" smtClean="0"/>
+              <a:t>queue.</a:t>
+            </a:r>
+            <a:endParaRPr lang="en-US" dirty="0"/>
+          </a:p>
+          <a:p>
+            <a:pPr algn="ctr"/>
+            <a:r>
+              <a:rPr lang="en-US" dirty="0"/>
+              <a:t>With DFS, use a stack.</a:t>
+            </a:r>
+          </a:p>
+        </p:txBody>
+      </p:sp>
+    </p:spTree>
+    <p:extLst>
+      <p:ext uri="{BB962C8B-B14F-4D97-AF65-F5344CB8AC3E}">
+        <p14:creationId xmlns:p14="http://schemas.microsoft.com/office/powerpoint/2010/main" val="3532886450"/>
+      </p:ext>
+    </p:extLst>
+  </p:cSld>
+  <p:clrMapOvr>
+    <a:masterClrMapping/>
+  </p:clrMapOvr>
+</p:sld>
+</file>
+
+<file path=ppt/slides/slide43.xml><?xml version="1.0" encoding="utf-8"?>
+<p:sld xmlns:a="http://schemas.openxmlformats.org/drawingml/2006/main" xmlns:r="http://schemas.openxmlformats.org/officeDocument/2006/relationships" xmlns:p="http://schemas.openxmlformats.org/presentationml/2006/main">
+  <p:cSld>
+    <p:spTree>
+      <p:nvGrpSpPr>
+        <p:cNvPr id="1" name=""/>
+        <p:cNvGrpSpPr/>
+        <p:nvPr/>
+      </p:nvGrpSpPr>
+      <p:grpSpPr>
+        <a:xfrm>
+          <a:off x="0" y="0"/>
+          <a:ext cx="0" cy="0"/>
+          <a:chOff x="0" y="0"/>
+          <a:chExt cx="0" cy="0"/>
+        </a:xfrm>
+      </p:grpSpPr>
+      <p:sp>
+        <p:nvSpPr>
           <p:cNvPr id="2" name="Title 1"/>
           <p:cNvSpPr>
             <a:spLocks noGrp="1"/>
@@ -31808,7 +32458,7 @@
 </p:sld>
 </file>
 
-<file path=ppt/slides/slide43.xml><?xml version="1.0" encoding="utf-8"?>
+<file path=ppt/slides/slide44.xml><?xml version="1.0" encoding="utf-8"?>
 <p:sld xmlns:a="http://schemas.openxmlformats.org/drawingml/2006/main" xmlns:r="http://schemas.openxmlformats.org/officeDocument/2006/relationships" xmlns:p="http://schemas.openxmlformats.org/presentationml/2006/main">
   <p:cSld>
     <p:spTree>

</xml_diff>

<commit_message>
modified traversals slide slightly to improve order of content
</commit_message>
<xml_diff>
--- a/Fifth Meeting - Graphs and Trees - 09-27-2017/graphs-and-trees.pptx
+++ b/Fifth Meeting - Graphs and Trees - 09-27-2017/graphs-and-trees.pptx
@@ -5,7 +5,7 @@
     <p:sldMasterId id="2147483696" r:id="rId1"/>
   </p:sldMasterIdLst>
   <p:notesMasterIdLst>
-    <p:notesMasterId r:id="rId46"/>
+    <p:notesMasterId r:id="rId47"/>
   </p:notesMasterIdLst>
   <p:sldIdLst>
     <p:sldId id="256" r:id="rId2"/>
@@ -42,16 +42,17 @@
     <p:sldId id="302" r:id="rId33"/>
     <p:sldId id="305" r:id="rId34"/>
     <p:sldId id="280" r:id="rId35"/>
-    <p:sldId id="282" r:id="rId36"/>
-    <p:sldId id="285" r:id="rId37"/>
-    <p:sldId id="284" r:id="rId38"/>
-    <p:sldId id="286" r:id="rId39"/>
-    <p:sldId id="287" r:id="rId40"/>
-    <p:sldId id="288" r:id="rId41"/>
-    <p:sldId id="289" r:id="rId42"/>
-    <p:sldId id="290" r:id="rId43"/>
-    <p:sldId id="295" r:id="rId44"/>
-    <p:sldId id="296" r:id="rId45"/>
+    <p:sldId id="306" r:id="rId36"/>
+    <p:sldId id="282" r:id="rId37"/>
+    <p:sldId id="285" r:id="rId38"/>
+    <p:sldId id="284" r:id="rId39"/>
+    <p:sldId id="286" r:id="rId40"/>
+    <p:sldId id="287" r:id="rId41"/>
+    <p:sldId id="288" r:id="rId42"/>
+    <p:sldId id="289" r:id="rId43"/>
+    <p:sldId id="290" r:id="rId44"/>
+    <p:sldId id="295" r:id="rId45"/>
+    <p:sldId id="296" r:id="rId46"/>
   </p:sldIdLst>
   <p:sldSz cx="12192000" cy="6858000"/>
   <p:notesSz cx="6858000" cy="9144000"/>
@@ -24911,10 +24912,6 @@
             <a:br>
               <a:rPr lang="en-US" sz="3200" dirty="0"/>
             </a:br>
-            <a:r>
-              <a:rPr lang="en-US" sz="2000" b="1" dirty="0"/>
-              <a:t>Breadth First Search (BFS)</a:t>
-            </a:r>
             <a:endParaRPr lang="en-US" sz="2000" dirty="0"/>
           </a:p>
         </p:txBody>
@@ -26263,8 +26260,20 @@
               <a:rPr lang="en-US" sz="3200" dirty="0"/>
             </a:br>
             <a:r>
+              <a:rPr lang="en-US" sz="2000" b="1" dirty="0" smtClean="0"/>
+              <a:t>DEPTH First </a:t>
+            </a:r>
+            <a:r>
               <a:rPr lang="en-US" sz="2000" b="1" dirty="0"/>
-              <a:t>Breadth First Search (BFS)</a:t>
+              <a:t>Search </a:t>
+            </a:r>
+            <a:r>
+              <a:rPr lang="en-US" sz="2000" b="1" dirty="0" smtClean="0"/>
+              <a:t>(DFS</a:t>
+            </a:r>
+            <a:r>
+              <a:rPr lang="en-US" sz="2000" b="1" dirty="0"/>
+              <a:t>)</a:t>
             </a:r>
             <a:endParaRPr lang="en-US" sz="2000" dirty="0"/>
           </a:p>
@@ -26285,7 +26294,7 @@
         <p:spPr>
           <a:xfrm>
             <a:off x="976320" y="2519614"/>
-            <a:ext cx="4576597" cy="1754326"/>
+            <a:ext cx="4576597" cy="2031325"/>
           </a:xfrm>
           <a:prstGeom prst="rect">
             <a:avLst/>
@@ -26317,18 +26326,19 @@
           </a:p>
           <a:p>
             <a:r>
-              <a:rPr lang="en-US" dirty="0"/>
-              <a:t>Go through each of its neighbors (children) before going onto their children. </a:t>
-            </a:r>
-          </a:p>
-        </p:txBody>
-      </p:sp>
-      <p:sp>
-        <p:nvSpPr>
-          <p:cNvPr id="18" name="Oval 17">
-            <a:extLst>
-              <a:ext uri="{FF2B5EF4-FFF2-40B4-BE49-F238E27FC236}">
-                <a16:creationId xmlns:a16="http://schemas.microsoft.com/office/drawing/2014/main" xmlns="" id="{E3A70C93-FBFE-4C6B-9718-B3E23D7AF78C}"/>
+              <a:rPr lang="en-US" dirty="0" smtClean="0"/>
+              <a:t>Fully go down the rabbit hole of each of your neighbor’s neighbors, before exploring each of your neighbors first.</a:t>
+            </a:r>
+            <a:endParaRPr lang="en-US" dirty="0"/>
+          </a:p>
+        </p:txBody>
+      </p:sp>
+      <p:sp>
+        <p:nvSpPr>
+          <p:cNvPr id="5" name="Oval 4">
+            <a:extLst>
+              <a:ext uri="{FF2B5EF4-FFF2-40B4-BE49-F238E27FC236}">
+                <a16:creationId xmlns:a16="http://schemas.microsoft.com/office/drawing/2014/main" xmlns="" id="{7C698373-BED4-4C3B-AB0D-AFDB68234831}"/>
               </a:ext>
             </a:extLst>
           </p:cNvPr>
@@ -26337,8 +26347,8 @@
         </p:nvSpPr>
         <p:spPr>
           <a:xfrm>
-            <a:off x="6195467" y="2519614"/>
-            <a:ext cx="1091860" cy="906011"/>
+            <a:off x="5736244" y="3660021"/>
+            <a:ext cx="1071619" cy="906011"/>
           </a:xfrm>
           <a:prstGeom prst="ellipse">
             <a:avLst/>
@@ -26346,15 +26356,64 @@
         </p:spPr>
         <p:style>
           <a:lnRef idx="2">
-            <a:schemeClr val="accent1">
+            <a:schemeClr val="accent2">
               <a:shade val="50000"/>
             </a:schemeClr>
           </a:lnRef>
           <a:fillRef idx="1">
-            <a:schemeClr val="accent1"/>
-          </a:fillRef>
-          <a:effectRef idx="0">
-            <a:schemeClr val="accent1"/>
+            <a:schemeClr val="accent2"/>
+          </a:fillRef>
+          <a:effectRef idx="0">
+            <a:schemeClr val="accent2"/>
+          </a:effectRef>
+          <a:fontRef idx="minor">
+            <a:schemeClr val="lt1"/>
+          </a:fontRef>
+        </p:style>
+        <p:txBody>
+          <a:bodyPr rtlCol="0" anchor="ctr"/>
+          <a:lstStyle/>
+          <a:p>
+            <a:pPr algn="ctr"/>
+            <a:r>
+              <a:rPr lang="en-US" sz="1400" dirty="0"/>
+              <a:t>1</a:t>
+            </a:r>
+          </a:p>
+        </p:txBody>
+      </p:sp>
+      <p:sp>
+        <p:nvSpPr>
+          <p:cNvPr id="6" name="Oval 5">
+            <a:extLst>
+              <a:ext uri="{FF2B5EF4-FFF2-40B4-BE49-F238E27FC236}">
+                <a16:creationId xmlns:a16="http://schemas.microsoft.com/office/drawing/2014/main" xmlns="" id="{2AFC8556-D16F-45ED-80A0-4487D84E403E}"/>
+              </a:ext>
+            </a:extLst>
+          </p:cNvPr>
+          <p:cNvSpPr/>
+          <p:nvPr/>
+        </p:nvSpPr>
+        <p:spPr>
+          <a:xfrm>
+            <a:off x="7269257" y="2519614"/>
+            <a:ext cx="1091860" cy="906011"/>
+          </a:xfrm>
+          <a:prstGeom prst="ellipse">
+            <a:avLst/>
+          </a:prstGeom>
+        </p:spPr>
+        <p:style>
+          <a:lnRef idx="2">
+            <a:schemeClr val="accent3">
+              <a:shade val="50000"/>
+            </a:schemeClr>
+          </a:lnRef>
+          <a:fillRef idx="1">
+            <a:schemeClr val="accent3"/>
+          </a:fillRef>
+          <a:effectRef idx="0">
+            <a:schemeClr val="accent3"/>
           </a:effectRef>
           <a:fontRef idx="minor">
             <a:schemeClr val="lt1"/>
@@ -26374,10 +26433,10 @@
       </p:sp>
       <p:sp>
         <p:nvSpPr>
-          <p:cNvPr id="19" name="Oval 18">
-            <a:extLst>
-              <a:ext uri="{FF2B5EF4-FFF2-40B4-BE49-F238E27FC236}">
-                <a16:creationId xmlns:a16="http://schemas.microsoft.com/office/drawing/2014/main" xmlns="" id="{A9D8A195-C61E-45AF-8911-D48B6D5EFA63}"/>
+          <p:cNvPr id="7" name="Oval 6">
+            <a:extLst>
+              <a:ext uri="{FF2B5EF4-FFF2-40B4-BE49-F238E27FC236}">
+                <a16:creationId xmlns:a16="http://schemas.microsoft.com/office/drawing/2014/main" xmlns="" id="{69C61115-D5E7-4A80-9223-3E7C14FCB909}"/>
               </a:ext>
             </a:extLst>
           </p:cNvPr>
@@ -26386,7 +26445,7 @@
         </p:nvSpPr>
         <p:spPr>
           <a:xfrm>
-            <a:off x="7766536" y="3759537"/>
+            <a:off x="4375936" y="5000248"/>
             <a:ext cx="1091860" cy="906011"/>
           </a:xfrm>
           <a:prstGeom prst="ellipse">
@@ -26395,15 +26454,113 @@
         </p:spPr>
         <p:style>
           <a:lnRef idx="2">
-            <a:schemeClr val="accent1">
+            <a:schemeClr val="accent4">
               <a:shade val="50000"/>
             </a:schemeClr>
           </a:lnRef>
           <a:fillRef idx="1">
-            <a:schemeClr val="accent1"/>
-          </a:fillRef>
-          <a:effectRef idx="0">
-            <a:schemeClr val="accent1"/>
+            <a:schemeClr val="accent4"/>
+          </a:fillRef>
+          <a:effectRef idx="0">
+            <a:schemeClr val="accent4"/>
+          </a:effectRef>
+          <a:fontRef idx="minor">
+            <a:schemeClr val="lt1"/>
+          </a:fontRef>
+        </p:style>
+        <p:txBody>
+          <a:bodyPr rtlCol="0" anchor="ctr"/>
+          <a:lstStyle/>
+          <a:p>
+            <a:pPr algn="ctr"/>
+            <a:r>
+              <a:rPr lang="en-US" sz="1400" dirty="0"/>
+              <a:t>3</a:t>
+            </a:r>
+          </a:p>
+        </p:txBody>
+      </p:sp>
+      <p:sp>
+        <p:nvSpPr>
+          <p:cNvPr id="8" name="Oval 7">
+            <a:extLst>
+              <a:ext uri="{FF2B5EF4-FFF2-40B4-BE49-F238E27FC236}">
+                <a16:creationId xmlns:a16="http://schemas.microsoft.com/office/drawing/2014/main" xmlns="" id="{0F635F50-21A8-4D7E-92C1-3DA7E416DF2C}"/>
+              </a:ext>
+            </a:extLst>
+          </p:cNvPr>
+          <p:cNvSpPr/>
+          <p:nvPr/>
+        </p:nvSpPr>
+        <p:spPr>
+          <a:xfrm>
+            <a:off x="9164790" y="3660021"/>
+            <a:ext cx="1091860" cy="906011"/>
+          </a:xfrm>
+          <a:prstGeom prst="ellipse">
+            <a:avLst/>
+          </a:prstGeom>
+        </p:spPr>
+        <p:style>
+          <a:lnRef idx="2">
+            <a:schemeClr val="accent2">
+              <a:shade val="50000"/>
+            </a:schemeClr>
+          </a:lnRef>
+          <a:fillRef idx="1">
+            <a:schemeClr val="accent2"/>
+          </a:fillRef>
+          <a:effectRef idx="0">
+            <a:schemeClr val="accent2"/>
+          </a:effectRef>
+          <a:fontRef idx="minor">
+            <a:schemeClr val="lt1"/>
+          </a:fontRef>
+        </p:style>
+        <p:txBody>
+          <a:bodyPr rtlCol="0" anchor="ctr"/>
+          <a:lstStyle/>
+          <a:p>
+            <a:pPr algn="ctr"/>
+            <a:r>
+              <a:rPr lang="en-US" sz="1400" dirty="0"/>
+              <a:t>2</a:t>
+            </a:r>
+          </a:p>
+        </p:txBody>
+      </p:sp>
+      <p:sp>
+        <p:nvSpPr>
+          <p:cNvPr id="9" name="Oval 8">
+            <a:extLst>
+              <a:ext uri="{FF2B5EF4-FFF2-40B4-BE49-F238E27FC236}">
+                <a16:creationId xmlns:a16="http://schemas.microsoft.com/office/drawing/2014/main" xmlns="" id="{567EC305-E243-46D7-A1A4-57898B2A6BFF}"/>
+              </a:ext>
+            </a:extLst>
+          </p:cNvPr>
+          <p:cNvSpPr/>
+          <p:nvPr/>
+        </p:nvSpPr>
+        <p:spPr>
+          <a:xfrm>
+            <a:off x="6807863" y="5000248"/>
+            <a:ext cx="1091860" cy="906011"/>
+          </a:xfrm>
+          <a:prstGeom prst="ellipse">
+            <a:avLst/>
+          </a:prstGeom>
+        </p:spPr>
+        <p:style>
+          <a:lnRef idx="2">
+            <a:schemeClr val="accent4">
+              <a:shade val="50000"/>
+            </a:schemeClr>
+          </a:lnRef>
+          <a:fillRef idx="1">
+            <a:schemeClr val="accent4"/>
+          </a:fillRef>
+          <a:effectRef idx="0">
+            <a:schemeClr val="accent4"/>
           </a:effectRef>
           <a:fontRef idx="minor">
             <a:schemeClr val="lt1"/>
@@ -26423,10 +26580,10 @@
       </p:sp>
       <p:sp>
         <p:nvSpPr>
-          <p:cNvPr id="20" name="Oval 19">
-            <a:extLst>
-              <a:ext uri="{FF2B5EF4-FFF2-40B4-BE49-F238E27FC236}">
-                <a16:creationId xmlns:a16="http://schemas.microsoft.com/office/drawing/2014/main" xmlns="" id="{2530DC6F-0310-49DD-B461-F5E79C06D842}"/>
+          <p:cNvPr id="10" name="Oval 9">
+            <a:extLst>
+              <a:ext uri="{FF2B5EF4-FFF2-40B4-BE49-F238E27FC236}">
+                <a16:creationId xmlns:a16="http://schemas.microsoft.com/office/drawing/2014/main" xmlns="" id="{26325D76-0E9C-45BC-BF85-1ADC837D5B3E}"/>
               </a:ext>
             </a:extLst>
           </p:cNvPr>
@@ -26435,7 +26592,7 @@
         </p:nvSpPr>
         <p:spPr>
           <a:xfrm>
-            <a:off x="7747682" y="2519614"/>
+            <a:off x="10256650" y="5000246"/>
             <a:ext cx="1091860" cy="906011"/>
           </a:xfrm>
           <a:prstGeom prst="ellipse">
@@ -26444,15 +26601,15 @@
         </p:spPr>
         <p:style>
           <a:lnRef idx="2">
-            <a:schemeClr val="accent1">
+            <a:schemeClr val="accent4">
               <a:shade val="50000"/>
             </a:schemeClr>
           </a:lnRef>
           <a:fillRef idx="1">
-            <a:schemeClr val="accent1"/>
-          </a:fillRef>
-          <a:effectRef idx="0">
-            <a:schemeClr val="accent1"/>
+            <a:schemeClr val="accent4"/>
+          </a:fillRef>
+          <a:effectRef idx="0">
+            <a:schemeClr val="accent4"/>
           </a:effectRef>
           <a:fontRef idx="minor">
             <a:schemeClr val="lt1"/>
@@ -26465,17 +26622,17 @@
             <a:pPr algn="ctr"/>
             <a:r>
               <a:rPr lang="en-US" sz="1400" dirty="0"/>
-              <a:t>1</a:t>
-            </a:r>
-          </a:p>
-        </p:txBody>
-      </p:sp>
-      <p:sp>
-        <p:nvSpPr>
-          <p:cNvPr id="21" name="Oval 20">
-            <a:extLst>
-              <a:ext uri="{FF2B5EF4-FFF2-40B4-BE49-F238E27FC236}">
-                <a16:creationId xmlns:a16="http://schemas.microsoft.com/office/drawing/2014/main" xmlns="" id="{2D30383C-AFC4-4EF5-A144-B7D7383317B0}"/>
+              <a:t>6</a:t>
+            </a:r>
+          </a:p>
+        </p:txBody>
+      </p:sp>
+      <p:sp>
+        <p:nvSpPr>
+          <p:cNvPr id="11" name="Oval 10">
+            <a:extLst>
+              <a:ext uri="{FF2B5EF4-FFF2-40B4-BE49-F238E27FC236}">
+                <a16:creationId xmlns:a16="http://schemas.microsoft.com/office/drawing/2014/main" xmlns="" id="{E4EFB6A6-70AB-4785-AF17-EA5815B444D9}"/>
               </a:ext>
             </a:extLst>
           </p:cNvPr>
@@ -26484,7 +26641,7 @@
         </p:nvSpPr>
         <p:spPr>
           <a:xfrm>
-            <a:off x="9318751" y="3759537"/>
+            <a:off x="8072930" y="5000246"/>
             <a:ext cx="1091860" cy="906011"/>
           </a:xfrm>
           <a:prstGeom prst="ellipse">
@@ -26493,64 +26650,15 @@
         </p:spPr>
         <p:style>
           <a:lnRef idx="2">
-            <a:schemeClr val="accent1">
+            <a:schemeClr val="accent4">
               <a:shade val="50000"/>
             </a:schemeClr>
           </a:lnRef>
           <a:fillRef idx="1">
-            <a:schemeClr val="accent1"/>
-          </a:fillRef>
-          <a:effectRef idx="0">
-            <a:schemeClr val="accent1"/>
-          </a:effectRef>
-          <a:fontRef idx="minor">
-            <a:schemeClr val="lt1"/>
-          </a:fontRef>
-        </p:style>
-        <p:txBody>
-          <a:bodyPr rtlCol="0" anchor="ctr"/>
-          <a:lstStyle/>
-          <a:p>
-            <a:pPr algn="ctr"/>
-            <a:r>
-              <a:rPr lang="en-US" sz="1400" dirty="0"/>
-              <a:t>3</a:t>
-            </a:r>
-          </a:p>
-        </p:txBody>
-      </p:sp>
-      <p:sp>
-        <p:nvSpPr>
-          <p:cNvPr id="22" name="Oval 21">
-            <a:extLst>
-              <a:ext uri="{FF2B5EF4-FFF2-40B4-BE49-F238E27FC236}">
-                <a16:creationId xmlns:a16="http://schemas.microsoft.com/office/drawing/2014/main" xmlns="" id="{B7933EEF-65C0-4D7E-8EDC-F9EC80CC53A9}"/>
-              </a:ext>
-            </a:extLst>
-          </p:cNvPr>
-          <p:cNvSpPr/>
-          <p:nvPr/>
-        </p:nvSpPr>
-        <p:spPr>
-          <a:xfrm>
-            <a:off x="6214321" y="3759537"/>
-            <a:ext cx="1091860" cy="906011"/>
-          </a:xfrm>
-          <a:prstGeom prst="ellipse">
-            <a:avLst/>
-          </a:prstGeom>
-        </p:spPr>
-        <p:style>
-          <a:lnRef idx="2">
-            <a:schemeClr val="accent1">
-              <a:shade val="50000"/>
-            </a:schemeClr>
-          </a:lnRef>
-          <a:fillRef idx="1">
-            <a:schemeClr val="accent1"/>
-          </a:fillRef>
-          <a:effectRef idx="0">
-            <a:schemeClr val="accent1"/>
+            <a:schemeClr val="accent4"/>
+          </a:fillRef>
+          <a:effectRef idx="0">
+            <a:schemeClr val="accent4"/>
           </a:effectRef>
           <a:fontRef idx="minor">
             <a:schemeClr val="lt1"/>
@@ -26568,81 +26676,29 @@
           </a:p>
         </p:txBody>
       </p:sp>
-      <p:sp>
-        <p:nvSpPr>
-          <p:cNvPr id="23" name="Oval 22">
-            <a:extLst>
-              <a:ext uri="{FF2B5EF4-FFF2-40B4-BE49-F238E27FC236}">
-                <a16:creationId xmlns:a16="http://schemas.microsoft.com/office/drawing/2014/main" xmlns="" id="{ACBC3861-7CD0-492B-A8F2-5D5897647B0E}"/>
-              </a:ext>
-            </a:extLst>
-          </p:cNvPr>
-          <p:cNvSpPr/>
-          <p:nvPr/>
-        </p:nvSpPr>
-        <p:spPr>
-          <a:xfrm>
-            <a:off x="9303029" y="2519614"/>
-            <a:ext cx="1091860" cy="906011"/>
-          </a:xfrm>
-          <a:prstGeom prst="ellipse">
-            <a:avLst/>
-          </a:prstGeom>
-        </p:spPr>
-        <p:style>
-          <a:lnRef idx="2">
-            <a:schemeClr val="accent1">
-              <a:shade val="50000"/>
-            </a:schemeClr>
-          </a:lnRef>
-          <a:fillRef idx="1">
-            <a:schemeClr val="accent1"/>
-          </a:fillRef>
-          <a:effectRef idx="0">
-            <a:schemeClr val="accent1"/>
-          </a:effectRef>
-          <a:fontRef idx="minor">
-            <a:schemeClr val="lt1"/>
-          </a:fontRef>
-        </p:style>
-        <p:txBody>
-          <a:bodyPr rtlCol="0" anchor="ctr"/>
-          <a:lstStyle/>
-          <a:p>
-            <a:pPr algn="ctr"/>
-            <a:r>
-              <a:rPr lang="en-US" sz="1400" dirty="0"/>
-              <a:t>2</a:t>
-            </a:r>
-          </a:p>
-        </p:txBody>
-      </p:sp>
       <p:cxnSp>
         <p:nvCxnSpPr>
-          <p:cNvPr id="24" name="Straight Arrow Connector 23">
-            <a:extLst>
-              <a:ext uri="{FF2B5EF4-FFF2-40B4-BE49-F238E27FC236}">
-                <a16:creationId xmlns:a16="http://schemas.microsoft.com/office/drawing/2014/main" xmlns="" id="{BD2AC117-99A4-4902-86EA-A6FFA7DC4319}"/>
+          <p:cNvPr id="12" name="Straight Connector 11">
+            <a:extLst>
+              <a:ext uri="{FF2B5EF4-FFF2-40B4-BE49-F238E27FC236}">
+                <a16:creationId xmlns:a16="http://schemas.microsoft.com/office/drawing/2014/main" xmlns="" id="{B77A1722-4980-41A4-ADB9-BBEA0E21C4C0}"/>
               </a:ext>
             </a:extLst>
           </p:cNvPr>
           <p:cNvCxnSpPr>
-            <a:stCxn id="18" idx="4"/>
-            <a:endCxn id="22" idx="0"/>
+            <a:stCxn id="6" idx="2"/>
+            <a:endCxn id="5" idx="0"/>
           </p:cNvCxnSpPr>
           <p:nvPr/>
         </p:nvCxnSpPr>
         <p:spPr>
-          <a:xfrm>
-            <a:off x="6741397" y="3425625"/>
-            <a:ext cx="18854" cy="333912"/>
-          </a:xfrm>
-          <a:prstGeom prst="straightConnector1">
-            <a:avLst/>
-          </a:prstGeom>
-          <a:ln>
-            <a:tailEnd type="triangle"/>
-          </a:ln>
+          <a:xfrm flipH="1">
+            <a:off x="6272054" y="2972620"/>
+            <a:ext cx="997203" cy="687401"/>
+          </a:xfrm>
+          <a:prstGeom prst="line">
+            <a:avLst/>
+          </a:prstGeom>
         </p:spPr>
         <p:style>
           <a:lnRef idx="1">
@@ -26661,31 +26717,28 @@
       </p:cxnSp>
       <p:cxnSp>
         <p:nvCxnSpPr>
-          <p:cNvPr id="25" name="Straight Arrow Connector 24">
-            <a:extLst>
-              <a:ext uri="{FF2B5EF4-FFF2-40B4-BE49-F238E27FC236}">
-                <a16:creationId xmlns:a16="http://schemas.microsoft.com/office/drawing/2014/main" xmlns="" id="{DA3EDF12-09A3-47E6-94BF-4D56401E8BC1}"/>
+          <p:cNvPr id="13" name="Straight Connector 12">
+            <a:extLst>
+              <a:ext uri="{FF2B5EF4-FFF2-40B4-BE49-F238E27FC236}">
+                <a16:creationId xmlns:a16="http://schemas.microsoft.com/office/drawing/2014/main" xmlns="" id="{6D6950D6-A9DA-4BA3-8831-BB5887FC4C35}"/>
               </a:ext>
             </a:extLst>
           </p:cNvPr>
           <p:cNvCxnSpPr>
             <a:cxnSpLocks/>
-            <a:stCxn id="18" idx="5"/>
-            <a:endCxn id="19" idx="1"/>
+            <a:stCxn id="6" idx="6"/>
+            <a:endCxn id="8" idx="0"/>
           </p:cNvCxnSpPr>
           <p:nvPr/>
         </p:nvCxnSpPr>
         <p:spPr>
           <a:xfrm>
-            <a:off x="7127428" y="3292943"/>
-            <a:ext cx="799007" cy="599276"/>
-          </a:xfrm>
-          <a:prstGeom prst="straightConnector1">
-            <a:avLst/>
-          </a:prstGeom>
-          <a:ln>
-            <a:tailEnd type="triangle"/>
-          </a:ln>
+            <a:off x="8361117" y="2972620"/>
+            <a:ext cx="1349603" cy="687401"/>
+          </a:xfrm>
+          <a:prstGeom prst="line">
+            <a:avLst/>
+          </a:prstGeom>
         </p:spPr>
         <p:style>
           <a:lnRef idx="1">
@@ -26704,31 +26757,27 @@
       </p:cxnSp>
       <p:cxnSp>
         <p:nvCxnSpPr>
-          <p:cNvPr id="28" name="Straight Arrow Connector 27">
-            <a:extLst>
-              <a:ext uri="{FF2B5EF4-FFF2-40B4-BE49-F238E27FC236}">
-                <a16:creationId xmlns:a16="http://schemas.microsoft.com/office/drawing/2014/main" xmlns="" id="{3EF20996-34DB-42A5-BA07-F3C4B821C43B}"/>
+          <p:cNvPr id="14" name="Straight Connector 13">
+            <a:extLst>
+              <a:ext uri="{FF2B5EF4-FFF2-40B4-BE49-F238E27FC236}">
+                <a16:creationId xmlns:a16="http://schemas.microsoft.com/office/drawing/2014/main" xmlns="" id="{C2C36523-D305-416A-90A8-FBD2D026E0DF}"/>
               </a:ext>
             </a:extLst>
           </p:cNvPr>
           <p:cNvCxnSpPr>
             <a:cxnSpLocks/>
-            <a:stCxn id="18" idx="6"/>
-            <a:endCxn id="20" idx="2"/>
+            <a:stCxn id="5" idx="2"/>
           </p:cNvCxnSpPr>
           <p:nvPr/>
         </p:nvCxnSpPr>
         <p:spPr>
-          <a:xfrm>
-            <a:off x="7287327" y="2972620"/>
-            <a:ext cx="460355" cy="0"/>
-          </a:xfrm>
-          <a:prstGeom prst="straightConnector1">
-            <a:avLst/>
-          </a:prstGeom>
-          <a:ln>
-            <a:tailEnd type="triangle"/>
-          </a:ln>
+          <a:xfrm flipH="1">
+            <a:off x="4887300" y="4113027"/>
+            <a:ext cx="848944" cy="887219"/>
+          </a:xfrm>
+          <a:prstGeom prst="line">
+            <a:avLst/>
+          </a:prstGeom>
         </p:spPr>
         <p:style>
           <a:lnRef idx="1">
@@ -26747,31 +26796,28 @@
       </p:cxnSp>
       <p:cxnSp>
         <p:nvCxnSpPr>
-          <p:cNvPr id="32" name="Straight Arrow Connector 31">
-            <a:extLst>
-              <a:ext uri="{FF2B5EF4-FFF2-40B4-BE49-F238E27FC236}">
-                <a16:creationId xmlns:a16="http://schemas.microsoft.com/office/drawing/2014/main" xmlns="" id="{03765C78-6E44-42E8-A389-88D3C0C77CD7}"/>
+          <p:cNvPr id="15" name="Straight Connector 14">
+            <a:extLst>
+              <a:ext uri="{FF2B5EF4-FFF2-40B4-BE49-F238E27FC236}">
+                <a16:creationId xmlns:a16="http://schemas.microsoft.com/office/drawing/2014/main" xmlns="" id="{9B54BDFE-788A-4561-9985-C975CAE6978E}"/>
               </a:ext>
             </a:extLst>
           </p:cNvPr>
           <p:cNvCxnSpPr>
             <a:cxnSpLocks/>
-            <a:stCxn id="20" idx="4"/>
-            <a:endCxn id="19" idx="0"/>
+            <a:stCxn id="5" idx="6"/>
+            <a:endCxn id="9" idx="0"/>
           </p:cNvCxnSpPr>
           <p:nvPr/>
         </p:nvCxnSpPr>
         <p:spPr>
           <a:xfrm>
-            <a:off x="8293612" y="3425625"/>
-            <a:ext cx="18854" cy="333912"/>
-          </a:xfrm>
-          <a:prstGeom prst="straightConnector1">
-            <a:avLst/>
-          </a:prstGeom>
-          <a:ln>
-            <a:tailEnd type="triangle"/>
-          </a:ln>
+            <a:off x="6807863" y="4113027"/>
+            <a:ext cx="545930" cy="887221"/>
+          </a:xfrm>
+          <a:prstGeom prst="line">
+            <a:avLst/>
+          </a:prstGeom>
         </p:spPr>
         <p:style>
           <a:lnRef idx="1">
@@ -26790,31 +26836,28 @@
       </p:cxnSp>
       <p:cxnSp>
         <p:nvCxnSpPr>
-          <p:cNvPr id="35" name="Straight Arrow Connector 34">
-            <a:extLst>
-              <a:ext uri="{FF2B5EF4-FFF2-40B4-BE49-F238E27FC236}">
-                <a16:creationId xmlns:a16="http://schemas.microsoft.com/office/drawing/2014/main" xmlns="" id="{7856A272-8E7D-4F00-A51D-8615A11FB3C6}"/>
+          <p:cNvPr id="16" name="Straight Connector 15">
+            <a:extLst>
+              <a:ext uri="{FF2B5EF4-FFF2-40B4-BE49-F238E27FC236}">
+                <a16:creationId xmlns:a16="http://schemas.microsoft.com/office/drawing/2014/main" xmlns="" id="{68F1224D-2307-4846-AAB2-2789647BCF23}"/>
               </a:ext>
             </a:extLst>
           </p:cNvPr>
           <p:cNvCxnSpPr>
             <a:cxnSpLocks/>
-            <a:stCxn id="20" idx="5"/>
-            <a:endCxn id="21" idx="1"/>
+            <a:stCxn id="8" idx="2"/>
+            <a:endCxn id="11" idx="0"/>
           </p:cNvCxnSpPr>
           <p:nvPr/>
         </p:nvCxnSpPr>
         <p:spPr>
-          <a:xfrm>
-            <a:off x="8679643" y="3292943"/>
-            <a:ext cx="799007" cy="599276"/>
-          </a:xfrm>
-          <a:prstGeom prst="straightConnector1">
-            <a:avLst/>
-          </a:prstGeom>
-          <a:ln>
-            <a:tailEnd type="triangle"/>
-          </a:ln>
+          <a:xfrm flipH="1">
+            <a:off x="8618860" y="4113027"/>
+            <a:ext cx="545930" cy="887219"/>
+          </a:xfrm>
+          <a:prstGeom prst="line">
+            <a:avLst/>
+          </a:prstGeom>
         </p:spPr>
         <p:style>
           <a:lnRef idx="1">
@@ -26833,117 +26876,28 @@
       </p:cxnSp>
       <p:cxnSp>
         <p:nvCxnSpPr>
-          <p:cNvPr id="38" name="Straight Arrow Connector 37">
-            <a:extLst>
-              <a:ext uri="{FF2B5EF4-FFF2-40B4-BE49-F238E27FC236}">
-                <a16:creationId xmlns:a16="http://schemas.microsoft.com/office/drawing/2014/main" xmlns="" id="{8F292BE1-F59D-4B85-A0E1-7132A3805CF7}"/>
+          <p:cNvPr id="17" name="Straight Connector 16">
+            <a:extLst>
+              <a:ext uri="{FF2B5EF4-FFF2-40B4-BE49-F238E27FC236}">
+                <a16:creationId xmlns:a16="http://schemas.microsoft.com/office/drawing/2014/main" xmlns="" id="{FEDD086A-E016-4E5F-A980-888B57244C82}"/>
               </a:ext>
             </a:extLst>
           </p:cNvPr>
           <p:cNvCxnSpPr>
             <a:cxnSpLocks/>
-            <a:stCxn id="21" idx="2"/>
-            <a:endCxn id="19" idx="6"/>
+            <a:stCxn id="8" idx="6"/>
+            <a:endCxn id="10" idx="0"/>
           </p:cNvCxnSpPr>
           <p:nvPr/>
         </p:nvCxnSpPr>
         <p:spPr>
-          <a:xfrm flipH="1">
-            <a:off x="8858396" y="4212543"/>
-            <a:ext cx="460355" cy="0"/>
-          </a:xfrm>
-          <a:prstGeom prst="straightConnector1">
-            <a:avLst/>
-          </a:prstGeom>
-          <a:ln>
-            <a:tailEnd type="triangle"/>
-          </a:ln>
-        </p:spPr>
-        <p:style>
-          <a:lnRef idx="1">
-            <a:schemeClr val="accent1"/>
-          </a:lnRef>
-          <a:fillRef idx="0">
-            <a:schemeClr val="accent1"/>
-          </a:fillRef>
-          <a:effectRef idx="0">
-            <a:schemeClr val="accent1"/>
-          </a:effectRef>
-          <a:fontRef idx="minor">
-            <a:schemeClr val="tx1"/>
-          </a:fontRef>
-        </p:style>
-      </p:cxnSp>
-      <p:cxnSp>
-        <p:nvCxnSpPr>
-          <p:cNvPr id="43" name="Straight Arrow Connector 42">
-            <a:extLst>
-              <a:ext uri="{FF2B5EF4-FFF2-40B4-BE49-F238E27FC236}">
-                <a16:creationId xmlns:a16="http://schemas.microsoft.com/office/drawing/2014/main" xmlns="" id="{EAB267AB-B304-4A9B-8571-FB119ECDBD6D}"/>
-              </a:ext>
-            </a:extLst>
-          </p:cNvPr>
-          <p:cNvCxnSpPr>
-            <a:cxnSpLocks/>
-            <a:stCxn id="21" idx="0"/>
-            <a:endCxn id="23" idx="4"/>
-          </p:cNvCxnSpPr>
-          <p:nvPr/>
-        </p:nvCxnSpPr>
-        <p:spPr>
-          <a:xfrm flipH="1" flipV="1">
-            <a:off x="9848959" y="3425625"/>
-            <a:ext cx="15722" cy="333912"/>
-          </a:xfrm>
-          <a:prstGeom prst="straightConnector1">
-            <a:avLst/>
-          </a:prstGeom>
-          <a:ln>
-            <a:tailEnd type="triangle"/>
-          </a:ln>
-        </p:spPr>
-        <p:style>
-          <a:lnRef idx="1">
-            <a:schemeClr val="accent1"/>
-          </a:lnRef>
-          <a:fillRef idx="0">
-            <a:schemeClr val="accent1"/>
-          </a:fillRef>
-          <a:effectRef idx="0">
-            <a:schemeClr val="accent1"/>
-          </a:effectRef>
-          <a:fontRef idx="minor">
-            <a:schemeClr val="tx1"/>
-          </a:fontRef>
-        </p:style>
-      </p:cxnSp>
-      <p:cxnSp>
-        <p:nvCxnSpPr>
-          <p:cNvPr id="46" name="Straight Arrow Connector 45">
-            <a:extLst>
-              <a:ext uri="{FF2B5EF4-FFF2-40B4-BE49-F238E27FC236}">
-                <a16:creationId xmlns:a16="http://schemas.microsoft.com/office/drawing/2014/main" xmlns="" id="{F90FF63D-F398-4F70-A13B-B076C40D0D95}"/>
-              </a:ext>
-            </a:extLst>
-          </p:cNvPr>
-          <p:cNvCxnSpPr>
-            <a:cxnSpLocks/>
-            <a:stCxn id="23" idx="2"/>
-            <a:endCxn id="20" idx="6"/>
-          </p:cNvCxnSpPr>
-          <p:nvPr/>
-        </p:nvCxnSpPr>
-        <p:spPr>
-          <a:xfrm flipH="1">
-            <a:off x="8839542" y="2972620"/>
-            <a:ext cx="463487" cy="0"/>
-          </a:xfrm>
-          <a:prstGeom prst="straightConnector1">
-            <a:avLst/>
-          </a:prstGeom>
-          <a:ln>
-            <a:tailEnd type="triangle"/>
-          </a:ln>
+          <a:xfrm>
+            <a:off x="10256650" y="4113027"/>
+            <a:ext cx="545930" cy="887219"/>
+          </a:xfrm>
+          <a:prstGeom prst="line">
+            <a:avLst/>
+          </a:prstGeom>
         </p:spPr>
         <p:style>
           <a:lnRef idx="1">
@@ -26963,7 +26917,7 @@
     </p:spTree>
     <p:extLst>
       <p:ext uri="{BB962C8B-B14F-4D97-AF65-F5344CB8AC3E}">
-        <p14:creationId xmlns:p14="http://schemas.microsoft.com/office/powerpoint/2010/main" val="3422234807"/>
+        <p14:creationId xmlns:p14="http://schemas.microsoft.com/office/powerpoint/2010/main" val="1815600984"/>
       </p:ext>
     </p:extLst>
   </p:cSld>
@@ -27718,49 +27672,10 @@
           </a:fontRef>
         </p:style>
       </p:cxnSp>
-      <p:sp>
-        <p:nvSpPr>
-          <p:cNvPr id="27" name="TextBox 26">
-            <a:extLst>
-              <a:ext uri="{FF2B5EF4-FFF2-40B4-BE49-F238E27FC236}">
-                <a16:creationId xmlns:a16="http://schemas.microsoft.com/office/drawing/2014/main" xmlns="" id="{8EFF6C43-1197-47C6-AFBF-132D9814A2E6}"/>
-              </a:ext>
-            </a:extLst>
-          </p:cNvPr>
-          <p:cNvSpPr txBox="1"/>
-          <p:nvPr/>
-        </p:nvSpPr>
-        <p:spPr>
-          <a:xfrm>
-            <a:off x="642158" y="4273940"/>
-            <a:ext cx="5839180" cy="615553"/>
-          </a:xfrm>
-          <a:prstGeom prst="rect">
-            <a:avLst/>
-          </a:prstGeom>
-          <a:noFill/>
-        </p:spPr>
-        <p:txBody>
-          <a:bodyPr wrap="square" rtlCol="0">
-            <a:spAutoFit/>
-          </a:bodyPr>
-          <a:lstStyle/>
-          <a:p>
-            <a:r>
-              <a:rPr lang="en-US" b="1" dirty="0"/>
-              <a:t>What is the output of a BFS traversal of this graph?</a:t>
-            </a:r>
-          </a:p>
-          <a:p>
-            <a:pPr lvl="5"/>
-            <a:endParaRPr lang="en-US" sz="1600" dirty="0"/>
-          </a:p>
-        </p:txBody>
-      </p:sp>
     </p:spTree>
     <p:extLst>
       <p:ext uri="{BB962C8B-B14F-4D97-AF65-F5344CB8AC3E}">
-        <p14:creationId xmlns:p14="http://schemas.microsoft.com/office/powerpoint/2010/main" val="4234671825"/>
+        <p14:creationId xmlns:p14="http://schemas.microsoft.com/office/powerpoint/2010/main" val="3422234807"/>
       </p:ext>
     </p:extLst>
   </p:cSld>
@@ -28517,10 +28432,10 @@
       </p:cxnSp>
       <p:sp>
         <p:nvSpPr>
-          <p:cNvPr id="26" name="TextBox 25">
-            <a:extLst>
-              <a:ext uri="{FF2B5EF4-FFF2-40B4-BE49-F238E27FC236}">
-                <a16:creationId xmlns:a16="http://schemas.microsoft.com/office/drawing/2014/main" xmlns="" id="{7C674BD7-2C40-476B-975D-7FA2EDC4C0BC}"/>
+          <p:cNvPr id="27" name="TextBox 26">
+            <a:extLst>
+              <a:ext uri="{FF2B5EF4-FFF2-40B4-BE49-F238E27FC236}">
+                <a16:creationId xmlns:a16="http://schemas.microsoft.com/office/drawing/2014/main" xmlns="" id="{8EFF6C43-1197-47C6-AFBF-132D9814A2E6}"/>
               </a:ext>
             </a:extLst>
           </p:cNvPr>
@@ -28530,7 +28445,7 @@
         <p:spPr>
           <a:xfrm>
             <a:off x="642158" y="4273940"/>
-            <a:ext cx="5839180" cy="2369880"/>
+            <a:ext cx="5839180" cy="615553"/>
           </a:xfrm>
           <a:prstGeom prst="rect">
             <a:avLst/>
@@ -28550,163 +28465,6 @@
           </a:p>
           <a:p>
             <a:pPr lvl="5"/>
-            <a:r>
-              <a:rPr lang="en-US" u="sng" dirty="0"/>
-              <a:t>Discovered</a:t>
-            </a:r>
-            <a:r>
-              <a:rPr lang="en-US" dirty="0"/>
-              <a:t>	</a:t>
-            </a:r>
-            <a:r>
-              <a:rPr lang="en-US" u="sng" dirty="0"/>
-              <a:t>Processed</a:t>
-            </a:r>
-          </a:p>
-          <a:p>
-            <a:pPr lvl="5"/>
-            <a:r>
-              <a:rPr lang="en-US" sz="1600" b="1" dirty="0"/>
-              <a:t> [ </a:t>
-            </a:r>
-            <a:r>
-              <a:rPr lang="en-US" sz="1600" dirty="0"/>
-              <a:t>0 </a:t>
-            </a:r>
-            <a:r>
-              <a:rPr lang="en-US" sz="1600" b="1" dirty="0"/>
-              <a:t>] 		 []</a:t>
-            </a:r>
-          </a:p>
-          <a:p>
-            <a:pPr lvl="5"/>
-            <a:r>
-              <a:rPr lang="en-US" sz="1600" b="1" dirty="0"/>
-              <a:t> [ </a:t>
-            </a:r>
-            <a:r>
-              <a:rPr lang="en-US" sz="1600" dirty="0"/>
-              <a:t>1,4,5</a:t>
-            </a:r>
-            <a:r>
-              <a:rPr lang="en-US" sz="1600" b="1" dirty="0"/>
-              <a:t> ]    	 [ </a:t>
-            </a:r>
-            <a:r>
-              <a:rPr lang="en-US" sz="1600" dirty="0"/>
-              <a:t>0</a:t>
-            </a:r>
-            <a:r>
-              <a:rPr lang="en-US" sz="1600" b="1" dirty="0"/>
-              <a:t> ]</a:t>
-            </a:r>
-          </a:p>
-          <a:p>
-            <a:pPr lvl="5"/>
-            <a:r>
-              <a:rPr lang="en-US" sz="1600" b="1" dirty="0"/>
-              <a:t> [</a:t>
-            </a:r>
-            <a:r>
-              <a:rPr lang="en-US" sz="1600" dirty="0"/>
-              <a:t> 4, 5, 3 </a:t>
-            </a:r>
-            <a:r>
-              <a:rPr lang="en-US" sz="1600" b="1" dirty="0"/>
-              <a:t>]  	 [ </a:t>
-            </a:r>
-            <a:r>
-              <a:rPr lang="en-US" sz="1600" dirty="0"/>
-              <a:t>0, 1 </a:t>
-            </a:r>
-            <a:r>
-              <a:rPr lang="en-US" sz="1600" b="1" dirty="0"/>
-              <a:t>]</a:t>
-            </a:r>
-          </a:p>
-          <a:p>
-            <a:pPr lvl="5"/>
-            <a:r>
-              <a:rPr lang="en-US" sz="1600" b="1" dirty="0"/>
-              <a:t> [ </a:t>
-            </a:r>
-            <a:r>
-              <a:rPr lang="en-US" sz="1600" dirty="0"/>
-              <a:t>5, 3 </a:t>
-            </a:r>
-            <a:r>
-              <a:rPr lang="en-US" sz="1600" b="1" dirty="0"/>
-              <a:t>]      	 [ </a:t>
-            </a:r>
-            <a:r>
-              <a:rPr lang="en-US" sz="1600" dirty="0"/>
-              <a:t>0, 1, 4 </a:t>
-            </a:r>
-            <a:r>
-              <a:rPr lang="en-US" sz="1600" b="1" dirty="0"/>
-              <a:t>]</a:t>
-            </a:r>
-          </a:p>
-          <a:p>
-            <a:pPr lvl="5"/>
-            <a:r>
-              <a:rPr lang="en-US" sz="1600" b="1" dirty="0"/>
-              <a:t> [ </a:t>
-            </a:r>
-            <a:r>
-              <a:rPr lang="en-US" sz="1600" dirty="0"/>
-              <a:t>3</a:t>
-            </a:r>
-            <a:r>
-              <a:rPr lang="en-US" sz="1600" b="1" dirty="0"/>
-              <a:t> ]         	 [ </a:t>
-            </a:r>
-            <a:r>
-              <a:rPr lang="en-US" sz="1600" dirty="0"/>
-              <a:t>0, 1, 4, 5 </a:t>
-            </a:r>
-            <a:r>
-              <a:rPr lang="en-US" sz="1600" b="1" dirty="0"/>
-              <a:t>]</a:t>
-            </a:r>
-          </a:p>
-          <a:p>
-            <a:pPr lvl="5"/>
-            <a:r>
-              <a:rPr lang="en-US" sz="1600" b="1" dirty="0"/>
-              <a:t> [ </a:t>
-            </a:r>
-            <a:r>
-              <a:rPr lang="en-US" sz="1600" dirty="0"/>
-              <a:t>2</a:t>
-            </a:r>
-            <a:r>
-              <a:rPr lang="en-US" sz="1600" b="1" dirty="0"/>
-              <a:t> ]          	 [ </a:t>
-            </a:r>
-            <a:r>
-              <a:rPr lang="en-US" sz="1600" dirty="0"/>
-              <a:t>0, 1, 4, 5, 3 </a:t>
-            </a:r>
-            <a:r>
-              <a:rPr lang="en-US" sz="1600" b="1" dirty="0"/>
-              <a:t>]</a:t>
-            </a:r>
-          </a:p>
-          <a:p>
-            <a:pPr lvl="5"/>
-            <a:r>
-              <a:rPr lang="en-US" sz="1600" b="1" dirty="0"/>
-              <a:t> []              	 [ </a:t>
-            </a:r>
-            <a:r>
-              <a:rPr lang="en-US" sz="1600" dirty="0"/>
-              <a:t>0, 1, 4, 5, 3, 2 </a:t>
-            </a:r>
-            <a:r>
-              <a:rPr lang="en-US" sz="1600" b="1" dirty="0"/>
-              <a:t>]</a:t>
-            </a:r>
             <a:endParaRPr lang="en-US" sz="1600" dirty="0"/>
           </a:p>
         </p:txBody>
@@ -28714,7 +28472,7 @@
     </p:spTree>
     <p:extLst>
       <p:ext uri="{BB962C8B-B14F-4D97-AF65-F5344CB8AC3E}">
-        <p14:creationId xmlns:p14="http://schemas.microsoft.com/office/powerpoint/2010/main" val="1647521261"/>
+        <p14:creationId xmlns:p14="http://schemas.microsoft.com/office/powerpoint/2010/main" val="4234671825"/>
       </p:ext>
     </p:extLst>
   </p:cSld>
@@ -28766,7 +28524,7 @@
           <a:p>
             <a:r>
               <a:rPr lang="en-US" sz="3200" dirty="0"/>
-              <a:t>implementation</a:t>
+              <a:t>Traversals</a:t>
             </a:r>
             <a:br>
               <a:rPr lang="en-US" sz="3200" dirty="0"/>
@@ -28793,8 +28551,8 @@
         </p:nvSpPr>
         <p:spPr>
           <a:xfrm>
-            <a:off x="1251693" y="3390205"/>
-            <a:ext cx="4576597" cy="369332"/>
+            <a:off x="976320" y="2519614"/>
+            <a:ext cx="4576597" cy="1754326"/>
           </a:xfrm>
           <a:prstGeom prst="rect">
             <a:avLst/>
@@ -28809,9 +28567,26 @@
           <a:p>
             <a:r>
               <a:rPr lang="en-US" b="1" dirty="0"/>
-              <a:t>CODEALONG!</a:t>
-            </a:r>
+              <a:t>Intuition</a:t>
+            </a:r>
+          </a:p>
+          <a:p>
+            <a:endParaRPr lang="en-US" b="1" dirty="0"/>
+          </a:p>
+          <a:p>
+            <a:r>
+              <a:rPr lang="en-US" dirty="0"/>
+              <a:t>Start at the source (root) node</a:t>
+            </a:r>
+          </a:p>
+          <a:p>
             <a:endParaRPr lang="en-US" dirty="0"/>
+          </a:p>
+          <a:p>
+            <a:r>
+              <a:rPr lang="en-US" dirty="0"/>
+              <a:t>Go through each of its neighbors (children) before going onto their children. </a:t>
+            </a:r>
           </a:p>
         </p:txBody>
       </p:sp>
@@ -29452,10 +29227,206 @@
           </a:fontRef>
         </p:style>
       </p:cxnSp>
+      <p:sp>
+        <p:nvSpPr>
+          <p:cNvPr id="26" name="TextBox 25">
+            <a:extLst>
+              <a:ext uri="{FF2B5EF4-FFF2-40B4-BE49-F238E27FC236}">
+                <a16:creationId xmlns:a16="http://schemas.microsoft.com/office/drawing/2014/main" xmlns="" id="{7C674BD7-2C40-476B-975D-7FA2EDC4C0BC}"/>
+              </a:ext>
+            </a:extLst>
+          </p:cNvPr>
+          <p:cNvSpPr txBox="1"/>
+          <p:nvPr/>
+        </p:nvSpPr>
+        <p:spPr>
+          <a:xfrm>
+            <a:off x="642158" y="4273940"/>
+            <a:ext cx="5839180" cy="2369880"/>
+          </a:xfrm>
+          <a:prstGeom prst="rect">
+            <a:avLst/>
+          </a:prstGeom>
+          <a:noFill/>
+        </p:spPr>
+        <p:txBody>
+          <a:bodyPr wrap="square" rtlCol="0">
+            <a:spAutoFit/>
+          </a:bodyPr>
+          <a:lstStyle/>
+          <a:p>
+            <a:r>
+              <a:rPr lang="en-US" b="1" dirty="0"/>
+              <a:t>What is the output of a BFS traversal of this graph?</a:t>
+            </a:r>
+          </a:p>
+          <a:p>
+            <a:pPr lvl="5"/>
+            <a:r>
+              <a:rPr lang="en-US" u="sng" dirty="0"/>
+              <a:t>Discovered</a:t>
+            </a:r>
+            <a:r>
+              <a:rPr lang="en-US" dirty="0"/>
+              <a:t>	</a:t>
+            </a:r>
+            <a:r>
+              <a:rPr lang="en-US" u="sng" dirty="0"/>
+              <a:t>Processed</a:t>
+            </a:r>
+          </a:p>
+          <a:p>
+            <a:pPr lvl="5"/>
+            <a:r>
+              <a:rPr lang="en-US" sz="1600" b="1" dirty="0"/>
+              <a:t> [ </a:t>
+            </a:r>
+            <a:r>
+              <a:rPr lang="en-US" sz="1600" dirty="0"/>
+              <a:t>0 </a:t>
+            </a:r>
+            <a:r>
+              <a:rPr lang="en-US" sz="1600" b="1" dirty="0"/>
+              <a:t>] 		 []</a:t>
+            </a:r>
+          </a:p>
+          <a:p>
+            <a:pPr lvl="5"/>
+            <a:r>
+              <a:rPr lang="en-US" sz="1600" b="1" dirty="0"/>
+              <a:t> [ </a:t>
+            </a:r>
+            <a:r>
+              <a:rPr lang="en-US" sz="1600" dirty="0"/>
+              <a:t>1,4,5</a:t>
+            </a:r>
+            <a:r>
+              <a:rPr lang="en-US" sz="1600" b="1" dirty="0"/>
+              <a:t> ]    	 [ </a:t>
+            </a:r>
+            <a:r>
+              <a:rPr lang="en-US" sz="1600" dirty="0"/>
+              <a:t>0</a:t>
+            </a:r>
+            <a:r>
+              <a:rPr lang="en-US" sz="1600" b="1" dirty="0"/>
+              <a:t> ]</a:t>
+            </a:r>
+          </a:p>
+          <a:p>
+            <a:pPr lvl="5"/>
+            <a:r>
+              <a:rPr lang="en-US" sz="1600" b="1" dirty="0"/>
+              <a:t> [</a:t>
+            </a:r>
+            <a:r>
+              <a:rPr lang="en-US" sz="1600" dirty="0"/>
+              <a:t> 4, 5, 3 </a:t>
+            </a:r>
+            <a:r>
+              <a:rPr lang="en-US" sz="1600" b="1" dirty="0"/>
+              <a:t>]  	 [ </a:t>
+            </a:r>
+            <a:r>
+              <a:rPr lang="en-US" sz="1600" dirty="0"/>
+              <a:t>0, 1 </a:t>
+            </a:r>
+            <a:r>
+              <a:rPr lang="en-US" sz="1600" b="1" dirty="0"/>
+              <a:t>]</a:t>
+            </a:r>
+          </a:p>
+          <a:p>
+            <a:pPr lvl="5"/>
+            <a:r>
+              <a:rPr lang="en-US" sz="1600" b="1" dirty="0"/>
+              <a:t> [ </a:t>
+            </a:r>
+            <a:r>
+              <a:rPr lang="en-US" sz="1600" dirty="0"/>
+              <a:t>5, 3 </a:t>
+            </a:r>
+            <a:r>
+              <a:rPr lang="en-US" sz="1600" b="1" dirty="0"/>
+              <a:t>]      	 [ </a:t>
+            </a:r>
+            <a:r>
+              <a:rPr lang="en-US" sz="1600" dirty="0"/>
+              <a:t>0, 1, 4 </a:t>
+            </a:r>
+            <a:r>
+              <a:rPr lang="en-US" sz="1600" b="1" dirty="0"/>
+              <a:t>]</a:t>
+            </a:r>
+          </a:p>
+          <a:p>
+            <a:pPr lvl="5"/>
+            <a:r>
+              <a:rPr lang="en-US" sz="1600" b="1" dirty="0"/>
+              <a:t> [ </a:t>
+            </a:r>
+            <a:r>
+              <a:rPr lang="en-US" sz="1600" dirty="0"/>
+              <a:t>3</a:t>
+            </a:r>
+            <a:r>
+              <a:rPr lang="en-US" sz="1600" b="1" dirty="0"/>
+              <a:t> ]         	 [ </a:t>
+            </a:r>
+            <a:r>
+              <a:rPr lang="en-US" sz="1600" dirty="0"/>
+              <a:t>0, 1, 4, 5 </a:t>
+            </a:r>
+            <a:r>
+              <a:rPr lang="en-US" sz="1600" b="1" dirty="0"/>
+              <a:t>]</a:t>
+            </a:r>
+          </a:p>
+          <a:p>
+            <a:pPr lvl="5"/>
+            <a:r>
+              <a:rPr lang="en-US" sz="1600" b="1" dirty="0"/>
+              <a:t> [ </a:t>
+            </a:r>
+            <a:r>
+              <a:rPr lang="en-US" sz="1600" dirty="0"/>
+              <a:t>2</a:t>
+            </a:r>
+            <a:r>
+              <a:rPr lang="en-US" sz="1600" b="1" dirty="0"/>
+              <a:t> ]          	 [ </a:t>
+            </a:r>
+            <a:r>
+              <a:rPr lang="en-US" sz="1600" dirty="0"/>
+              <a:t>0, 1, 4, 5, 3 </a:t>
+            </a:r>
+            <a:r>
+              <a:rPr lang="en-US" sz="1600" b="1" dirty="0"/>
+              <a:t>]</a:t>
+            </a:r>
+          </a:p>
+          <a:p>
+            <a:pPr lvl="5"/>
+            <a:r>
+              <a:rPr lang="en-US" sz="1600" b="1" dirty="0"/>
+              <a:t> []              	 [ </a:t>
+            </a:r>
+            <a:r>
+              <a:rPr lang="en-US" sz="1600" dirty="0"/>
+              <a:t>0, 1, 4, 5, 3, 2 </a:t>
+            </a:r>
+            <a:r>
+              <a:rPr lang="en-US" sz="1600" b="1" dirty="0"/>
+              <a:t>]</a:t>
+            </a:r>
+            <a:endParaRPr lang="en-US" sz="1600" dirty="0"/>
+          </a:p>
+        </p:txBody>
+      </p:sp>
     </p:spTree>
     <p:extLst>
       <p:ext uri="{BB962C8B-B14F-4D97-AF65-F5344CB8AC3E}">
-        <p14:creationId xmlns:p14="http://schemas.microsoft.com/office/powerpoint/2010/main" val="1972130019"/>
+        <p14:creationId xmlns:p14="http://schemas.microsoft.com/office/powerpoint/2010/main" val="1647521261"/>
       </p:ext>
     </p:extLst>
   </p:cSld>
@@ -29507,26 +29478,14 @@
           <a:p>
             <a:r>
               <a:rPr lang="en-US" sz="3200" dirty="0"/>
-              <a:t>Traversals</a:t>
+              <a:t>implementation</a:t>
             </a:r>
             <a:br>
               <a:rPr lang="en-US" sz="3200" dirty="0"/>
             </a:br>
             <a:r>
-              <a:rPr lang="en-US" sz="2000" b="1" dirty="0" err="1"/>
-              <a:t>DEpth</a:t>
-            </a:r>
-            <a:r>
               <a:rPr lang="en-US" sz="2000" b="1" dirty="0"/>
-              <a:t> First Search (</a:t>
-            </a:r>
-            <a:r>
-              <a:rPr lang="en-US" sz="2000" b="1" dirty="0" err="1"/>
-              <a:t>dFS</a:t>
-            </a:r>
-            <a:r>
-              <a:rPr lang="en-US" sz="2000" b="1" dirty="0"/>
-              <a:t>)</a:t>
+              <a:t>Breadth First Search (BFS)</a:t>
             </a:r>
             <a:endParaRPr lang="en-US" sz="2000" dirty="0"/>
           </a:p>
@@ -29546,8 +29505,8 @@
         </p:nvSpPr>
         <p:spPr>
           <a:xfrm>
-            <a:off x="976320" y="2519614"/>
-            <a:ext cx="4774514" cy="1754326"/>
+            <a:off x="1251693" y="3390205"/>
+            <a:ext cx="4576597" cy="369332"/>
           </a:xfrm>
           <a:prstGeom prst="rect">
             <a:avLst/>
@@ -29562,26 +29521,9 @@
           <a:p>
             <a:r>
               <a:rPr lang="en-US" b="1" dirty="0"/>
-              <a:t>Intuition</a:t>
-            </a:r>
-          </a:p>
-          <a:p>
-            <a:endParaRPr lang="en-US" b="1" dirty="0"/>
-          </a:p>
-          <a:p>
-            <a:r>
-              <a:rPr lang="en-US" dirty="0"/>
-              <a:t>Start at the source (or arbitrary node)</a:t>
-            </a:r>
-          </a:p>
-          <a:p>
+              <a:t>CODEALONG!</a:t>
+            </a:r>
             <a:endParaRPr lang="en-US" dirty="0"/>
-          </a:p>
-          <a:p>
-            <a:r>
-              <a:rPr lang="en-US" dirty="0"/>
-              <a:t>Explore each branch completely before going to next branch.</a:t>
-            </a:r>
           </a:p>
         </p:txBody>
       </p:sp>
@@ -30222,45 +30164,10 @@
           </a:fontRef>
         </p:style>
       </p:cxnSp>
-      <p:sp>
-        <p:nvSpPr>
-          <p:cNvPr id="27" name="TextBox 26">
-            <a:extLst>
-              <a:ext uri="{FF2B5EF4-FFF2-40B4-BE49-F238E27FC236}">
-                <a16:creationId xmlns:a16="http://schemas.microsoft.com/office/drawing/2014/main" xmlns="" id="{F110B75F-3D0B-4EF5-BF60-7D9FB56C00D3}"/>
-              </a:ext>
-            </a:extLst>
-          </p:cNvPr>
-          <p:cNvSpPr txBox="1"/>
-          <p:nvPr/>
-        </p:nvSpPr>
-        <p:spPr>
-          <a:xfrm>
-            <a:off x="642158" y="4273940"/>
-            <a:ext cx="5839180" cy="369332"/>
-          </a:xfrm>
-          <a:prstGeom prst="rect">
-            <a:avLst/>
-          </a:prstGeom>
-          <a:noFill/>
-        </p:spPr>
-        <p:txBody>
-          <a:bodyPr wrap="square" rtlCol="0">
-            <a:spAutoFit/>
-          </a:bodyPr>
-          <a:lstStyle/>
-          <a:p>
-            <a:r>
-              <a:rPr lang="en-US" b="1" dirty="0"/>
-              <a:t>What is the output of a DFS traversal of this graph?</a:t>
-            </a:r>
-          </a:p>
-        </p:txBody>
-      </p:sp>
     </p:spTree>
     <p:extLst>
       <p:ext uri="{BB962C8B-B14F-4D97-AF65-F5344CB8AC3E}">
-        <p14:creationId xmlns:p14="http://schemas.microsoft.com/office/powerpoint/2010/main" val="1123840811"/>
+        <p14:creationId xmlns:p14="http://schemas.microsoft.com/office/powerpoint/2010/main" val="1972130019"/>
       </p:ext>
     </p:extLst>
   </p:cSld>
@@ -30423,8 +30330,20 @@
               <a:rPr lang="en-US" sz="3200" dirty="0"/>
             </a:br>
             <a:r>
+              <a:rPr lang="en-US" sz="2000" b="1" dirty="0" err="1"/>
+              <a:t>DEpth</a:t>
+            </a:r>
+            <a:r>
               <a:rPr lang="en-US" sz="2000" b="1" dirty="0"/>
-              <a:t>Depth First Search (DFS)</a:t>
+              <a:t> First Search (</a:t>
+            </a:r>
+            <a:r>
+              <a:rPr lang="en-US" sz="2000" b="1" dirty="0" err="1"/>
+              <a:t>dFS</a:t>
+            </a:r>
+            <a:r>
+              <a:rPr lang="en-US" sz="2000" b="1" dirty="0"/>
+              <a:t>)</a:t>
             </a:r>
             <a:endParaRPr lang="en-US" sz="2000" dirty="0"/>
           </a:p>
@@ -30445,7 +30364,7 @@
         <p:spPr>
           <a:xfrm>
             <a:off x="976320" y="2519614"/>
-            <a:ext cx="4688939" cy="1754326"/>
+            <a:ext cx="4774514" cy="1754326"/>
           </a:xfrm>
           <a:prstGeom prst="rect">
             <a:avLst/>
@@ -31122,10 +31041,10 @@
       </p:cxnSp>
       <p:sp>
         <p:nvSpPr>
-          <p:cNvPr id="26" name="TextBox 25">
-            <a:extLst>
-              <a:ext uri="{FF2B5EF4-FFF2-40B4-BE49-F238E27FC236}">
-                <a16:creationId xmlns:a16="http://schemas.microsoft.com/office/drawing/2014/main" xmlns="" id="{7C674BD7-2C40-476B-975D-7FA2EDC4C0BC}"/>
+          <p:cNvPr id="27" name="TextBox 26">
+            <a:extLst>
+              <a:ext uri="{FF2B5EF4-FFF2-40B4-BE49-F238E27FC236}">
+                <a16:creationId xmlns:a16="http://schemas.microsoft.com/office/drawing/2014/main" xmlns="" id="{F110B75F-3D0B-4EF5-BF60-7D9FB56C00D3}"/>
               </a:ext>
             </a:extLst>
           </p:cNvPr>
@@ -31135,7 +31054,7 @@
         <p:spPr>
           <a:xfrm>
             <a:off x="642158" y="4273940"/>
-            <a:ext cx="5839180" cy="2369880"/>
+            <a:ext cx="5839180" cy="369332"/>
           </a:xfrm>
           <a:prstGeom prst="rect">
             <a:avLst/>
@@ -31153,245 +31072,12 @@
               <a:t>What is the output of a DFS traversal of this graph?</a:t>
             </a:r>
           </a:p>
-          <a:p>
-            <a:pPr lvl="5"/>
-            <a:r>
-              <a:rPr lang="en-US" u="sng" dirty="0"/>
-              <a:t>Discovered</a:t>
-            </a:r>
-            <a:r>
-              <a:rPr lang="en-US" dirty="0"/>
-              <a:t>	</a:t>
-            </a:r>
-            <a:r>
-              <a:rPr lang="en-US" u="sng" dirty="0"/>
-              <a:t>Processed</a:t>
-            </a:r>
-          </a:p>
-          <a:p>
-            <a:pPr lvl="5"/>
-            <a:r>
-              <a:rPr lang="en-US" sz="1600" b="1" dirty="0"/>
-              <a:t> [ </a:t>
-            </a:r>
-            <a:r>
-              <a:rPr lang="en-US" sz="1600" dirty="0"/>
-              <a:t>0 </a:t>
-            </a:r>
-            <a:r>
-              <a:rPr lang="en-US" sz="1600" b="1" dirty="0"/>
-              <a:t>] 		 []</a:t>
-            </a:r>
-          </a:p>
-          <a:p>
-            <a:pPr lvl="5"/>
-            <a:r>
-              <a:rPr lang="en-US" sz="1600" b="1" dirty="0"/>
-              <a:t> [ </a:t>
-            </a:r>
-            <a:r>
-              <a:rPr lang="en-US" sz="1600" dirty="0"/>
-              <a:t>5,4,1</a:t>
-            </a:r>
-            <a:r>
-              <a:rPr lang="en-US" sz="1600" b="1" dirty="0"/>
-              <a:t> ]    	 [ </a:t>
-            </a:r>
-            <a:r>
-              <a:rPr lang="en-US" sz="1600" dirty="0"/>
-              <a:t>0</a:t>
-            </a:r>
-            <a:r>
-              <a:rPr lang="en-US" sz="1600" b="1" dirty="0"/>
-              <a:t> ]</a:t>
-            </a:r>
-          </a:p>
-          <a:p>
-            <a:pPr lvl="5"/>
-            <a:r>
-              <a:rPr lang="en-US" sz="1600" b="1" dirty="0"/>
-              <a:t> [</a:t>
-            </a:r>
-            <a:r>
-              <a:rPr lang="en-US" sz="1600" dirty="0"/>
-              <a:t> 5,4, 3</a:t>
-            </a:r>
-            <a:r>
-              <a:rPr lang="en-US" sz="1600" b="1" dirty="0"/>
-              <a:t>]  	 	 [ </a:t>
-            </a:r>
-            <a:r>
-              <a:rPr lang="en-US" sz="1600" dirty="0"/>
-              <a:t>0, 1 </a:t>
-            </a:r>
-            <a:r>
-              <a:rPr lang="en-US" sz="1600" b="1" dirty="0"/>
-              <a:t>]</a:t>
-            </a:r>
-          </a:p>
-          <a:p>
-            <a:pPr lvl="5"/>
-            <a:r>
-              <a:rPr lang="en-US" sz="1600" b="1" dirty="0"/>
-              <a:t> [ </a:t>
-            </a:r>
-            <a:r>
-              <a:rPr lang="en-US" sz="1600" dirty="0"/>
-              <a:t>5,4, 2 </a:t>
-            </a:r>
-            <a:r>
-              <a:rPr lang="en-US" sz="1600" b="1" dirty="0"/>
-              <a:t>]      	 [ </a:t>
-            </a:r>
-            <a:r>
-              <a:rPr lang="en-US" sz="1600" dirty="0"/>
-              <a:t>0, 1, 3 </a:t>
-            </a:r>
-            <a:r>
-              <a:rPr lang="en-US" sz="1600" b="1" dirty="0"/>
-              <a:t>]</a:t>
-            </a:r>
-          </a:p>
-          <a:p>
-            <a:pPr lvl="5"/>
-            <a:r>
-              <a:rPr lang="en-US" sz="1600" b="1" dirty="0"/>
-              <a:t> [ </a:t>
-            </a:r>
-            <a:r>
-              <a:rPr lang="en-US" sz="1600" dirty="0"/>
-              <a:t>5,4</a:t>
-            </a:r>
-            <a:r>
-              <a:rPr lang="en-US" sz="1600" b="1" dirty="0"/>
-              <a:t> ]         	 [ </a:t>
-            </a:r>
-            <a:r>
-              <a:rPr lang="en-US" sz="1600" dirty="0"/>
-              <a:t>0, 1, 3, 2 </a:t>
-            </a:r>
-            <a:r>
-              <a:rPr lang="en-US" sz="1600" b="1" dirty="0"/>
-              <a:t>]</a:t>
-            </a:r>
-          </a:p>
-          <a:p>
-            <a:pPr lvl="5"/>
-            <a:r>
-              <a:rPr lang="en-US" sz="1600" b="1" dirty="0"/>
-              <a:t> [ </a:t>
-            </a:r>
-            <a:r>
-              <a:rPr lang="en-US" sz="1600" dirty="0"/>
-              <a:t>5</a:t>
-            </a:r>
-            <a:r>
-              <a:rPr lang="en-US" sz="1600" b="1" dirty="0"/>
-              <a:t> ]          	 [ </a:t>
-            </a:r>
-            <a:r>
-              <a:rPr lang="en-US" sz="1600" dirty="0"/>
-              <a:t>0, 1, 3, 2, 4 </a:t>
-            </a:r>
-            <a:r>
-              <a:rPr lang="en-US" sz="1600" b="1" dirty="0"/>
-              <a:t>]</a:t>
-            </a:r>
-          </a:p>
-          <a:p>
-            <a:pPr lvl="5"/>
-            <a:r>
-              <a:rPr lang="en-US" sz="1600" b="1" dirty="0"/>
-              <a:t> []              	 [ </a:t>
-            </a:r>
-            <a:r>
-              <a:rPr lang="en-US" sz="1600" dirty="0"/>
-              <a:t>0, 1, 3, 2, 4, 5 </a:t>
-            </a:r>
-            <a:r>
-              <a:rPr lang="en-US" sz="1600" b="1" dirty="0"/>
-              <a:t>]</a:t>
-            </a:r>
-            <a:endParaRPr lang="en-US" sz="1600" dirty="0"/>
-          </a:p>
-        </p:txBody>
-      </p:sp>
-      <p:sp>
-        <p:nvSpPr>
-          <p:cNvPr id="3" name="TextBox 2"/>
-          <p:cNvSpPr txBox="1"/>
-          <p:nvPr/>
-        </p:nvSpPr>
-        <p:spPr>
-          <a:xfrm>
-            <a:off x="7287327" y="4889494"/>
-            <a:ext cx="696024" cy="1754326"/>
-          </a:xfrm>
-          <a:prstGeom prst="rect">
-            <a:avLst/>
-          </a:prstGeom>
-          <a:noFill/>
-        </p:spPr>
-        <p:txBody>
-          <a:bodyPr wrap="none" rtlCol="0">
-            <a:spAutoFit/>
-          </a:bodyPr>
-          <a:lstStyle/>
-          <a:p>
-            <a:r>
-              <a:rPr lang="en-US" b="1" dirty="0" smtClean="0"/>
-              <a:t>0</a:t>
-            </a:r>
-          </a:p>
-          <a:p>
-            <a:r>
-              <a:rPr lang="en-US" b="1" dirty="0" smtClean="0"/>
-              <a:t>  1</a:t>
-            </a:r>
-          </a:p>
-          <a:p>
-            <a:r>
-              <a:rPr lang="en-US" b="1" dirty="0"/>
-              <a:t> </a:t>
-            </a:r>
-            <a:r>
-              <a:rPr lang="en-US" b="1" dirty="0" smtClean="0"/>
-              <a:t>   3</a:t>
-            </a:r>
-          </a:p>
-          <a:p>
-            <a:r>
-              <a:rPr lang="en-US" b="1" dirty="0"/>
-              <a:t> </a:t>
-            </a:r>
-            <a:r>
-              <a:rPr lang="en-US" b="1" dirty="0" smtClean="0"/>
-              <a:t>     2</a:t>
-            </a:r>
-          </a:p>
-          <a:p>
-            <a:r>
-              <a:rPr lang="en-US" b="1" dirty="0"/>
-              <a:t> </a:t>
-            </a:r>
-            <a:r>
-              <a:rPr lang="en-US" b="1" dirty="0" smtClean="0"/>
-              <a:t>   4</a:t>
-            </a:r>
-          </a:p>
-          <a:p>
-            <a:r>
-              <a:rPr lang="en-US" b="1" dirty="0" smtClean="0"/>
-              <a:t>5</a:t>
-            </a:r>
-            <a:endParaRPr lang="en-US" b="1" dirty="0"/>
-          </a:p>
         </p:txBody>
       </p:sp>
     </p:spTree>
     <p:extLst>
       <p:ext uri="{BB962C8B-B14F-4D97-AF65-F5344CB8AC3E}">
-        <p14:creationId xmlns:p14="http://schemas.microsoft.com/office/powerpoint/2010/main" val="1396827793"/>
+        <p14:creationId xmlns:p14="http://schemas.microsoft.com/office/powerpoint/2010/main" val="1123840811"/>
       </p:ext>
     </p:extLst>
   </p:cSld>
@@ -31443,14 +31129,14 @@
           <a:p>
             <a:r>
               <a:rPr lang="en-US" sz="3200" dirty="0"/>
-              <a:t>implementation</a:t>
+              <a:t>Traversals</a:t>
             </a:r>
             <a:br>
               <a:rPr lang="en-US" sz="3200" dirty="0"/>
             </a:br>
             <a:r>
               <a:rPr lang="en-US" sz="2000" b="1" dirty="0"/>
-              <a:t>DEPTH First Search (DFS)</a:t>
+              <a:t>Depth First Search (DFS)</a:t>
             </a:r>
             <a:endParaRPr lang="en-US" sz="2000" dirty="0"/>
           </a:p>
@@ -31470,8 +31156,8 @@
         </p:nvSpPr>
         <p:spPr>
           <a:xfrm>
-            <a:off x="1251693" y="3390205"/>
-            <a:ext cx="4576597" cy="369332"/>
+            <a:off x="976320" y="2519614"/>
+            <a:ext cx="4688939" cy="1754326"/>
           </a:xfrm>
           <a:prstGeom prst="rect">
             <a:avLst/>
@@ -31486,9 +31172,26 @@
           <a:p>
             <a:r>
               <a:rPr lang="en-US" b="1" dirty="0"/>
-              <a:t>CODEALONG!</a:t>
-            </a:r>
+              <a:t>Intuition</a:t>
+            </a:r>
+          </a:p>
+          <a:p>
+            <a:endParaRPr lang="en-US" b="1" dirty="0"/>
+          </a:p>
+          <a:p>
+            <a:r>
+              <a:rPr lang="en-US" dirty="0"/>
+              <a:t>Start at the source (or arbitrary node)</a:t>
+            </a:r>
+          </a:p>
+          <a:p>
             <a:endParaRPr lang="en-US" dirty="0"/>
+          </a:p>
+          <a:p>
+            <a:r>
+              <a:rPr lang="en-US" dirty="0"/>
+              <a:t>Explore each branch completely before going to next branch.</a:t>
+            </a:r>
           </a:p>
         </p:txBody>
       </p:sp>
@@ -32129,10 +31832,278 @@
           </a:fontRef>
         </p:style>
       </p:cxnSp>
+      <p:sp>
+        <p:nvSpPr>
+          <p:cNvPr id="26" name="TextBox 25">
+            <a:extLst>
+              <a:ext uri="{FF2B5EF4-FFF2-40B4-BE49-F238E27FC236}">
+                <a16:creationId xmlns:a16="http://schemas.microsoft.com/office/drawing/2014/main" xmlns="" id="{7C674BD7-2C40-476B-975D-7FA2EDC4C0BC}"/>
+              </a:ext>
+            </a:extLst>
+          </p:cNvPr>
+          <p:cNvSpPr txBox="1"/>
+          <p:nvPr/>
+        </p:nvSpPr>
+        <p:spPr>
+          <a:xfrm>
+            <a:off x="642158" y="4273940"/>
+            <a:ext cx="5839180" cy="2369880"/>
+          </a:xfrm>
+          <a:prstGeom prst="rect">
+            <a:avLst/>
+          </a:prstGeom>
+          <a:noFill/>
+        </p:spPr>
+        <p:txBody>
+          <a:bodyPr wrap="square" rtlCol="0">
+            <a:spAutoFit/>
+          </a:bodyPr>
+          <a:lstStyle/>
+          <a:p>
+            <a:r>
+              <a:rPr lang="en-US" b="1" dirty="0"/>
+              <a:t>What is the output of a DFS traversal of this graph?</a:t>
+            </a:r>
+          </a:p>
+          <a:p>
+            <a:pPr lvl="5"/>
+            <a:r>
+              <a:rPr lang="en-US" u="sng" dirty="0"/>
+              <a:t>Discovered</a:t>
+            </a:r>
+            <a:r>
+              <a:rPr lang="en-US" dirty="0"/>
+              <a:t>	</a:t>
+            </a:r>
+            <a:r>
+              <a:rPr lang="en-US" u="sng" dirty="0"/>
+              <a:t>Processed</a:t>
+            </a:r>
+          </a:p>
+          <a:p>
+            <a:pPr lvl="5"/>
+            <a:r>
+              <a:rPr lang="en-US" sz="1600" b="1" dirty="0"/>
+              <a:t> [ </a:t>
+            </a:r>
+            <a:r>
+              <a:rPr lang="en-US" sz="1600" dirty="0"/>
+              <a:t>0 </a:t>
+            </a:r>
+            <a:r>
+              <a:rPr lang="en-US" sz="1600" b="1" dirty="0"/>
+              <a:t>] 		 []</a:t>
+            </a:r>
+          </a:p>
+          <a:p>
+            <a:pPr lvl="5"/>
+            <a:r>
+              <a:rPr lang="en-US" sz="1600" b="1" dirty="0"/>
+              <a:t> [ </a:t>
+            </a:r>
+            <a:r>
+              <a:rPr lang="en-US" sz="1600" dirty="0"/>
+              <a:t>5,4,1</a:t>
+            </a:r>
+            <a:r>
+              <a:rPr lang="en-US" sz="1600" b="1" dirty="0"/>
+              <a:t> ]    	 [ </a:t>
+            </a:r>
+            <a:r>
+              <a:rPr lang="en-US" sz="1600" dirty="0"/>
+              <a:t>0</a:t>
+            </a:r>
+            <a:r>
+              <a:rPr lang="en-US" sz="1600" b="1" dirty="0"/>
+              <a:t> ]</a:t>
+            </a:r>
+          </a:p>
+          <a:p>
+            <a:pPr lvl="5"/>
+            <a:r>
+              <a:rPr lang="en-US" sz="1600" b="1" dirty="0"/>
+              <a:t> [</a:t>
+            </a:r>
+            <a:r>
+              <a:rPr lang="en-US" sz="1600" dirty="0"/>
+              <a:t> 5,4, 3</a:t>
+            </a:r>
+            <a:r>
+              <a:rPr lang="en-US" sz="1600" b="1" dirty="0"/>
+              <a:t>]  	 	 [ </a:t>
+            </a:r>
+            <a:r>
+              <a:rPr lang="en-US" sz="1600" dirty="0"/>
+              <a:t>0, 1 </a:t>
+            </a:r>
+            <a:r>
+              <a:rPr lang="en-US" sz="1600" b="1" dirty="0"/>
+              <a:t>]</a:t>
+            </a:r>
+          </a:p>
+          <a:p>
+            <a:pPr lvl="5"/>
+            <a:r>
+              <a:rPr lang="en-US" sz="1600" b="1" dirty="0"/>
+              <a:t> [ </a:t>
+            </a:r>
+            <a:r>
+              <a:rPr lang="en-US" sz="1600" dirty="0"/>
+              <a:t>5,4, 2 </a:t>
+            </a:r>
+            <a:r>
+              <a:rPr lang="en-US" sz="1600" b="1" dirty="0"/>
+              <a:t>]      	 [ </a:t>
+            </a:r>
+            <a:r>
+              <a:rPr lang="en-US" sz="1600" dirty="0"/>
+              <a:t>0, 1, 3 </a:t>
+            </a:r>
+            <a:r>
+              <a:rPr lang="en-US" sz="1600" b="1" dirty="0"/>
+              <a:t>]</a:t>
+            </a:r>
+          </a:p>
+          <a:p>
+            <a:pPr lvl="5"/>
+            <a:r>
+              <a:rPr lang="en-US" sz="1600" b="1" dirty="0"/>
+              <a:t> [ </a:t>
+            </a:r>
+            <a:r>
+              <a:rPr lang="en-US" sz="1600" dirty="0"/>
+              <a:t>5,4</a:t>
+            </a:r>
+            <a:r>
+              <a:rPr lang="en-US" sz="1600" b="1" dirty="0"/>
+              <a:t> ]         	 [ </a:t>
+            </a:r>
+            <a:r>
+              <a:rPr lang="en-US" sz="1600" dirty="0"/>
+              <a:t>0, 1, 3, 2 </a:t>
+            </a:r>
+            <a:r>
+              <a:rPr lang="en-US" sz="1600" b="1" dirty="0"/>
+              <a:t>]</a:t>
+            </a:r>
+          </a:p>
+          <a:p>
+            <a:pPr lvl="5"/>
+            <a:r>
+              <a:rPr lang="en-US" sz="1600" b="1" dirty="0"/>
+              <a:t> [ </a:t>
+            </a:r>
+            <a:r>
+              <a:rPr lang="en-US" sz="1600" dirty="0"/>
+              <a:t>5</a:t>
+            </a:r>
+            <a:r>
+              <a:rPr lang="en-US" sz="1600" b="1" dirty="0"/>
+              <a:t> ]          	 [ </a:t>
+            </a:r>
+            <a:r>
+              <a:rPr lang="en-US" sz="1600" dirty="0"/>
+              <a:t>0, 1, 3, 2, 4 </a:t>
+            </a:r>
+            <a:r>
+              <a:rPr lang="en-US" sz="1600" b="1" dirty="0"/>
+              <a:t>]</a:t>
+            </a:r>
+          </a:p>
+          <a:p>
+            <a:pPr lvl="5"/>
+            <a:r>
+              <a:rPr lang="en-US" sz="1600" b="1" dirty="0"/>
+              <a:t> []              	 [ </a:t>
+            </a:r>
+            <a:r>
+              <a:rPr lang="en-US" sz="1600" dirty="0"/>
+              <a:t>0, 1, 3, 2, 4, 5 </a:t>
+            </a:r>
+            <a:r>
+              <a:rPr lang="en-US" sz="1600" b="1" dirty="0"/>
+              <a:t>]</a:t>
+            </a:r>
+            <a:endParaRPr lang="en-US" sz="1600" dirty="0"/>
+          </a:p>
+        </p:txBody>
+      </p:sp>
+      <p:sp>
+        <p:nvSpPr>
+          <p:cNvPr id="3" name="TextBox 2"/>
+          <p:cNvSpPr txBox="1"/>
+          <p:nvPr/>
+        </p:nvSpPr>
+        <p:spPr>
+          <a:xfrm>
+            <a:off x="7287327" y="4889494"/>
+            <a:ext cx="696024" cy="1754326"/>
+          </a:xfrm>
+          <a:prstGeom prst="rect">
+            <a:avLst/>
+          </a:prstGeom>
+          <a:noFill/>
+        </p:spPr>
+        <p:txBody>
+          <a:bodyPr wrap="none" rtlCol="0">
+            <a:spAutoFit/>
+          </a:bodyPr>
+          <a:lstStyle/>
+          <a:p>
+            <a:r>
+              <a:rPr lang="en-US" b="1" dirty="0" smtClean="0"/>
+              <a:t>0</a:t>
+            </a:r>
+          </a:p>
+          <a:p>
+            <a:r>
+              <a:rPr lang="en-US" b="1" dirty="0" smtClean="0"/>
+              <a:t>  1</a:t>
+            </a:r>
+          </a:p>
+          <a:p>
+            <a:r>
+              <a:rPr lang="en-US" b="1" dirty="0"/>
+              <a:t> </a:t>
+            </a:r>
+            <a:r>
+              <a:rPr lang="en-US" b="1" dirty="0" smtClean="0"/>
+              <a:t>   3</a:t>
+            </a:r>
+          </a:p>
+          <a:p>
+            <a:r>
+              <a:rPr lang="en-US" b="1" dirty="0"/>
+              <a:t> </a:t>
+            </a:r>
+            <a:r>
+              <a:rPr lang="en-US" b="1" dirty="0" smtClean="0"/>
+              <a:t>     2</a:t>
+            </a:r>
+          </a:p>
+          <a:p>
+            <a:r>
+              <a:rPr lang="en-US" b="1" dirty="0"/>
+              <a:t> </a:t>
+            </a:r>
+            <a:r>
+              <a:rPr lang="en-US" b="1" dirty="0" smtClean="0"/>
+              <a:t>   4</a:t>
+            </a:r>
+          </a:p>
+          <a:p>
+            <a:r>
+              <a:rPr lang="en-US" b="1" dirty="0" smtClean="0"/>
+              <a:t>5</a:t>
+            </a:r>
+            <a:endParaRPr lang="en-US" b="1" dirty="0"/>
+          </a:p>
+        </p:txBody>
+      </p:sp>
     </p:spTree>
     <p:extLst>
       <p:ext uri="{BB962C8B-B14F-4D97-AF65-F5344CB8AC3E}">
-        <p14:creationId xmlns:p14="http://schemas.microsoft.com/office/powerpoint/2010/main" val="3842887877"/>
+        <p14:creationId xmlns:p14="http://schemas.microsoft.com/office/powerpoint/2010/main" val="1396827793"/>
       </p:ext>
     </p:extLst>
   </p:cSld>
@@ -32184,7 +32155,14 @@
           <a:p>
             <a:r>
               <a:rPr lang="en-US" sz="3200" dirty="0"/>
-              <a:t>tidbits</a:t>
+              <a:t>implementation</a:t>
+            </a:r>
+            <a:br>
+              <a:rPr lang="en-US" sz="3200" dirty="0"/>
+            </a:br>
+            <a:r>
+              <a:rPr lang="en-US" sz="2000" b="1" dirty="0"/>
+              <a:t>DEPTH First Search (DFS)</a:t>
             </a:r>
             <a:endParaRPr lang="en-US" sz="2000" dirty="0"/>
           </a:p>
@@ -32204,8 +32182,8 @@
         </p:nvSpPr>
         <p:spPr>
           <a:xfrm>
-            <a:off x="2231137" y="2601640"/>
-            <a:ext cx="3820122" cy="1754326"/>
+            <a:off x="1251693" y="3390205"/>
+            <a:ext cx="4576597" cy="369332"/>
           </a:xfrm>
           <a:prstGeom prst="rect">
             <a:avLst/>
@@ -32220,145 +32198,653 @@
           <a:p>
             <a:r>
               <a:rPr lang="en-US" b="1" dirty="0"/>
-              <a:t>BFS </a:t>
-            </a:r>
-            <a:r>
-              <a:rPr lang="en-US" dirty="0"/>
-              <a:t>is awesome for finding shortest path between two nodes in an unweighted graph.</a:t>
-            </a:r>
-          </a:p>
-          <a:p>
+              <a:t>CODEALONG!</a:t>
+            </a:r>
             <a:endParaRPr lang="en-US" dirty="0"/>
           </a:p>
-          <a:p>
-            <a:r>
-              <a:rPr lang="en-US" b="1" dirty="0"/>
-              <a:t>BFS </a:t>
-            </a:r>
-            <a:r>
-              <a:rPr lang="en-US" dirty="0"/>
-              <a:t>– think of queues and iterative implementation.</a:t>
-            </a:r>
-            <a:endParaRPr lang="en-US" b="1" dirty="0"/>
-          </a:p>
-        </p:txBody>
-      </p:sp>
-      <p:sp>
-        <p:nvSpPr>
-          <p:cNvPr id="26" name="TextBox 25">
-            <a:extLst>
-              <a:ext uri="{FF2B5EF4-FFF2-40B4-BE49-F238E27FC236}">
-                <a16:creationId xmlns:a16="http://schemas.microsoft.com/office/drawing/2014/main" xmlns="" id="{AEA3CE33-3193-4A10-B752-AF0D734241BC}"/>
-              </a:ext>
-            </a:extLst>
-          </p:cNvPr>
-          <p:cNvSpPr txBox="1"/>
-          <p:nvPr/>
-        </p:nvSpPr>
-        <p:spPr>
-          <a:xfrm>
-            <a:off x="6051259" y="2601640"/>
-            <a:ext cx="3909605" cy="1477328"/>
-          </a:xfrm>
-          <a:prstGeom prst="rect">
-            <a:avLst/>
-          </a:prstGeom>
-          <a:noFill/>
-        </p:spPr>
-        <p:txBody>
-          <a:bodyPr wrap="square" rtlCol="0">
-            <a:spAutoFit/>
-          </a:bodyPr>
-          <a:lstStyle/>
-          <a:p>
-            <a:r>
-              <a:rPr lang="en-US" b="1" dirty="0"/>
-              <a:t>DFS </a:t>
-            </a:r>
-            <a:r>
-              <a:rPr lang="en-US" dirty="0"/>
-              <a:t>is awesome for going through each node. Technically doable with either BFS/DFS though.</a:t>
-            </a:r>
-          </a:p>
-          <a:p>
-            <a:endParaRPr lang="en-US" dirty="0"/>
-          </a:p>
-          <a:p>
-            <a:r>
-              <a:rPr lang="en-US" b="1" dirty="0"/>
-              <a:t>DFS </a:t>
-            </a:r>
-            <a:r>
-              <a:rPr lang="en-US" dirty="0"/>
-              <a:t>– think of stacks/recursion.</a:t>
-            </a:r>
-            <a:endParaRPr lang="en-US" b="1" dirty="0"/>
-          </a:p>
-        </p:txBody>
-      </p:sp>
-      <p:sp>
-        <p:nvSpPr>
-          <p:cNvPr id="3" name="TextBox 2">
-            <a:extLst>
-              <a:ext uri="{FF2B5EF4-FFF2-40B4-BE49-F238E27FC236}">
-                <a16:creationId xmlns:a16="http://schemas.microsoft.com/office/drawing/2014/main" xmlns="" id="{0E019EA2-B23D-4DDF-B114-6802B3C7FF2C}"/>
-              </a:ext>
-            </a:extLst>
-          </p:cNvPr>
-          <p:cNvSpPr txBox="1"/>
-          <p:nvPr/>
-        </p:nvSpPr>
-        <p:spPr>
-          <a:xfrm>
-            <a:off x="2231136" y="5063735"/>
-            <a:ext cx="7790079" cy="1477328"/>
-          </a:xfrm>
-          <a:prstGeom prst="rect">
-            <a:avLst/>
-          </a:prstGeom>
-          <a:noFill/>
-        </p:spPr>
-        <p:txBody>
-          <a:bodyPr wrap="square" rtlCol="0">
-            <a:spAutoFit/>
-          </a:bodyPr>
+        </p:txBody>
+      </p:sp>
+      <p:sp>
+        <p:nvSpPr>
+          <p:cNvPr id="18" name="Oval 17">
+            <a:extLst>
+              <a:ext uri="{FF2B5EF4-FFF2-40B4-BE49-F238E27FC236}">
+                <a16:creationId xmlns:a16="http://schemas.microsoft.com/office/drawing/2014/main" xmlns="" id="{E3A70C93-FBFE-4C6B-9718-B3E23D7AF78C}"/>
+              </a:ext>
+            </a:extLst>
+          </p:cNvPr>
+          <p:cNvSpPr/>
+          <p:nvPr/>
+        </p:nvSpPr>
+        <p:spPr>
+          <a:xfrm>
+            <a:off x="6195467" y="2519614"/>
+            <a:ext cx="1091860" cy="906011"/>
+          </a:xfrm>
+          <a:prstGeom prst="ellipse">
+            <a:avLst/>
+          </a:prstGeom>
+        </p:spPr>
+        <p:style>
+          <a:lnRef idx="2">
+            <a:schemeClr val="accent1">
+              <a:shade val="50000"/>
+            </a:schemeClr>
+          </a:lnRef>
+          <a:fillRef idx="1">
+            <a:schemeClr val="accent1"/>
+          </a:fillRef>
+          <a:effectRef idx="0">
+            <a:schemeClr val="accent1"/>
+          </a:effectRef>
+          <a:fontRef idx="minor">
+            <a:schemeClr val="lt1"/>
+          </a:fontRef>
+        </p:style>
+        <p:txBody>
+          <a:bodyPr rtlCol="0" anchor="ctr"/>
           <a:lstStyle/>
           <a:p>
             <a:pPr algn="ctr"/>
             <a:r>
-              <a:rPr lang="en-US" dirty="0"/>
-              <a:t>For implementation, the way we track the processed nodes doesn’t matter. But the way we track the discovered nodes does.</a:t>
-            </a:r>
-          </a:p>
+              <a:rPr lang="en-US" sz="1400" dirty="0"/>
+              <a:t>0</a:t>
+            </a:r>
+          </a:p>
+        </p:txBody>
+      </p:sp>
+      <p:sp>
+        <p:nvSpPr>
+          <p:cNvPr id="19" name="Oval 18">
+            <a:extLst>
+              <a:ext uri="{FF2B5EF4-FFF2-40B4-BE49-F238E27FC236}">
+                <a16:creationId xmlns:a16="http://schemas.microsoft.com/office/drawing/2014/main" xmlns="" id="{A9D8A195-C61E-45AF-8911-D48B6D5EFA63}"/>
+              </a:ext>
+            </a:extLst>
+          </p:cNvPr>
+          <p:cNvSpPr/>
+          <p:nvPr/>
+        </p:nvSpPr>
+        <p:spPr>
+          <a:xfrm>
+            <a:off x="7766536" y="3759537"/>
+            <a:ext cx="1091860" cy="906011"/>
+          </a:xfrm>
+          <a:prstGeom prst="ellipse">
+            <a:avLst/>
+          </a:prstGeom>
+        </p:spPr>
+        <p:style>
+          <a:lnRef idx="2">
+            <a:schemeClr val="accent1">
+              <a:shade val="50000"/>
+            </a:schemeClr>
+          </a:lnRef>
+          <a:fillRef idx="1">
+            <a:schemeClr val="accent1"/>
+          </a:fillRef>
+          <a:effectRef idx="0">
+            <a:schemeClr val="accent1"/>
+          </a:effectRef>
+          <a:fontRef idx="minor">
+            <a:schemeClr val="lt1"/>
+          </a:fontRef>
+        </p:style>
+        <p:txBody>
+          <a:bodyPr rtlCol="0" anchor="ctr"/>
+          <a:lstStyle/>
           <a:p>
             <a:pPr algn="ctr"/>
-            <a:endParaRPr lang="en-US" dirty="0"/>
-          </a:p>
+            <a:r>
+              <a:rPr lang="en-US" sz="1400" dirty="0"/>
+              <a:t>4</a:t>
+            </a:r>
+          </a:p>
+        </p:txBody>
+      </p:sp>
+      <p:sp>
+        <p:nvSpPr>
+          <p:cNvPr id="20" name="Oval 19">
+            <a:extLst>
+              <a:ext uri="{FF2B5EF4-FFF2-40B4-BE49-F238E27FC236}">
+                <a16:creationId xmlns:a16="http://schemas.microsoft.com/office/drawing/2014/main" xmlns="" id="{2530DC6F-0310-49DD-B461-F5E79C06D842}"/>
+              </a:ext>
+            </a:extLst>
+          </p:cNvPr>
+          <p:cNvSpPr/>
+          <p:nvPr/>
+        </p:nvSpPr>
+        <p:spPr>
+          <a:xfrm>
+            <a:off x="7747682" y="2519614"/>
+            <a:ext cx="1091860" cy="906011"/>
+          </a:xfrm>
+          <a:prstGeom prst="ellipse">
+            <a:avLst/>
+          </a:prstGeom>
+        </p:spPr>
+        <p:style>
+          <a:lnRef idx="2">
+            <a:schemeClr val="accent1">
+              <a:shade val="50000"/>
+            </a:schemeClr>
+          </a:lnRef>
+          <a:fillRef idx="1">
+            <a:schemeClr val="accent1"/>
+          </a:fillRef>
+          <a:effectRef idx="0">
+            <a:schemeClr val="accent1"/>
+          </a:effectRef>
+          <a:fontRef idx="minor">
+            <a:schemeClr val="lt1"/>
+          </a:fontRef>
+        </p:style>
+        <p:txBody>
+          <a:bodyPr rtlCol="0" anchor="ctr"/>
+          <a:lstStyle/>
           <a:p>
             <a:pPr algn="ctr"/>
             <a:r>
-              <a:rPr lang="en-US" dirty="0"/>
-              <a:t>With BFS, use a </a:t>
-            </a:r>
-            <a:r>
-              <a:rPr lang="en-US" dirty="0" smtClean="0"/>
-              <a:t>queue.</a:t>
-            </a:r>
-            <a:endParaRPr lang="en-US" dirty="0"/>
-          </a:p>
+              <a:rPr lang="en-US" sz="1400" dirty="0"/>
+              <a:t>1</a:t>
+            </a:r>
+          </a:p>
+        </p:txBody>
+      </p:sp>
+      <p:sp>
+        <p:nvSpPr>
+          <p:cNvPr id="21" name="Oval 20">
+            <a:extLst>
+              <a:ext uri="{FF2B5EF4-FFF2-40B4-BE49-F238E27FC236}">
+                <a16:creationId xmlns:a16="http://schemas.microsoft.com/office/drawing/2014/main" xmlns="" id="{2D30383C-AFC4-4EF5-A144-B7D7383317B0}"/>
+              </a:ext>
+            </a:extLst>
+          </p:cNvPr>
+          <p:cNvSpPr/>
+          <p:nvPr/>
+        </p:nvSpPr>
+        <p:spPr>
+          <a:xfrm>
+            <a:off x="9318751" y="3759537"/>
+            <a:ext cx="1091860" cy="906011"/>
+          </a:xfrm>
+          <a:prstGeom prst="ellipse">
+            <a:avLst/>
+          </a:prstGeom>
+        </p:spPr>
+        <p:style>
+          <a:lnRef idx="2">
+            <a:schemeClr val="accent1">
+              <a:shade val="50000"/>
+            </a:schemeClr>
+          </a:lnRef>
+          <a:fillRef idx="1">
+            <a:schemeClr val="accent1"/>
+          </a:fillRef>
+          <a:effectRef idx="0">
+            <a:schemeClr val="accent1"/>
+          </a:effectRef>
+          <a:fontRef idx="minor">
+            <a:schemeClr val="lt1"/>
+          </a:fontRef>
+        </p:style>
+        <p:txBody>
+          <a:bodyPr rtlCol="0" anchor="ctr"/>
+          <a:lstStyle/>
           <a:p>
             <a:pPr algn="ctr"/>
             <a:r>
-              <a:rPr lang="en-US" dirty="0"/>
-              <a:t>With DFS, use a stack.</a:t>
-            </a:r>
-          </a:p>
-        </p:txBody>
-      </p:sp>
+              <a:rPr lang="en-US" sz="1400" dirty="0"/>
+              <a:t>3</a:t>
+            </a:r>
+          </a:p>
+        </p:txBody>
+      </p:sp>
+      <p:sp>
+        <p:nvSpPr>
+          <p:cNvPr id="22" name="Oval 21">
+            <a:extLst>
+              <a:ext uri="{FF2B5EF4-FFF2-40B4-BE49-F238E27FC236}">
+                <a16:creationId xmlns:a16="http://schemas.microsoft.com/office/drawing/2014/main" xmlns="" id="{B7933EEF-65C0-4D7E-8EDC-F9EC80CC53A9}"/>
+              </a:ext>
+            </a:extLst>
+          </p:cNvPr>
+          <p:cNvSpPr/>
+          <p:nvPr/>
+        </p:nvSpPr>
+        <p:spPr>
+          <a:xfrm>
+            <a:off x="6214321" y="3759537"/>
+            <a:ext cx="1091860" cy="906011"/>
+          </a:xfrm>
+          <a:prstGeom prst="ellipse">
+            <a:avLst/>
+          </a:prstGeom>
+        </p:spPr>
+        <p:style>
+          <a:lnRef idx="2">
+            <a:schemeClr val="accent1">
+              <a:shade val="50000"/>
+            </a:schemeClr>
+          </a:lnRef>
+          <a:fillRef idx="1">
+            <a:schemeClr val="accent1"/>
+          </a:fillRef>
+          <a:effectRef idx="0">
+            <a:schemeClr val="accent1"/>
+          </a:effectRef>
+          <a:fontRef idx="minor">
+            <a:schemeClr val="lt1"/>
+          </a:fontRef>
+        </p:style>
+        <p:txBody>
+          <a:bodyPr rtlCol="0" anchor="ctr"/>
+          <a:lstStyle/>
+          <a:p>
+            <a:pPr algn="ctr"/>
+            <a:r>
+              <a:rPr lang="en-US" sz="1400" dirty="0"/>
+              <a:t>5</a:t>
+            </a:r>
+          </a:p>
+        </p:txBody>
+      </p:sp>
+      <p:sp>
+        <p:nvSpPr>
+          <p:cNvPr id="23" name="Oval 22">
+            <a:extLst>
+              <a:ext uri="{FF2B5EF4-FFF2-40B4-BE49-F238E27FC236}">
+                <a16:creationId xmlns:a16="http://schemas.microsoft.com/office/drawing/2014/main" xmlns="" id="{ACBC3861-7CD0-492B-A8F2-5D5897647B0E}"/>
+              </a:ext>
+            </a:extLst>
+          </p:cNvPr>
+          <p:cNvSpPr/>
+          <p:nvPr/>
+        </p:nvSpPr>
+        <p:spPr>
+          <a:xfrm>
+            <a:off x="9303029" y="2519614"/>
+            <a:ext cx="1091860" cy="906011"/>
+          </a:xfrm>
+          <a:prstGeom prst="ellipse">
+            <a:avLst/>
+          </a:prstGeom>
+        </p:spPr>
+        <p:style>
+          <a:lnRef idx="2">
+            <a:schemeClr val="accent1">
+              <a:shade val="50000"/>
+            </a:schemeClr>
+          </a:lnRef>
+          <a:fillRef idx="1">
+            <a:schemeClr val="accent1"/>
+          </a:fillRef>
+          <a:effectRef idx="0">
+            <a:schemeClr val="accent1"/>
+          </a:effectRef>
+          <a:fontRef idx="minor">
+            <a:schemeClr val="lt1"/>
+          </a:fontRef>
+        </p:style>
+        <p:txBody>
+          <a:bodyPr rtlCol="0" anchor="ctr"/>
+          <a:lstStyle/>
+          <a:p>
+            <a:pPr algn="ctr"/>
+            <a:r>
+              <a:rPr lang="en-US" sz="1400" dirty="0"/>
+              <a:t>2</a:t>
+            </a:r>
+          </a:p>
+        </p:txBody>
+      </p:sp>
+      <p:cxnSp>
+        <p:nvCxnSpPr>
+          <p:cNvPr id="24" name="Straight Arrow Connector 23">
+            <a:extLst>
+              <a:ext uri="{FF2B5EF4-FFF2-40B4-BE49-F238E27FC236}">
+                <a16:creationId xmlns:a16="http://schemas.microsoft.com/office/drawing/2014/main" xmlns="" id="{BD2AC117-99A4-4902-86EA-A6FFA7DC4319}"/>
+              </a:ext>
+            </a:extLst>
+          </p:cNvPr>
+          <p:cNvCxnSpPr>
+            <a:stCxn id="18" idx="4"/>
+            <a:endCxn id="22" idx="0"/>
+          </p:cNvCxnSpPr>
+          <p:nvPr/>
+        </p:nvCxnSpPr>
+        <p:spPr>
+          <a:xfrm>
+            <a:off x="6741397" y="3425625"/>
+            <a:ext cx="18854" cy="333912"/>
+          </a:xfrm>
+          <a:prstGeom prst="straightConnector1">
+            <a:avLst/>
+          </a:prstGeom>
+          <a:ln>
+            <a:tailEnd type="triangle"/>
+          </a:ln>
+        </p:spPr>
+        <p:style>
+          <a:lnRef idx="1">
+            <a:schemeClr val="accent1"/>
+          </a:lnRef>
+          <a:fillRef idx="0">
+            <a:schemeClr val="accent1"/>
+          </a:fillRef>
+          <a:effectRef idx="0">
+            <a:schemeClr val="accent1"/>
+          </a:effectRef>
+          <a:fontRef idx="minor">
+            <a:schemeClr val="tx1"/>
+          </a:fontRef>
+        </p:style>
+      </p:cxnSp>
+      <p:cxnSp>
+        <p:nvCxnSpPr>
+          <p:cNvPr id="25" name="Straight Arrow Connector 24">
+            <a:extLst>
+              <a:ext uri="{FF2B5EF4-FFF2-40B4-BE49-F238E27FC236}">
+                <a16:creationId xmlns:a16="http://schemas.microsoft.com/office/drawing/2014/main" xmlns="" id="{DA3EDF12-09A3-47E6-94BF-4D56401E8BC1}"/>
+              </a:ext>
+            </a:extLst>
+          </p:cNvPr>
+          <p:cNvCxnSpPr>
+            <a:cxnSpLocks/>
+            <a:stCxn id="18" idx="5"/>
+            <a:endCxn id="19" idx="1"/>
+          </p:cNvCxnSpPr>
+          <p:nvPr/>
+        </p:nvCxnSpPr>
+        <p:spPr>
+          <a:xfrm>
+            <a:off x="7127428" y="3292943"/>
+            <a:ext cx="799007" cy="599276"/>
+          </a:xfrm>
+          <a:prstGeom prst="straightConnector1">
+            <a:avLst/>
+          </a:prstGeom>
+          <a:ln>
+            <a:tailEnd type="triangle"/>
+          </a:ln>
+        </p:spPr>
+        <p:style>
+          <a:lnRef idx="1">
+            <a:schemeClr val="accent1"/>
+          </a:lnRef>
+          <a:fillRef idx="0">
+            <a:schemeClr val="accent1"/>
+          </a:fillRef>
+          <a:effectRef idx="0">
+            <a:schemeClr val="accent1"/>
+          </a:effectRef>
+          <a:fontRef idx="minor">
+            <a:schemeClr val="tx1"/>
+          </a:fontRef>
+        </p:style>
+      </p:cxnSp>
+      <p:cxnSp>
+        <p:nvCxnSpPr>
+          <p:cNvPr id="28" name="Straight Arrow Connector 27">
+            <a:extLst>
+              <a:ext uri="{FF2B5EF4-FFF2-40B4-BE49-F238E27FC236}">
+                <a16:creationId xmlns:a16="http://schemas.microsoft.com/office/drawing/2014/main" xmlns="" id="{3EF20996-34DB-42A5-BA07-F3C4B821C43B}"/>
+              </a:ext>
+            </a:extLst>
+          </p:cNvPr>
+          <p:cNvCxnSpPr>
+            <a:cxnSpLocks/>
+            <a:stCxn id="18" idx="6"/>
+            <a:endCxn id="20" idx="2"/>
+          </p:cNvCxnSpPr>
+          <p:nvPr/>
+        </p:nvCxnSpPr>
+        <p:spPr>
+          <a:xfrm>
+            <a:off x="7287327" y="2972620"/>
+            <a:ext cx="460355" cy="0"/>
+          </a:xfrm>
+          <a:prstGeom prst="straightConnector1">
+            <a:avLst/>
+          </a:prstGeom>
+          <a:ln>
+            <a:tailEnd type="triangle"/>
+          </a:ln>
+        </p:spPr>
+        <p:style>
+          <a:lnRef idx="1">
+            <a:schemeClr val="accent1"/>
+          </a:lnRef>
+          <a:fillRef idx="0">
+            <a:schemeClr val="accent1"/>
+          </a:fillRef>
+          <a:effectRef idx="0">
+            <a:schemeClr val="accent1"/>
+          </a:effectRef>
+          <a:fontRef idx="minor">
+            <a:schemeClr val="tx1"/>
+          </a:fontRef>
+        </p:style>
+      </p:cxnSp>
+      <p:cxnSp>
+        <p:nvCxnSpPr>
+          <p:cNvPr id="32" name="Straight Arrow Connector 31">
+            <a:extLst>
+              <a:ext uri="{FF2B5EF4-FFF2-40B4-BE49-F238E27FC236}">
+                <a16:creationId xmlns:a16="http://schemas.microsoft.com/office/drawing/2014/main" xmlns="" id="{03765C78-6E44-42E8-A389-88D3C0C77CD7}"/>
+              </a:ext>
+            </a:extLst>
+          </p:cNvPr>
+          <p:cNvCxnSpPr>
+            <a:cxnSpLocks/>
+            <a:stCxn id="20" idx="4"/>
+            <a:endCxn id="19" idx="0"/>
+          </p:cNvCxnSpPr>
+          <p:nvPr/>
+        </p:nvCxnSpPr>
+        <p:spPr>
+          <a:xfrm>
+            <a:off x="8293612" y="3425625"/>
+            <a:ext cx="18854" cy="333912"/>
+          </a:xfrm>
+          <a:prstGeom prst="straightConnector1">
+            <a:avLst/>
+          </a:prstGeom>
+          <a:ln>
+            <a:tailEnd type="triangle"/>
+          </a:ln>
+        </p:spPr>
+        <p:style>
+          <a:lnRef idx="1">
+            <a:schemeClr val="accent1"/>
+          </a:lnRef>
+          <a:fillRef idx="0">
+            <a:schemeClr val="accent1"/>
+          </a:fillRef>
+          <a:effectRef idx="0">
+            <a:schemeClr val="accent1"/>
+          </a:effectRef>
+          <a:fontRef idx="minor">
+            <a:schemeClr val="tx1"/>
+          </a:fontRef>
+        </p:style>
+      </p:cxnSp>
+      <p:cxnSp>
+        <p:nvCxnSpPr>
+          <p:cNvPr id="35" name="Straight Arrow Connector 34">
+            <a:extLst>
+              <a:ext uri="{FF2B5EF4-FFF2-40B4-BE49-F238E27FC236}">
+                <a16:creationId xmlns:a16="http://schemas.microsoft.com/office/drawing/2014/main" xmlns="" id="{7856A272-8E7D-4F00-A51D-8615A11FB3C6}"/>
+              </a:ext>
+            </a:extLst>
+          </p:cNvPr>
+          <p:cNvCxnSpPr>
+            <a:cxnSpLocks/>
+            <a:stCxn id="20" idx="5"/>
+            <a:endCxn id="21" idx="1"/>
+          </p:cNvCxnSpPr>
+          <p:nvPr/>
+        </p:nvCxnSpPr>
+        <p:spPr>
+          <a:xfrm>
+            <a:off x="8679643" y="3292943"/>
+            <a:ext cx="799007" cy="599276"/>
+          </a:xfrm>
+          <a:prstGeom prst="straightConnector1">
+            <a:avLst/>
+          </a:prstGeom>
+          <a:ln>
+            <a:tailEnd type="triangle"/>
+          </a:ln>
+        </p:spPr>
+        <p:style>
+          <a:lnRef idx="1">
+            <a:schemeClr val="accent1"/>
+          </a:lnRef>
+          <a:fillRef idx="0">
+            <a:schemeClr val="accent1"/>
+          </a:fillRef>
+          <a:effectRef idx="0">
+            <a:schemeClr val="accent1"/>
+          </a:effectRef>
+          <a:fontRef idx="minor">
+            <a:schemeClr val="tx1"/>
+          </a:fontRef>
+        </p:style>
+      </p:cxnSp>
+      <p:cxnSp>
+        <p:nvCxnSpPr>
+          <p:cNvPr id="38" name="Straight Arrow Connector 37">
+            <a:extLst>
+              <a:ext uri="{FF2B5EF4-FFF2-40B4-BE49-F238E27FC236}">
+                <a16:creationId xmlns:a16="http://schemas.microsoft.com/office/drawing/2014/main" xmlns="" id="{8F292BE1-F59D-4B85-A0E1-7132A3805CF7}"/>
+              </a:ext>
+            </a:extLst>
+          </p:cNvPr>
+          <p:cNvCxnSpPr>
+            <a:cxnSpLocks/>
+            <a:stCxn id="21" idx="2"/>
+            <a:endCxn id="19" idx="6"/>
+          </p:cNvCxnSpPr>
+          <p:nvPr/>
+        </p:nvCxnSpPr>
+        <p:spPr>
+          <a:xfrm flipH="1">
+            <a:off x="8858396" y="4212543"/>
+            <a:ext cx="460355" cy="0"/>
+          </a:xfrm>
+          <a:prstGeom prst="straightConnector1">
+            <a:avLst/>
+          </a:prstGeom>
+          <a:ln>
+            <a:tailEnd type="triangle"/>
+          </a:ln>
+        </p:spPr>
+        <p:style>
+          <a:lnRef idx="1">
+            <a:schemeClr val="accent1"/>
+          </a:lnRef>
+          <a:fillRef idx="0">
+            <a:schemeClr val="accent1"/>
+          </a:fillRef>
+          <a:effectRef idx="0">
+            <a:schemeClr val="accent1"/>
+          </a:effectRef>
+          <a:fontRef idx="minor">
+            <a:schemeClr val="tx1"/>
+          </a:fontRef>
+        </p:style>
+      </p:cxnSp>
+      <p:cxnSp>
+        <p:nvCxnSpPr>
+          <p:cNvPr id="43" name="Straight Arrow Connector 42">
+            <a:extLst>
+              <a:ext uri="{FF2B5EF4-FFF2-40B4-BE49-F238E27FC236}">
+                <a16:creationId xmlns:a16="http://schemas.microsoft.com/office/drawing/2014/main" xmlns="" id="{EAB267AB-B304-4A9B-8571-FB119ECDBD6D}"/>
+              </a:ext>
+            </a:extLst>
+          </p:cNvPr>
+          <p:cNvCxnSpPr>
+            <a:cxnSpLocks/>
+            <a:stCxn id="21" idx="0"/>
+            <a:endCxn id="23" idx="4"/>
+          </p:cNvCxnSpPr>
+          <p:nvPr/>
+        </p:nvCxnSpPr>
+        <p:spPr>
+          <a:xfrm flipH="1" flipV="1">
+            <a:off x="9848959" y="3425625"/>
+            <a:ext cx="15722" cy="333912"/>
+          </a:xfrm>
+          <a:prstGeom prst="straightConnector1">
+            <a:avLst/>
+          </a:prstGeom>
+          <a:ln>
+            <a:tailEnd type="triangle"/>
+          </a:ln>
+        </p:spPr>
+        <p:style>
+          <a:lnRef idx="1">
+            <a:schemeClr val="accent1"/>
+          </a:lnRef>
+          <a:fillRef idx="0">
+            <a:schemeClr val="accent1"/>
+          </a:fillRef>
+          <a:effectRef idx="0">
+            <a:schemeClr val="accent1"/>
+          </a:effectRef>
+          <a:fontRef idx="minor">
+            <a:schemeClr val="tx1"/>
+          </a:fontRef>
+        </p:style>
+      </p:cxnSp>
+      <p:cxnSp>
+        <p:nvCxnSpPr>
+          <p:cNvPr id="46" name="Straight Arrow Connector 45">
+            <a:extLst>
+              <a:ext uri="{FF2B5EF4-FFF2-40B4-BE49-F238E27FC236}">
+                <a16:creationId xmlns:a16="http://schemas.microsoft.com/office/drawing/2014/main" xmlns="" id="{F90FF63D-F398-4F70-A13B-B076C40D0D95}"/>
+              </a:ext>
+            </a:extLst>
+          </p:cNvPr>
+          <p:cNvCxnSpPr>
+            <a:cxnSpLocks/>
+            <a:stCxn id="23" idx="2"/>
+            <a:endCxn id="20" idx="6"/>
+          </p:cNvCxnSpPr>
+          <p:nvPr/>
+        </p:nvCxnSpPr>
+        <p:spPr>
+          <a:xfrm flipH="1">
+            <a:off x="8839542" y="2972620"/>
+            <a:ext cx="463487" cy="0"/>
+          </a:xfrm>
+          <a:prstGeom prst="straightConnector1">
+            <a:avLst/>
+          </a:prstGeom>
+          <a:ln>
+            <a:tailEnd type="triangle"/>
+          </a:ln>
+        </p:spPr>
+        <p:style>
+          <a:lnRef idx="1">
+            <a:schemeClr val="accent1"/>
+          </a:lnRef>
+          <a:fillRef idx="0">
+            <a:schemeClr val="accent1"/>
+          </a:fillRef>
+          <a:effectRef idx="0">
+            <a:schemeClr val="accent1"/>
+          </a:effectRef>
+          <a:fontRef idx="minor">
+            <a:schemeClr val="tx1"/>
+          </a:fontRef>
+        </p:style>
+      </p:cxnSp>
     </p:spTree>
     <p:extLst>
       <p:ext uri="{BB962C8B-B14F-4D97-AF65-F5344CB8AC3E}">
-        <p14:creationId xmlns:p14="http://schemas.microsoft.com/office/powerpoint/2010/main" val="3532886450"/>
+        <p14:creationId xmlns:p14="http://schemas.microsoft.com/office/powerpoint/2010/main" val="3842887877"/>
       </p:ext>
     </p:extLst>
   </p:cSld>
@@ -32387,6 +32873,232 @@
       </p:grpSpPr>
       <p:sp>
         <p:nvSpPr>
+          <p:cNvPr id="2" name="Title 1">
+            <a:extLst>
+              <a:ext uri="{FF2B5EF4-FFF2-40B4-BE49-F238E27FC236}">
+                <a16:creationId xmlns:a16="http://schemas.microsoft.com/office/drawing/2014/main" xmlns="" id="{EA0A0B80-C671-45FE-AD43-BCCECA327249}"/>
+              </a:ext>
+            </a:extLst>
+          </p:cNvPr>
+          <p:cNvSpPr>
+            <a:spLocks noGrp="1"/>
+          </p:cNvSpPr>
+          <p:nvPr>
+            <p:ph type="title"/>
+          </p:nvPr>
+        </p:nvSpPr>
+        <p:spPr/>
+        <p:txBody>
+          <a:bodyPr>
+            <a:noAutofit/>
+          </a:bodyPr>
+          <a:lstStyle/>
+          <a:p>
+            <a:r>
+              <a:rPr lang="en-US" sz="3200" dirty="0"/>
+              <a:t>tidbits</a:t>
+            </a:r>
+            <a:endParaRPr lang="en-US" sz="2000" dirty="0"/>
+          </a:p>
+        </p:txBody>
+      </p:sp>
+      <p:sp>
+        <p:nvSpPr>
+          <p:cNvPr id="4" name="TextBox 3">
+            <a:extLst>
+              <a:ext uri="{FF2B5EF4-FFF2-40B4-BE49-F238E27FC236}">
+                <a16:creationId xmlns:a16="http://schemas.microsoft.com/office/drawing/2014/main" xmlns="" id="{FC83256C-DAFE-4855-A791-481784FAD0A6}"/>
+              </a:ext>
+            </a:extLst>
+          </p:cNvPr>
+          <p:cNvSpPr txBox="1"/>
+          <p:nvPr/>
+        </p:nvSpPr>
+        <p:spPr>
+          <a:xfrm>
+            <a:off x="2231137" y="2601640"/>
+            <a:ext cx="3820122" cy="1754326"/>
+          </a:xfrm>
+          <a:prstGeom prst="rect">
+            <a:avLst/>
+          </a:prstGeom>
+          <a:noFill/>
+        </p:spPr>
+        <p:txBody>
+          <a:bodyPr wrap="square" rtlCol="0">
+            <a:spAutoFit/>
+          </a:bodyPr>
+          <a:lstStyle/>
+          <a:p>
+            <a:r>
+              <a:rPr lang="en-US" b="1" dirty="0"/>
+              <a:t>BFS </a:t>
+            </a:r>
+            <a:r>
+              <a:rPr lang="en-US" dirty="0"/>
+              <a:t>is awesome for finding shortest path between two nodes in an unweighted graph.</a:t>
+            </a:r>
+          </a:p>
+          <a:p>
+            <a:endParaRPr lang="en-US" dirty="0"/>
+          </a:p>
+          <a:p>
+            <a:r>
+              <a:rPr lang="en-US" b="1" dirty="0"/>
+              <a:t>BFS </a:t>
+            </a:r>
+            <a:r>
+              <a:rPr lang="en-US" dirty="0"/>
+              <a:t>– think of queues and iterative implementation.</a:t>
+            </a:r>
+            <a:endParaRPr lang="en-US" b="1" dirty="0"/>
+          </a:p>
+        </p:txBody>
+      </p:sp>
+      <p:sp>
+        <p:nvSpPr>
+          <p:cNvPr id="26" name="TextBox 25">
+            <a:extLst>
+              <a:ext uri="{FF2B5EF4-FFF2-40B4-BE49-F238E27FC236}">
+                <a16:creationId xmlns:a16="http://schemas.microsoft.com/office/drawing/2014/main" xmlns="" id="{AEA3CE33-3193-4A10-B752-AF0D734241BC}"/>
+              </a:ext>
+            </a:extLst>
+          </p:cNvPr>
+          <p:cNvSpPr txBox="1"/>
+          <p:nvPr/>
+        </p:nvSpPr>
+        <p:spPr>
+          <a:xfrm>
+            <a:off x="6051259" y="2601640"/>
+            <a:ext cx="3909605" cy="1477328"/>
+          </a:xfrm>
+          <a:prstGeom prst="rect">
+            <a:avLst/>
+          </a:prstGeom>
+          <a:noFill/>
+        </p:spPr>
+        <p:txBody>
+          <a:bodyPr wrap="square" rtlCol="0">
+            <a:spAutoFit/>
+          </a:bodyPr>
+          <a:lstStyle/>
+          <a:p>
+            <a:r>
+              <a:rPr lang="en-US" b="1" dirty="0"/>
+              <a:t>DFS </a:t>
+            </a:r>
+            <a:r>
+              <a:rPr lang="en-US" dirty="0"/>
+              <a:t>is awesome for going through each node. Technically doable with either BFS/DFS though.</a:t>
+            </a:r>
+          </a:p>
+          <a:p>
+            <a:endParaRPr lang="en-US" dirty="0"/>
+          </a:p>
+          <a:p>
+            <a:r>
+              <a:rPr lang="en-US" b="1" dirty="0"/>
+              <a:t>DFS </a:t>
+            </a:r>
+            <a:r>
+              <a:rPr lang="en-US" dirty="0"/>
+              <a:t>– think of stacks/recursion.</a:t>
+            </a:r>
+            <a:endParaRPr lang="en-US" b="1" dirty="0"/>
+          </a:p>
+        </p:txBody>
+      </p:sp>
+      <p:sp>
+        <p:nvSpPr>
+          <p:cNvPr id="3" name="TextBox 2">
+            <a:extLst>
+              <a:ext uri="{FF2B5EF4-FFF2-40B4-BE49-F238E27FC236}">
+                <a16:creationId xmlns:a16="http://schemas.microsoft.com/office/drawing/2014/main" xmlns="" id="{0E019EA2-B23D-4DDF-B114-6802B3C7FF2C}"/>
+              </a:ext>
+            </a:extLst>
+          </p:cNvPr>
+          <p:cNvSpPr txBox="1"/>
+          <p:nvPr/>
+        </p:nvSpPr>
+        <p:spPr>
+          <a:xfrm>
+            <a:off x="2231136" y="5063735"/>
+            <a:ext cx="7790079" cy="1477328"/>
+          </a:xfrm>
+          <a:prstGeom prst="rect">
+            <a:avLst/>
+          </a:prstGeom>
+          <a:noFill/>
+        </p:spPr>
+        <p:txBody>
+          <a:bodyPr wrap="square" rtlCol="0">
+            <a:spAutoFit/>
+          </a:bodyPr>
+          <a:lstStyle/>
+          <a:p>
+            <a:pPr algn="ctr"/>
+            <a:r>
+              <a:rPr lang="en-US" dirty="0"/>
+              <a:t>For implementation, the way we track the processed nodes doesn’t matter. But the way we track the discovered nodes does.</a:t>
+            </a:r>
+          </a:p>
+          <a:p>
+            <a:pPr algn="ctr"/>
+            <a:endParaRPr lang="en-US" dirty="0"/>
+          </a:p>
+          <a:p>
+            <a:pPr algn="ctr"/>
+            <a:r>
+              <a:rPr lang="en-US" dirty="0"/>
+              <a:t>With BFS, use a </a:t>
+            </a:r>
+            <a:r>
+              <a:rPr lang="en-US" dirty="0" smtClean="0"/>
+              <a:t>queue.</a:t>
+            </a:r>
+            <a:endParaRPr lang="en-US" dirty="0"/>
+          </a:p>
+          <a:p>
+            <a:pPr algn="ctr"/>
+            <a:r>
+              <a:rPr lang="en-US" dirty="0"/>
+              <a:t>With DFS, use a stack.</a:t>
+            </a:r>
+          </a:p>
+        </p:txBody>
+      </p:sp>
+    </p:spTree>
+    <p:extLst>
+      <p:ext uri="{BB962C8B-B14F-4D97-AF65-F5344CB8AC3E}">
+        <p14:creationId xmlns:p14="http://schemas.microsoft.com/office/powerpoint/2010/main" val="3532886450"/>
+      </p:ext>
+    </p:extLst>
+  </p:cSld>
+  <p:clrMapOvr>
+    <a:masterClrMapping/>
+  </p:clrMapOvr>
+</p:sld>
+</file>
+
+<file path=ppt/slides/slide44.xml><?xml version="1.0" encoding="utf-8"?>
+<p:sld xmlns:a="http://schemas.openxmlformats.org/drawingml/2006/main" xmlns:r="http://schemas.openxmlformats.org/officeDocument/2006/relationships" xmlns:p="http://schemas.openxmlformats.org/presentationml/2006/main">
+  <p:cSld>
+    <p:spTree>
+      <p:nvGrpSpPr>
+        <p:cNvPr id="1" name=""/>
+        <p:cNvGrpSpPr/>
+        <p:nvPr/>
+      </p:nvGrpSpPr>
+      <p:grpSpPr>
+        <a:xfrm>
+          <a:off x="0" y="0"/>
+          <a:ext cx="0" cy="0"/>
+          <a:chOff x="0" y="0"/>
+          <a:chExt cx="0" cy="0"/>
+        </a:xfrm>
+      </p:grpSpPr>
+      <p:sp>
+        <p:nvSpPr>
           <p:cNvPr id="2" name="Title 1"/>
           <p:cNvSpPr>
             <a:spLocks noGrp="1"/>
@@ -32458,7 +33170,7 @@
 </p:sld>
 </file>
 
-<file path=ppt/slides/slide44.xml><?xml version="1.0" encoding="utf-8"?>
+<file path=ppt/slides/slide45.xml><?xml version="1.0" encoding="utf-8"?>
 <p:sld xmlns:a="http://schemas.openxmlformats.org/drawingml/2006/main" xmlns:r="http://schemas.openxmlformats.org/officeDocument/2006/relationships" xmlns:p="http://schemas.openxmlformats.org/presentationml/2006/main">
   <p:cSld>
     <p:spTree>

</xml_diff>